<commit_message>
Version at the end of tutorial
</commit_message>
<xml_diff>
--- a/images/all_images.pptx
+++ b/images/all_images.pptx
@@ -131,10 +131,25 @@
   <pc:docChgLst>
     <pc:chgData name="Nath,D,Dipankar,JSN4 R" userId="68ef5e1d-3575-420b-8e94-66a68a391843" providerId="ADAL" clId="{2AB91750-8132-4991-BD46-0031EB9C9637}"/>
     <pc:docChg chg="undo custSel modSld">
-      <pc:chgData name="Nath,D,Dipankar,JSN4 R" userId="68ef5e1d-3575-420b-8e94-66a68a391843" providerId="ADAL" clId="{2AB91750-8132-4991-BD46-0031EB9C9637}" dt="2019-10-09T12:02:08.028" v="785" actId="20577"/>
+      <pc:chgData name="Nath,D,Dipankar,JSN4 R" userId="68ef5e1d-3575-420b-8e94-66a68a391843" providerId="ADAL" clId="{2AB91750-8132-4991-BD46-0031EB9C9637}" dt="2019-10-09T14:43:06.414" v="787" actId="1076"/>
       <pc:docMkLst>
         <pc:docMk/>
       </pc:docMkLst>
+      <pc:sldChg chg="modSp">
+        <pc:chgData name="Nath,D,Dipankar,JSN4 R" userId="68ef5e1d-3575-420b-8e94-66a68a391843" providerId="ADAL" clId="{2AB91750-8132-4991-BD46-0031EB9C9637}" dt="2019-10-09T14:43:06.414" v="787" actId="1076"/>
+        <pc:sldMkLst>
+          <pc:docMk/>
+          <pc:sldMk cId="968639943" sldId="259"/>
+        </pc:sldMkLst>
+        <pc:grpChg chg="mod">
+          <ac:chgData name="Nath,D,Dipankar,JSN4 R" userId="68ef5e1d-3575-420b-8e94-66a68a391843" providerId="ADAL" clId="{2AB91750-8132-4991-BD46-0031EB9C9637}" dt="2019-10-09T14:43:06.414" v="787" actId="1076"/>
+          <ac:grpSpMkLst>
+            <pc:docMk/>
+            <pc:sldMk cId="968639943" sldId="259"/>
+            <ac:grpSpMk id="14" creationId="{53CDAAE3-F8EF-440E-B7F9-D82B59BFB312}"/>
+          </ac:grpSpMkLst>
+        </pc:grpChg>
+      </pc:sldChg>
       <pc:sldChg chg="addSp delSp modSp">
         <pc:chgData name="Nath,D,Dipankar,JSN4 R" userId="68ef5e1d-3575-420b-8e94-66a68a391843" providerId="ADAL" clId="{2AB91750-8132-4991-BD46-0031EB9C9637}" dt="2019-10-09T12:02:08.028" v="785" actId="20577"/>
         <pc:sldMkLst>
@@ -14683,7 +14698,7 @@
         </p:nvGrpSpPr>
         <p:grpSpPr>
           <a:xfrm>
-            <a:off x="3060363" y="2190840"/>
+            <a:off x="2702764" y="2191324"/>
             <a:ext cx="1501631" cy="1367405"/>
             <a:chOff x="1202508" y="1277224"/>
             <a:chExt cx="1501631" cy="1367405"/>
@@ -15083,7 +15098,7 @@
                                     <p:cond delay="0"/>
                                   </p:stCondLst>
                                   <p:childTnLst>
-                                    <p:animMotion origin="layout" path="M -2.08333E-7 -1.48148E-6 L 0.18177 -1.48148E-6 " pathEditMode="relative" rAng="0" ptsTypes="AA">
+                                    <p:animMotion origin="layout" path="M -3.125E-6 -2.96296E-6 L 0.18177 -2.96296E-6 " pathEditMode="relative" rAng="0" ptsTypes="AA">
                                       <p:cBhvr>
                                         <p:cTn id="6" dur="2000" fill="hold"/>
                                         <p:tgtEl>
@@ -19484,8 +19499,8 @@
           </a:ln>
         </p:spPr>
       </p:pic>
-      <mc:AlternateContent xmlns:mc="http://schemas.openxmlformats.org/markup-compatibility/2006">
-        <mc:Choice xmlns:a14="http://schemas.microsoft.com/office/drawing/2010/main" Requires="a14">
+      <mc:AlternateContent xmlns:mc="http://schemas.openxmlformats.org/markup-compatibility/2006" xmlns:a14="http://schemas.microsoft.com/office/drawing/2010/main">
+        <mc:Choice Requires="a14">
           <p:sp>
             <p:nvSpPr>
               <p:cNvPr id="38" name="TextBox 37">
@@ -19514,6 +19529,7 @@
               </a:bodyPr>
               <a:lstStyle/>
               <a:p>
+                <a:pPr/>
                 <a14:m>
                   <m:oMathPara xmlns:m="http://schemas.openxmlformats.org/officeDocument/2006/math">
                     <m:oMathParaPr>
@@ -19554,7 +19570,7 @@
             </p:txBody>
           </p:sp>
         </mc:Choice>
-        <mc:Fallback>
+        <mc:Fallback xmlns="">
           <p:sp>
             <p:nvSpPr>
               <p:cNvPr id="38" name="TextBox 37">
@@ -19683,8 +19699,8 @@
           </a:p>
         </p:txBody>
       </p:sp>
-      <mc:AlternateContent xmlns:mc="http://schemas.openxmlformats.org/markup-compatibility/2006">
-        <mc:Choice xmlns:a14="http://schemas.microsoft.com/office/drawing/2010/main" Requires="a14">
+      <mc:AlternateContent xmlns:mc="http://schemas.openxmlformats.org/markup-compatibility/2006" xmlns:a14="http://schemas.microsoft.com/office/drawing/2010/main">
+        <mc:Choice Requires="a14">
           <p:sp>
             <p:nvSpPr>
               <p:cNvPr id="41" name="TextBox 40">
@@ -19713,6 +19729,7 @@
               </a:bodyPr>
               <a:lstStyle/>
               <a:p>
+                <a:pPr/>
                 <a14:m>
                   <m:oMathPara xmlns:m="http://schemas.openxmlformats.org/officeDocument/2006/math">
                     <m:oMathParaPr>
@@ -19753,7 +19770,7 @@
             </p:txBody>
           </p:sp>
         </mc:Choice>
-        <mc:Fallback>
+        <mc:Fallback xmlns="">
           <p:sp>
             <p:nvSpPr>
               <p:cNvPr id="41" name="TextBox 40">
@@ -19798,8 +19815,8 @@
           </p:sp>
         </mc:Fallback>
       </mc:AlternateContent>
-      <mc:AlternateContent xmlns:mc="http://schemas.openxmlformats.org/markup-compatibility/2006">
-        <mc:Choice xmlns:a14="http://schemas.microsoft.com/office/drawing/2010/main" Requires="a14">
+      <mc:AlternateContent xmlns:mc="http://schemas.openxmlformats.org/markup-compatibility/2006" xmlns:a14="http://schemas.microsoft.com/office/drawing/2010/main">
+        <mc:Choice Requires="a14">
           <p:sp>
             <p:nvSpPr>
               <p:cNvPr id="42" name="TextBox 41">
@@ -19828,6 +19845,7 @@
               </a:bodyPr>
               <a:lstStyle/>
               <a:p>
+                <a:pPr/>
                 <a14:m>
                   <m:oMathPara xmlns:m="http://schemas.openxmlformats.org/officeDocument/2006/math">
                     <m:oMathParaPr>
@@ -19852,14 +19870,7 @@
                           <a:latin typeface="Cambria Math" panose="02040503050406030204" pitchFamily="18" charset="0"/>
                           <a:ea typeface="Cambria Math" panose="02040503050406030204" pitchFamily="18" charset="0"/>
                         </a:rPr>
-                        <m:t>14</m:t>
-                      </m:r>
-                      <m:r>
-                        <a:rPr lang="en-US" b="0" i="1" smtClean="0">
-                          <a:latin typeface="Cambria Math" panose="02040503050406030204" pitchFamily="18" charset="0"/>
-                          <a:ea typeface="Cambria Math" panose="02040503050406030204" pitchFamily="18" charset="0"/>
-                        </a:rPr>
-                        <m:t>×14</m:t>
+                        <m:t>14×14</m:t>
                       </m:r>
                     </m:oMath>
                   </m:oMathPara>
@@ -19869,7 +19880,7 @@
             </p:txBody>
           </p:sp>
         </mc:Choice>
-        <mc:Fallback>
+        <mc:Fallback xmlns="">
           <p:sp>
             <p:nvSpPr>
               <p:cNvPr id="42" name="TextBox 41">
@@ -22670,8 +22681,8 @@
           </a:p>
         </p:txBody>
       </p:sp>
-      <mc:AlternateContent xmlns:mc="http://schemas.openxmlformats.org/markup-compatibility/2006">
-        <mc:Choice xmlns:a14="http://schemas.microsoft.com/office/drawing/2010/main" Requires="a14">
+      <mc:AlternateContent xmlns:mc="http://schemas.openxmlformats.org/markup-compatibility/2006" xmlns:a14="http://schemas.microsoft.com/office/drawing/2010/main">
+        <mc:Choice Requires="a14">
           <p:sp>
             <p:nvSpPr>
               <p:cNvPr id="144" name="TextBox 143">
@@ -22700,6 +22711,7 @@
               </a:bodyPr>
               <a:lstStyle/>
               <a:p>
+                <a:pPr/>
                 <a14:m>
                   <m:oMathPara xmlns:m="http://schemas.openxmlformats.org/officeDocument/2006/math">
                     <m:oMathParaPr>
@@ -22730,14 +22742,7 @@
                           <a:latin typeface="Cambria Math" panose="02040503050406030204" pitchFamily="18" charset="0"/>
                           <a:ea typeface="Cambria Math" panose="02040503050406030204" pitchFamily="18" charset="0"/>
                         </a:rPr>
-                        <m:t>14</m:t>
-                      </m:r>
-                      <m:r>
-                        <a:rPr lang="en-US" b="0" i="1" smtClean="0">
-                          <a:latin typeface="Cambria Math" panose="02040503050406030204" pitchFamily="18" charset="0"/>
-                          <a:ea typeface="Cambria Math" panose="02040503050406030204" pitchFamily="18" charset="0"/>
-                        </a:rPr>
-                        <m:t>×14</m:t>
+                        <m:t>14×14</m:t>
                       </m:r>
                     </m:oMath>
                   </m:oMathPara>
@@ -22747,7 +22752,7 @@
             </p:txBody>
           </p:sp>
         </mc:Choice>
-        <mc:Fallback>
+        <mc:Fallback xmlns="">
           <p:sp>
             <p:nvSpPr>
               <p:cNvPr id="144" name="TextBox 143">
@@ -22792,8 +22797,8 @@
           </p:sp>
         </mc:Fallback>
       </mc:AlternateContent>
-      <mc:AlternateContent xmlns:mc="http://schemas.openxmlformats.org/markup-compatibility/2006">
-        <mc:Choice xmlns:a14="http://schemas.microsoft.com/office/drawing/2010/main" Requires="a14">
+      <mc:AlternateContent xmlns:mc="http://schemas.openxmlformats.org/markup-compatibility/2006" xmlns:a14="http://schemas.microsoft.com/office/drawing/2010/main">
+        <mc:Choice Requires="a14">
           <p:sp>
             <p:nvSpPr>
               <p:cNvPr id="145" name="TextBox 144">
@@ -22822,6 +22827,7 @@
               </a:bodyPr>
               <a:lstStyle/>
               <a:p>
+                <a:pPr/>
                 <a14:m>
                   <m:oMathPara xmlns:m="http://schemas.openxmlformats.org/officeDocument/2006/math">
                     <m:oMathParaPr>
@@ -22852,14 +22858,7 @@
                           <a:latin typeface="Cambria Math" panose="02040503050406030204" pitchFamily="18" charset="0"/>
                           <a:ea typeface="Cambria Math" panose="02040503050406030204" pitchFamily="18" charset="0"/>
                         </a:rPr>
-                        <m:t>7</m:t>
-                      </m:r>
-                      <m:r>
-                        <a:rPr lang="en-US" b="0" i="1" smtClean="0">
-                          <a:latin typeface="Cambria Math" panose="02040503050406030204" pitchFamily="18" charset="0"/>
-                          <a:ea typeface="Cambria Math" panose="02040503050406030204" pitchFamily="18" charset="0"/>
-                        </a:rPr>
-                        <m:t>×7</m:t>
+                        <m:t>7×7</m:t>
                       </m:r>
                     </m:oMath>
                   </m:oMathPara>
@@ -22869,7 +22868,7 @@
             </p:txBody>
           </p:sp>
         </mc:Choice>
-        <mc:Fallback>
+        <mc:Fallback xmlns="">
           <p:sp>
             <p:nvSpPr>
               <p:cNvPr id="145" name="TextBox 144">
@@ -25320,8 +25319,8 @@
           </a:fontRef>
         </p:style>
       </p:cxnSp>
-      <mc:AlternateContent xmlns:mc="http://schemas.openxmlformats.org/markup-compatibility/2006">
-        <mc:Choice xmlns:a14="http://schemas.microsoft.com/office/drawing/2010/main" Requires="a14">
+      <mc:AlternateContent xmlns:mc="http://schemas.openxmlformats.org/markup-compatibility/2006" xmlns:a14="http://schemas.microsoft.com/office/drawing/2010/main">
+        <mc:Choice Requires="a14">
           <p:sp>
             <p:nvSpPr>
               <p:cNvPr id="227" name="TextBox 226">
@@ -25350,6 +25349,7 @@
               </a:bodyPr>
               <a:lstStyle/>
               <a:p>
+                <a:pPr/>
                 <a14:m>
                   <m:oMathPara xmlns:m="http://schemas.openxmlformats.org/officeDocument/2006/math">
                     <m:oMathParaPr>
@@ -25376,7 +25376,7 @@
             </p:txBody>
           </p:sp>
         </mc:Choice>
-        <mc:Fallback>
+        <mc:Fallback xmlns="">
           <p:sp>
             <p:nvSpPr>
               <p:cNvPr id="227" name="TextBox 226">
@@ -26132,21 +26132,6 @@
 </file>
 
 <file path=customXml/item1.xml><?xml version="1.0" encoding="utf-8"?>
-<?mso-contentType ?>
-<FormTemplates xmlns="http://schemas.microsoft.com/sharepoint/v3/contenttype/forms">
-  <Display>DocumentLibraryForm</Display>
-  <Edit>DocumentLibraryForm</Edit>
-  <New>DocumentLibraryForm</New>
-</FormTemplates>
-</file>
-
-<file path=customXml/item2.xml><?xml version="1.0" encoding="utf-8"?>
-<p:properties xmlns:p="http://schemas.microsoft.com/office/2006/metadata/properties" xmlns:xsi="http://www.w3.org/2001/XMLSchema-instance" xmlns:pc="http://schemas.microsoft.com/office/infopath/2007/PartnerControls">
-  <documentManagement/>
-</p:properties>
-</file>
-
-<file path=customXml/item3.xml><?xml version="1.0" encoding="utf-8"?>
 <ct:contentTypeSchema xmlns:ct="http://schemas.microsoft.com/office/2006/metadata/contentType" xmlns:ma="http://schemas.microsoft.com/office/2006/metadata/properties/metaAttributes" ct:_="" ma:_="" ma:contentTypeName="Document" ma:contentTypeID="0x010100E5E90CE7D835DF49A54E7D3F39A82871" ma:contentTypeVersion="10" ma:contentTypeDescription="Create a new document." ma:contentTypeScope="" ma:versionID="ecb1bcfb5513d0ca4ca2e29515166e3d">
   <xsd:schema xmlns:xsd="http://www.w3.org/2001/XMLSchema" xmlns:xs="http://www.w3.org/2001/XMLSchema" xmlns:p="http://schemas.microsoft.com/office/2006/metadata/properties" xmlns:ns3="bdd987ea-5e3c-4d73-ab5b-afe2844564b9" xmlns:ns4="8eab65b4-4232-441d-b263-cd52eab97547" targetNamespace="http://schemas.microsoft.com/office/2006/metadata/properties" ma:root="true" ma:fieldsID="1c60ee05aeafbf51a253cd522014a061" ns3:_="" ns4:_="">
     <xsd:import namespace="bdd987ea-5e3c-4d73-ab5b-afe2844564b9"/>
@@ -26349,32 +26334,22 @@
 </ct:contentTypeSchema>
 </file>
 
-<file path=customXml/itemProps1.xml><?xml version="1.0" encoding="utf-8"?>
-<ds:datastoreItem xmlns:ds="http://schemas.openxmlformats.org/officeDocument/2006/customXml" ds:itemID="{666DA301-B763-471A-885E-1C88D4229E18}">
-  <ds:schemaRefs>
-    <ds:schemaRef ds:uri="http://schemas.microsoft.com/sharepoint/v3/contenttype/forms"/>
-  </ds:schemaRefs>
-</ds:datastoreItem>
+<file path=customXml/item2.xml><?xml version="1.0" encoding="utf-8"?>
+<p:properties xmlns:p="http://schemas.microsoft.com/office/2006/metadata/properties" xmlns:xsi="http://www.w3.org/2001/XMLSchema-instance" xmlns:pc="http://schemas.microsoft.com/office/infopath/2007/PartnerControls">
+  <documentManagement/>
+</p:properties>
 </file>
 
-<file path=customXml/itemProps2.xml><?xml version="1.0" encoding="utf-8"?>
-<ds:datastoreItem xmlns:ds="http://schemas.openxmlformats.org/officeDocument/2006/customXml" ds:itemID="{4D827A59-C278-4924-A82B-D355207D07D3}">
-  <ds:schemaRefs>
-    <ds:schemaRef ds:uri="http://purl.org/dc/terms/"/>
-    <ds:schemaRef ds:uri="http://purl.org/dc/dcmitype/"/>
-    <ds:schemaRef ds:uri="http://purl.org/dc/elements/1.1/"/>
-    <ds:schemaRef ds:uri="http://schemas.microsoft.com/office/2006/metadata/properties"/>
-    <ds:schemaRef ds:uri="http://schemas.microsoft.com/office/2006/documentManagement/types"/>
-    <ds:schemaRef ds:uri="http://schemas.microsoft.com/office/infopath/2007/PartnerControls"/>
-    <ds:schemaRef ds:uri="8eab65b4-4232-441d-b263-cd52eab97547"/>
-    <ds:schemaRef ds:uri="http://schemas.openxmlformats.org/package/2006/metadata/core-properties"/>
-    <ds:schemaRef ds:uri="bdd987ea-5e3c-4d73-ab5b-afe2844564b9"/>
-    <ds:schemaRef ds:uri="http://www.w3.org/XML/1998/namespace"/>
-  </ds:schemaRefs>
-</ds:datastoreItem>
+<file path=customXml/item3.xml><?xml version="1.0" encoding="utf-8"?>
+<?mso-contentType ?>
+<FormTemplates xmlns="http://schemas.microsoft.com/sharepoint/v3/contenttype/forms">
+  <Display>DocumentLibraryForm</Display>
+  <Edit>DocumentLibraryForm</Edit>
+  <New>DocumentLibraryForm</New>
+</FormTemplates>
 </file>
 
-<file path=customXml/itemProps3.xml><?xml version="1.0" encoding="utf-8"?>
+<file path=customXml/itemProps1.xml><?xml version="1.0" encoding="utf-8"?>
 <ds:datastoreItem xmlns:ds="http://schemas.openxmlformats.org/officeDocument/2006/customXml" ds:itemID="{A4141BA4-1192-479A-9875-9E50B86A06A0}">
   <ds:schemaRefs>
     <ds:schemaRef ds:uri="http://schemas.microsoft.com/office/2006/metadata/contentType"/>
@@ -26391,4 +26366,29 @@
     <ds:schemaRef ds:uri="http://schemas.microsoft.com/internal/obd"/>
   </ds:schemaRefs>
 </ds:datastoreItem>
+</file>
+
+<file path=customXml/itemProps2.xml><?xml version="1.0" encoding="utf-8"?>
+<ds:datastoreItem xmlns:ds="http://schemas.openxmlformats.org/officeDocument/2006/customXml" ds:itemID="{4D827A59-C278-4924-A82B-D355207D07D3}">
+  <ds:schemaRefs>
+    <ds:schemaRef ds:uri="http://purl.org/dc/elements/1.1/"/>
+    <ds:schemaRef ds:uri="bdd987ea-5e3c-4d73-ab5b-afe2844564b9"/>
+    <ds:schemaRef ds:uri="http://purl.org/dc/terms/"/>
+    <ds:schemaRef ds:uri="http://purl.org/dc/dcmitype/"/>
+    <ds:schemaRef ds:uri="http://schemas.microsoft.com/office/2006/documentManagement/types"/>
+    <ds:schemaRef ds:uri="http://schemas.microsoft.com/office/infopath/2007/PartnerControls"/>
+    <ds:schemaRef ds:uri="http://schemas.openxmlformats.org/package/2006/metadata/core-properties"/>
+    <ds:schemaRef ds:uri="8eab65b4-4232-441d-b263-cd52eab97547"/>
+    <ds:schemaRef ds:uri="http://schemas.microsoft.com/office/2006/metadata/properties"/>
+    <ds:schemaRef ds:uri="http://www.w3.org/XML/1998/namespace"/>
+  </ds:schemaRefs>
+</ds:datastoreItem>
+</file>
+
+<file path=customXml/itemProps3.xml><?xml version="1.0" encoding="utf-8"?>
+<ds:datastoreItem xmlns:ds="http://schemas.openxmlformats.org/officeDocument/2006/customXml" ds:itemID="{666DA301-B763-471A-885E-1C88D4229E18}">
+  <ds:schemaRefs>
+    <ds:schemaRef ds:uri="http://schemas.microsoft.com/sharepoint/v3/contenttype/forms"/>
+  </ds:schemaRefs>
+</ds:datastoreItem>
 </file>
</xml_diff>

<commit_message>
PPT added and graph jupyter notebook added
</commit_message>
<xml_diff>
--- a/images/all_images.pptx
+++ b/images/all_images.pptx
@@ -12,6 +12,8 @@
     <p:sldId id="260" r:id="rId9"/>
     <p:sldId id="261" r:id="rId10"/>
     <p:sldId id="262" r:id="rId11"/>
+    <p:sldId id="263" r:id="rId12"/>
+    <p:sldId id="264" r:id="rId13"/>
   </p:sldIdLst>
   <p:sldSz cx="12192000" cy="6858000"/>
   <p:notesSz cx="6858000" cy="9144000"/>
@@ -1800,6 +1802,1020 @@
     </pc:docChg>
   </pc:docChgLst>
   <pc:docChgLst>
+    <pc:chgData name="Nath,D,Dipankar,JSN4 R" userId="68ef5e1d-3575-420b-8e94-66a68a391843" providerId="ADAL" clId="{57BCC521-4B82-43AE-A548-7B8B4F1C3972}"/>
+    <pc:docChg chg="undo custSel addSld modSld">
+      <pc:chgData name="Nath,D,Dipankar,JSN4 R" userId="68ef5e1d-3575-420b-8e94-66a68a391843" providerId="ADAL" clId="{57BCC521-4B82-43AE-A548-7B8B4F1C3972}" dt="2019-09-23T11:01:13.481" v="707" actId="20577"/>
+      <pc:docMkLst>
+        <pc:docMk/>
+      </pc:docMkLst>
+      <pc:sldChg chg="addSp delSp modSp">
+        <pc:chgData name="Nath,D,Dipankar,JSN4 R" userId="68ef5e1d-3575-420b-8e94-66a68a391843" providerId="ADAL" clId="{57BCC521-4B82-43AE-A548-7B8B4F1C3972}" dt="2019-09-22T07:42:57.036" v="16" actId="20577"/>
+        <pc:sldMkLst>
+          <pc:docMk/>
+          <pc:sldMk cId="1413392138" sldId="256"/>
+        </pc:sldMkLst>
+        <pc:spChg chg="mod">
+          <ac:chgData name="Nath,D,Dipankar,JSN4 R" userId="68ef5e1d-3575-420b-8e94-66a68a391843" providerId="ADAL" clId="{57BCC521-4B82-43AE-A548-7B8B4F1C3972}" dt="2019-09-22T07:31:22.918" v="1" actId="1076"/>
+          <ac:spMkLst>
+            <pc:docMk/>
+            <pc:sldMk cId="1413392138" sldId="256"/>
+            <ac:spMk id="2" creationId="{34E7EA03-B2A3-4337-8FA8-3854CDFD1694}"/>
+          </ac:spMkLst>
+        </pc:spChg>
+        <pc:spChg chg="mod">
+          <ac:chgData name="Nath,D,Dipankar,JSN4 R" userId="68ef5e1d-3575-420b-8e94-66a68a391843" providerId="ADAL" clId="{57BCC521-4B82-43AE-A548-7B8B4F1C3972}" dt="2019-09-22T07:42:16.109" v="4" actId="1076"/>
+          <ac:spMkLst>
+            <pc:docMk/>
+            <pc:sldMk cId="1413392138" sldId="256"/>
+            <ac:spMk id="8" creationId="{C2748455-0466-4CB9-A103-39F0C9E0DE8C}"/>
+          </ac:spMkLst>
+        </pc:spChg>
+        <pc:spChg chg="del">
+          <ac:chgData name="Nath,D,Dipankar,JSN4 R" userId="68ef5e1d-3575-420b-8e94-66a68a391843" providerId="ADAL" clId="{57BCC521-4B82-43AE-A548-7B8B4F1C3972}" dt="2019-09-22T07:42:08.282" v="3" actId="478"/>
+          <ac:spMkLst>
+            <pc:docMk/>
+            <pc:sldMk cId="1413392138" sldId="256"/>
+            <ac:spMk id="14" creationId="{4D56BF6D-A5F8-4D14-8797-8AFDE51D6952}"/>
+          </ac:spMkLst>
+        </pc:spChg>
+        <pc:spChg chg="del">
+          <ac:chgData name="Nath,D,Dipankar,JSN4 R" userId="68ef5e1d-3575-420b-8e94-66a68a391843" providerId="ADAL" clId="{57BCC521-4B82-43AE-A548-7B8B4F1C3972}" dt="2019-09-22T07:42:21.884" v="5" actId="478"/>
+          <ac:spMkLst>
+            <pc:docMk/>
+            <pc:sldMk cId="1413392138" sldId="256"/>
+            <ac:spMk id="15" creationId="{95F20935-0E89-4634-A503-7D7E4DDE3D9E}"/>
+          </ac:spMkLst>
+        </pc:spChg>
+        <pc:spChg chg="mod">
+          <ac:chgData name="Nath,D,Dipankar,JSN4 R" userId="68ef5e1d-3575-420b-8e94-66a68a391843" providerId="ADAL" clId="{57BCC521-4B82-43AE-A548-7B8B4F1C3972}" dt="2019-09-22T07:42:48.076" v="13" actId="20577"/>
+          <ac:spMkLst>
+            <pc:docMk/>
+            <pc:sldMk cId="1413392138" sldId="256"/>
+            <ac:spMk id="16" creationId="{BD906657-7720-4AC7-B53B-9F056D092227}"/>
+          </ac:spMkLst>
+        </pc:spChg>
+        <pc:spChg chg="mod">
+          <ac:chgData name="Nath,D,Dipankar,JSN4 R" userId="68ef5e1d-3575-420b-8e94-66a68a391843" providerId="ADAL" clId="{57BCC521-4B82-43AE-A548-7B8B4F1C3972}" dt="2019-09-22T07:42:57.036" v="16" actId="20577"/>
+          <ac:spMkLst>
+            <pc:docMk/>
+            <pc:sldMk cId="1413392138" sldId="256"/>
+            <ac:spMk id="17" creationId="{A4F4FFD8-A5B0-4FED-8E8D-26548960DD3E}"/>
+          </ac:spMkLst>
+        </pc:spChg>
+        <pc:spChg chg="add mod">
+          <ac:chgData name="Nath,D,Dipankar,JSN4 R" userId="68ef5e1d-3575-420b-8e94-66a68a391843" providerId="ADAL" clId="{57BCC521-4B82-43AE-A548-7B8B4F1C3972}" dt="2019-09-22T07:42:34.411" v="9" actId="20577"/>
+          <ac:spMkLst>
+            <pc:docMk/>
+            <pc:sldMk cId="1413392138" sldId="256"/>
+            <ac:spMk id="29" creationId="{0C1F6C98-9D18-4803-9D4A-010A3965F8EE}"/>
+          </ac:spMkLst>
+        </pc:spChg>
+        <pc:spChg chg="del">
+          <ac:chgData name="Nath,D,Dipankar,JSN4 R" userId="68ef5e1d-3575-420b-8e94-66a68a391843" providerId="ADAL" clId="{57BCC521-4B82-43AE-A548-7B8B4F1C3972}" dt="2019-09-22T07:31:10.627" v="0" actId="478"/>
+          <ac:spMkLst>
+            <pc:docMk/>
+            <pc:sldMk cId="1413392138" sldId="256"/>
+            <ac:spMk id="43" creationId="{7A79D8E1-5E24-4D62-A81F-0C457C02B725}"/>
+          </ac:spMkLst>
+        </pc:spChg>
+        <pc:cxnChg chg="mod">
+          <ac:chgData name="Nath,D,Dipankar,JSN4 R" userId="68ef5e1d-3575-420b-8e94-66a68a391843" providerId="ADAL" clId="{57BCC521-4B82-43AE-A548-7B8B4F1C3972}" dt="2019-09-22T07:31:43.547" v="2" actId="14100"/>
+          <ac:cxnSpMkLst>
+            <pc:docMk/>
+            <pc:sldMk cId="1413392138" sldId="256"/>
+            <ac:cxnSpMk id="37" creationId="{B87B5085-5F4A-4FA7-B2E1-B382455E2AC8}"/>
+          </ac:cxnSpMkLst>
+        </pc:cxnChg>
+      </pc:sldChg>
+      <pc:sldChg chg="addSp delSp modSp add">
+        <pc:chgData name="Nath,D,Dipankar,JSN4 R" userId="68ef5e1d-3575-420b-8e94-66a68a391843" providerId="ADAL" clId="{57BCC521-4B82-43AE-A548-7B8B4F1C3972}" dt="2019-09-23T11:01:13.481" v="707" actId="20577"/>
+        <pc:sldMkLst>
+          <pc:docMk/>
+          <pc:sldMk cId="2539858143" sldId="257"/>
+        </pc:sldMkLst>
+        <pc:spChg chg="mod">
+          <ac:chgData name="Nath,D,Dipankar,JSN4 R" userId="68ef5e1d-3575-420b-8e94-66a68a391843" providerId="ADAL" clId="{57BCC521-4B82-43AE-A548-7B8B4F1C3972}" dt="2019-09-23T11:00:14.035" v="675" actId="114"/>
+          <ac:spMkLst>
+            <pc:docMk/>
+            <pc:sldMk cId="2539858143" sldId="257"/>
+            <ac:spMk id="2" creationId="{34E7EA03-B2A3-4337-8FA8-3854CDFD1694}"/>
+          </ac:spMkLst>
+        </pc:spChg>
+        <pc:spChg chg="del">
+          <ac:chgData name="Nath,D,Dipankar,JSN4 R" userId="68ef5e1d-3575-420b-8e94-66a68a391843" providerId="ADAL" clId="{57BCC521-4B82-43AE-A548-7B8B4F1C3972}" dt="2019-09-23T06:29:12.892" v="18" actId="478"/>
+          <ac:spMkLst>
+            <pc:docMk/>
+            <pc:sldMk cId="2539858143" sldId="257"/>
+            <ac:spMk id="4" creationId="{D66223AA-9824-4FC5-908B-0A53C49D35D4}"/>
+          </ac:spMkLst>
+        </pc:spChg>
+        <pc:spChg chg="mod">
+          <ac:chgData name="Nath,D,Dipankar,JSN4 R" userId="68ef5e1d-3575-420b-8e94-66a68a391843" providerId="ADAL" clId="{57BCC521-4B82-43AE-A548-7B8B4F1C3972}" dt="2019-09-23T08:48:51.578" v="517" actId="1036"/>
+          <ac:spMkLst>
+            <pc:docMk/>
+            <pc:sldMk cId="2539858143" sldId="257"/>
+            <ac:spMk id="5" creationId="{64E72F56-5CC3-4D1C-BC04-ECBD7A1D4773}"/>
+          </ac:spMkLst>
+        </pc:spChg>
+        <pc:spChg chg="mod">
+          <ac:chgData name="Nath,D,Dipankar,JSN4 R" userId="68ef5e1d-3575-420b-8e94-66a68a391843" providerId="ADAL" clId="{57BCC521-4B82-43AE-A548-7B8B4F1C3972}" dt="2019-09-23T08:48:51.578" v="517" actId="1036"/>
+          <ac:spMkLst>
+            <pc:docMk/>
+            <pc:sldMk cId="2539858143" sldId="257"/>
+            <ac:spMk id="6" creationId="{488D355B-948F-47FC-BBCF-0B8EA172656C}"/>
+          </ac:spMkLst>
+        </pc:spChg>
+        <pc:spChg chg="mod">
+          <ac:chgData name="Nath,D,Dipankar,JSN4 R" userId="68ef5e1d-3575-420b-8e94-66a68a391843" providerId="ADAL" clId="{57BCC521-4B82-43AE-A548-7B8B4F1C3972}" dt="2019-09-23T08:48:51.578" v="517" actId="1036"/>
+          <ac:spMkLst>
+            <pc:docMk/>
+            <pc:sldMk cId="2539858143" sldId="257"/>
+            <ac:spMk id="7" creationId="{13DEF136-6826-4178-AD5A-CE65AECAE053}"/>
+          </ac:spMkLst>
+        </pc:spChg>
+        <pc:spChg chg="del">
+          <ac:chgData name="Nath,D,Dipankar,JSN4 R" userId="68ef5e1d-3575-420b-8e94-66a68a391843" providerId="ADAL" clId="{57BCC521-4B82-43AE-A548-7B8B4F1C3972}" dt="2019-09-23T06:29:12.892" v="18" actId="478"/>
+          <ac:spMkLst>
+            <pc:docMk/>
+            <pc:sldMk cId="2539858143" sldId="257"/>
+            <ac:spMk id="8" creationId="{C2748455-0466-4CB9-A103-39F0C9E0DE8C}"/>
+          </ac:spMkLst>
+        </pc:spChg>
+        <pc:spChg chg="del mod">
+          <ac:chgData name="Nath,D,Dipankar,JSN4 R" userId="68ef5e1d-3575-420b-8e94-66a68a391843" providerId="ADAL" clId="{57BCC521-4B82-43AE-A548-7B8B4F1C3972}" dt="2019-09-23T10:51:49.739" v="518" actId="478"/>
+          <ac:spMkLst>
+            <pc:docMk/>
+            <pc:sldMk cId="2539858143" sldId="257"/>
+            <ac:spMk id="13" creationId="{AADAAAA6-B721-44BF-8372-E8129AFCBF10}"/>
+          </ac:spMkLst>
+        </pc:spChg>
+        <pc:spChg chg="mod">
+          <ac:chgData name="Nath,D,Dipankar,JSN4 R" userId="68ef5e1d-3575-420b-8e94-66a68a391843" providerId="ADAL" clId="{57BCC521-4B82-43AE-A548-7B8B4F1C3972}" dt="2019-09-23T08:48:51.578" v="517" actId="1036"/>
+          <ac:spMkLst>
+            <pc:docMk/>
+            <pc:sldMk cId="2539858143" sldId="257"/>
+            <ac:spMk id="16" creationId="{BD906657-7720-4AC7-B53B-9F056D092227}"/>
+          </ac:spMkLst>
+        </pc:spChg>
+        <pc:spChg chg="mod">
+          <ac:chgData name="Nath,D,Dipankar,JSN4 R" userId="68ef5e1d-3575-420b-8e94-66a68a391843" providerId="ADAL" clId="{57BCC521-4B82-43AE-A548-7B8B4F1C3972}" dt="2019-09-23T08:48:51.578" v="517" actId="1036"/>
+          <ac:spMkLst>
+            <pc:docMk/>
+            <pc:sldMk cId="2539858143" sldId="257"/>
+            <ac:spMk id="17" creationId="{A4F4FFD8-A5B0-4FED-8E8D-26548960DD3E}"/>
+          </ac:spMkLst>
+        </pc:spChg>
+        <pc:spChg chg="add del">
+          <ac:chgData name="Nath,D,Dipankar,JSN4 R" userId="68ef5e1d-3575-420b-8e94-66a68a391843" providerId="ADAL" clId="{57BCC521-4B82-43AE-A548-7B8B4F1C3972}" dt="2019-09-23T06:29:56.742" v="86"/>
+          <ac:spMkLst>
+            <pc:docMk/>
+            <pc:sldMk cId="2539858143" sldId="257"/>
+            <ac:spMk id="26" creationId="{B2D389FA-5492-4182-9320-C3455F607CFE}"/>
+          </ac:spMkLst>
+        </pc:spChg>
+        <pc:spChg chg="add del">
+          <ac:chgData name="Nath,D,Dipankar,JSN4 R" userId="68ef5e1d-3575-420b-8e94-66a68a391843" providerId="ADAL" clId="{57BCC521-4B82-43AE-A548-7B8B4F1C3972}" dt="2019-09-23T06:29:56.742" v="86"/>
+          <ac:spMkLst>
+            <pc:docMk/>
+            <pc:sldMk cId="2539858143" sldId="257"/>
+            <ac:spMk id="27" creationId="{FD7FE0BD-63F3-4B98-8B35-4CCA0C6EAC4F}"/>
+          </ac:spMkLst>
+        </pc:spChg>
+        <pc:spChg chg="add del">
+          <ac:chgData name="Nath,D,Dipankar,JSN4 R" userId="68ef5e1d-3575-420b-8e94-66a68a391843" providerId="ADAL" clId="{57BCC521-4B82-43AE-A548-7B8B4F1C3972}" dt="2019-09-23T06:29:56.742" v="86"/>
+          <ac:spMkLst>
+            <pc:docMk/>
+            <pc:sldMk cId="2539858143" sldId="257"/>
+            <ac:spMk id="28" creationId="{3897E86C-5EE6-4852-A483-E6CBE3CD8F5A}"/>
+          </ac:spMkLst>
+        </pc:spChg>
+        <pc:spChg chg="mod">
+          <ac:chgData name="Nath,D,Dipankar,JSN4 R" userId="68ef5e1d-3575-420b-8e94-66a68a391843" providerId="ADAL" clId="{57BCC521-4B82-43AE-A548-7B8B4F1C3972}" dt="2019-09-23T08:48:51.578" v="517" actId="1036"/>
+          <ac:spMkLst>
+            <pc:docMk/>
+            <pc:sldMk cId="2539858143" sldId="257"/>
+            <ac:spMk id="29" creationId="{0C1F6C98-9D18-4803-9D4A-010A3965F8EE}"/>
+          </ac:spMkLst>
+        </pc:spChg>
+        <pc:spChg chg="add del">
+          <ac:chgData name="Nath,D,Dipankar,JSN4 R" userId="68ef5e1d-3575-420b-8e94-66a68a391843" providerId="ADAL" clId="{57BCC521-4B82-43AE-A548-7B8B4F1C3972}" dt="2019-09-23T06:29:56.742" v="86"/>
+          <ac:spMkLst>
+            <pc:docMk/>
+            <pc:sldMk cId="2539858143" sldId="257"/>
+            <ac:spMk id="30" creationId="{F0AA7496-2FAC-43CF-9837-E9CE7CBAE845}"/>
+          </ac:spMkLst>
+        </pc:spChg>
+        <pc:spChg chg="del">
+          <ac:chgData name="Nath,D,Dipankar,JSN4 R" userId="68ef5e1d-3575-420b-8e94-66a68a391843" providerId="ADAL" clId="{57BCC521-4B82-43AE-A548-7B8B4F1C3972}" dt="2019-09-23T06:29:12.892" v="18" actId="478"/>
+          <ac:spMkLst>
+            <pc:docMk/>
+            <pc:sldMk cId="2539858143" sldId="257"/>
+            <ac:spMk id="31" creationId="{AB7401FE-5AC9-436F-9BF4-F929F445F68E}"/>
+          </ac:spMkLst>
+        </pc:spChg>
+        <pc:spChg chg="mod">
+          <ac:chgData name="Nath,D,Dipankar,JSN4 R" userId="68ef5e1d-3575-420b-8e94-66a68a391843" providerId="ADAL" clId="{57BCC521-4B82-43AE-A548-7B8B4F1C3972}" dt="2019-09-23T10:59:26.375" v="659" actId="1076"/>
+          <ac:spMkLst>
+            <pc:docMk/>
+            <pc:sldMk cId="2539858143" sldId="257"/>
+            <ac:spMk id="32" creationId="{64A260CF-4BDC-4678-AAD1-0A6748665567}"/>
+          </ac:spMkLst>
+        </pc:spChg>
+        <pc:spChg chg="del mod">
+          <ac:chgData name="Nath,D,Dipankar,JSN4 R" userId="68ef5e1d-3575-420b-8e94-66a68a391843" providerId="ADAL" clId="{57BCC521-4B82-43AE-A548-7B8B4F1C3972}" dt="2019-09-23T10:59:14.360" v="657" actId="478"/>
+          <ac:spMkLst>
+            <pc:docMk/>
+            <pc:sldMk cId="2539858143" sldId="257"/>
+            <ac:spMk id="33" creationId="{36F942B9-5371-4426-AF4C-C53ABEA65550}"/>
+          </ac:spMkLst>
+        </pc:spChg>
+        <pc:spChg chg="del mod">
+          <ac:chgData name="Nath,D,Dipankar,JSN4 R" userId="68ef5e1d-3575-420b-8e94-66a68a391843" providerId="ADAL" clId="{57BCC521-4B82-43AE-A548-7B8B4F1C3972}" dt="2019-09-23T10:59:29.560" v="660" actId="478"/>
+          <ac:spMkLst>
+            <pc:docMk/>
+            <pc:sldMk cId="2539858143" sldId="257"/>
+            <ac:spMk id="34" creationId="{740F9285-6E61-44D5-B5E6-7998B7AAF212}"/>
+          </ac:spMkLst>
+        </pc:spChg>
+        <pc:spChg chg="del mod">
+          <ac:chgData name="Nath,D,Dipankar,JSN4 R" userId="68ef5e1d-3575-420b-8e94-66a68a391843" providerId="ADAL" clId="{57BCC521-4B82-43AE-A548-7B8B4F1C3972}" dt="2019-09-23T10:56:37.079" v="636" actId="478"/>
+          <ac:spMkLst>
+            <pc:docMk/>
+            <pc:sldMk cId="2539858143" sldId="257"/>
+            <ac:spMk id="35" creationId="{EF2CF209-B2C6-49A3-A921-CAB5AE58AC20}"/>
+          </ac:spMkLst>
+        </pc:spChg>
+        <pc:spChg chg="add del">
+          <ac:chgData name="Nath,D,Dipankar,JSN4 R" userId="68ef5e1d-3575-420b-8e94-66a68a391843" providerId="ADAL" clId="{57BCC521-4B82-43AE-A548-7B8B4F1C3972}" dt="2019-09-23T06:29:56.742" v="86"/>
+          <ac:spMkLst>
+            <pc:docMk/>
+            <pc:sldMk cId="2539858143" sldId="257"/>
+            <ac:spMk id="36" creationId="{61CFDFC2-8D31-4493-8C0A-A8CDCFA1CFFF}"/>
+          </ac:spMkLst>
+        </pc:spChg>
+        <pc:spChg chg="add del">
+          <ac:chgData name="Nath,D,Dipankar,JSN4 R" userId="68ef5e1d-3575-420b-8e94-66a68a391843" providerId="ADAL" clId="{57BCC521-4B82-43AE-A548-7B8B4F1C3972}" dt="2019-09-23T06:29:56.742" v="86"/>
+          <ac:spMkLst>
+            <pc:docMk/>
+            <pc:sldMk cId="2539858143" sldId="257"/>
+            <ac:spMk id="38" creationId="{D74A7A91-9255-4405-89D7-7AF18991DA25}"/>
+          </ac:spMkLst>
+        </pc:spChg>
+        <pc:spChg chg="add mod">
+          <ac:chgData name="Nath,D,Dipankar,JSN4 R" userId="68ef5e1d-3575-420b-8e94-66a68a391843" providerId="ADAL" clId="{57BCC521-4B82-43AE-A548-7B8B4F1C3972}" dt="2019-09-23T06:59:18.526" v="270" actId="1037"/>
+          <ac:spMkLst>
+            <pc:docMk/>
+            <pc:sldMk cId="2539858143" sldId="257"/>
+            <ac:spMk id="39" creationId="{6AE01B17-E02D-4B0C-9413-5383BE6A78AD}"/>
+          </ac:spMkLst>
+        </pc:spChg>
+        <pc:spChg chg="add mod">
+          <ac:chgData name="Nath,D,Dipankar,JSN4 R" userId="68ef5e1d-3575-420b-8e94-66a68a391843" providerId="ADAL" clId="{57BCC521-4B82-43AE-A548-7B8B4F1C3972}" dt="2019-09-23T06:59:18.526" v="270" actId="1037"/>
+          <ac:spMkLst>
+            <pc:docMk/>
+            <pc:sldMk cId="2539858143" sldId="257"/>
+            <ac:spMk id="40" creationId="{5B1C2100-88BD-413B-81F9-786A219B90D0}"/>
+          </ac:spMkLst>
+        </pc:spChg>
+        <pc:spChg chg="add mod">
+          <ac:chgData name="Nath,D,Dipankar,JSN4 R" userId="68ef5e1d-3575-420b-8e94-66a68a391843" providerId="ADAL" clId="{57BCC521-4B82-43AE-A548-7B8B4F1C3972}" dt="2019-09-23T06:59:18.526" v="270" actId="1037"/>
+          <ac:spMkLst>
+            <pc:docMk/>
+            <pc:sldMk cId="2539858143" sldId="257"/>
+            <ac:spMk id="41" creationId="{EB7C1DDD-32DC-48A0-8F46-83368F07CEEF}"/>
+          </ac:spMkLst>
+        </pc:spChg>
+        <pc:spChg chg="add mod">
+          <ac:chgData name="Nath,D,Dipankar,JSN4 R" userId="68ef5e1d-3575-420b-8e94-66a68a391843" providerId="ADAL" clId="{57BCC521-4B82-43AE-A548-7B8B4F1C3972}" dt="2019-09-23T06:59:18.526" v="270" actId="1037"/>
+          <ac:spMkLst>
+            <pc:docMk/>
+            <pc:sldMk cId="2539858143" sldId="257"/>
+            <ac:spMk id="42" creationId="{3E444187-2910-4152-9516-2F66FD05E8BF}"/>
+          </ac:spMkLst>
+        </pc:spChg>
+        <pc:spChg chg="add mod">
+          <ac:chgData name="Nath,D,Dipankar,JSN4 R" userId="68ef5e1d-3575-420b-8e94-66a68a391843" providerId="ADAL" clId="{57BCC521-4B82-43AE-A548-7B8B4F1C3972}" dt="2019-09-23T06:59:18.526" v="270" actId="1037"/>
+          <ac:spMkLst>
+            <pc:docMk/>
+            <pc:sldMk cId="2539858143" sldId="257"/>
+            <ac:spMk id="43" creationId="{7A14D1C7-612D-44ED-9C42-11C268E74308}"/>
+          </ac:spMkLst>
+        </pc:spChg>
+        <pc:spChg chg="add mod">
+          <ac:chgData name="Nath,D,Dipankar,JSN4 R" userId="68ef5e1d-3575-420b-8e94-66a68a391843" providerId="ADAL" clId="{57BCC521-4B82-43AE-A548-7B8B4F1C3972}" dt="2019-09-23T06:59:18.526" v="270" actId="1037"/>
+          <ac:spMkLst>
+            <pc:docMk/>
+            <pc:sldMk cId="2539858143" sldId="257"/>
+            <ac:spMk id="44" creationId="{DD43DEC2-0FAE-4740-BD8E-A6C06F36A528}"/>
+          </ac:spMkLst>
+        </pc:spChg>
+        <pc:spChg chg="add mod">
+          <ac:chgData name="Nath,D,Dipankar,JSN4 R" userId="68ef5e1d-3575-420b-8e94-66a68a391843" providerId="ADAL" clId="{57BCC521-4B82-43AE-A548-7B8B4F1C3972}" dt="2019-09-23T06:59:18.526" v="270" actId="1037"/>
+          <ac:spMkLst>
+            <pc:docMk/>
+            <pc:sldMk cId="2539858143" sldId="257"/>
+            <ac:spMk id="45" creationId="{238A7B8E-095F-488F-8D1E-B5ABC2880FA8}"/>
+          </ac:spMkLst>
+        </pc:spChg>
+        <pc:spChg chg="add mod">
+          <ac:chgData name="Nath,D,Dipankar,JSN4 R" userId="68ef5e1d-3575-420b-8e94-66a68a391843" providerId="ADAL" clId="{57BCC521-4B82-43AE-A548-7B8B4F1C3972}" dt="2019-09-23T06:59:18.526" v="270" actId="1037"/>
+          <ac:spMkLst>
+            <pc:docMk/>
+            <pc:sldMk cId="2539858143" sldId="257"/>
+            <ac:spMk id="46" creationId="{45FB0751-943B-41E1-8175-68A81C9C6004}"/>
+          </ac:spMkLst>
+        </pc:spChg>
+        <pc:spChg chg="add del mod">
+          <ac:chgData name="Nath,D,Dipankar,JSN4 R" userId="68ef5e1d-3575-420b-8e94-66a68a391843" providerId="ADAL" clId="{57BCC521-4B82-43AE-A548-7B8B4F1C3972}" dt="2019-09-23T10:58:11.543" v="650" actId="478"/>
+          <ac:spMkLst>
+            <pc:docMk/>
+            <pc:sldMk cId="2539858143" sldId="257"/>
+            <ac:spMk id="85" creationId="{FC52DCEF-1309-4EFA-BDC2-16193D95502C}"/>
+          </ac:spMkLst>
+        </pc:spChg>
+        <pc:spChg chg="add mod">
+          <ac:chgData name="Nath,D,Dipankar,JSN4 R" userId="68ef5e1d-3575-420b-8e94-66a68a391843" providerId="ADAL" clId="{57BCC521-4B82-43AE-A548-7B8B4F1C3972}" dt="2019-09-23T10:53:08.833" v="527" actId="1076"/>
+          <ac:spMkLst>
+            <pc:docMk/>
+            <pc:sldMk cId="2539858143" sldId="257"/>
+            <ac:spMk id="103" creationId="{79A2E817-A7FB-4BAB-88ED-0EC14AF76E8D}"/>
+          </ac:spMkLst>
+        </pc:spChg>
+        <pc:spChg chg="add mod">
+          <ac:chgData name="Nath,D,Dipankar,JSN4 R" userId="68ef5e1d-3575-420b-8e94-66a68a391843" providerId="ADAL" clId="{57BCC521-4B82-43AE-A548-7B8B4F1C3972}" dt="2019-09-23T10:53:20.791" v="529" actId="1076"/>
+          <ac:spMkLst>
+            <pc:docMk/>
+            <pc:sldMk cId="2539858143" sldId="257"/>
+            <ac:spMk id="104" creationId="{A0A5B050-B229-4620-9977-2ADCDABEF20E}"/>
+          </ac:spMkLst>
+        </pc:spChg>
+        <pc:spChg chg="add mod">
+          <ac:chgData name="Nath,D,Dipankar,JSN4 R" userId="68ef5e1d-3575-420b-8e94-66a68a391843" providerId="ADAL" clId="{57BCC521-4B82-43AE-A548-7B8B4F1C3972}" dt="2019-09-23T10:53:33.840" v="531" actId="1076"/>
+          <ac:spMkLst>
+            <pc:docMk/>
+            <pc:sldMk cId="2539858143" sldId="257"/>
+            <ac:spMk id="113" creationId="{3085BBF0-E1CF-4D6E-85DC-365D9C558D22}"/>
+          </ac:spMkLst>
+        </pc:spChg>
+        <pc:spChg chg="add del mod">
+          <ac:chgData name="Nath,D,Dipankar,JSN4 R" userId="68ef5e1d-3575-420b-8e94-66a68a391843" providerId="ADAL" clId="{57BCC521-4B82-43AE-A548-7B8B4F1C3972}" dt="2019-09-23T10:56:17.229" v="631" actId="478"/>
+          <ac:spMkLst>
+            <pc:docMk/>
+            <pc:sldMk cId="2539858143" sldId="257"/>
+            <ac:spMk id="140" creationId="{38CD408A-FE41-4A76-80BE-BB558ECC853A}"/>
+          </ac:spMkLst>
+        </pc:spChg>
+        <pc:spChg chg="add del mod">
+          <ac:chgData name="Nath,D,Dipankar,JSN4 R" userId="68ef5e1d-3575-420b-8e94-66a68a391843" providerId="ADAL" clId="{57BCC521-4B82-43AE-A548-7B8B4F1C3972}" dt="2019-09-23T10:56:11.100" v="630"/>
+          <ac:spMkLst>
+            <pc:docMk/>
+            <pc:sldMk cId="2539858143" sldId="257"/>
+            <ac:spMk id="147" creationId="{22ACFE5A-9F5A-499F-B66A-78BA3419C1A9}"/>
+          </ac:spMkLst>
+        </pc:spChg>
+        <pc:spChg chg="add mod">
+          <ac:chgData name="Nath,D,Dipankar,JSN4 R" userId="68ef5e1d-3575-420b-8e94-66a68a391843" providerId="ADAL" clId="{57BCC521-4B82-43AE-A548-7B8B4F1C3972}" dt="2019-09-23T11:00:20.106" v="676" actId="20577"/>
+          <ac:spMkLst>
+            <pc:docMk/>
+            <pc:sldMk cId="2539858143" sldId="257"/>
+            <ac:spMk id="149" creationId="{70E3A410-420D-409A-B570-37A7A3D5DCFD}"/>
+          </ac:spMkLst>
+        </pc:spChg>
+        <pc:spChg chg="add del mod">
+          <ac:chgData name="Nath,D,Dipankar,JSN4 R" userId="68ef5e1d-3575-420b-8e94-66a68a391843" providerId="ADAL" clId="{57BCC521-4B82-43AE-A548-7B8B4F1C3972}" dt="2019-09-23T10:58:13.163" v="651" actId="478"/>
+          <ac:spMkLst>
+            <pc:docMk/>
+            <pc:sldMk cId="2539858143" sldId="257"/>
+            <ac:spMk id="150" creationId="{FDFCA58B-BE7C-41FF-9D4E-FD51125EC100}"/>
+          </ac:spMkLst>
+        </pc:spChg>
+        <pc:spChg chg="add mod">
+          <ac:chgData name="Nath,D,Dipankar,JSN4 R" userId="68ef5e1d-3575-420b-8e94-66a68a391843" providerId="ADAL" clId="{57BCC521-4B82-43AE-A548-7B8B4F1C3972}" dt="2019-09-23T11:00:23.374" v="677" actId="20577"/>
+          <ac:spMkLst>
+            <pc:docMk/>
+            <pc:sldMk cId="2539858143" sldId="257"/>
+            <ac:spMk id="158" creationId="{3302CDF6-5908-463A-94AC-CF8F267D03CD}"/>
+          </ac:spMkLst>
+        </pc:spChg>
+        <pc:spChg chg="add del mod">
+          <ac:chgData name="Nath,D,Dipankar,JSN4 R" userId="68ef5e1d-3575-420b-8e94-66a68a391843" providerId="ADAL" clId="{57BCC521-4B82-43AE-A548-7B8B4F1C3972}" dt="2019-09-23T10:58:14.928" v="652" actId="478"/>
+          <ac:spMkLst>
+            <pc:docMk/>
+            <pc:sldMk cId="2539858143" sldId="257"/>
+            <ac:spMk id="159" creationId="{E6FE4651-D741-495D-92F3-74EE20188833}"/>
+          </ac:spMkLst>
+        </pc:spChg>
+        <pc:spChg chg="add mod">
+          <ac:chgData name="Nath,D,Dipankar,JSN4 R" userId="68ef5e1d-3575-420b-8e94-66a68a391843" providerId="ADAL" clId="{57BCC521-4B82-43AE-A548-7B8B4F1C3972}" dt="2019-09-23T10:57:45.595" v="641" actId="20577"/>
+          <ac:spMkLst>
+            <pc:docMk/>
+            <pc:sldMk cId="2539858143" sldId="257"/>
+            <ac:spMk id="166" creationId="{B6C0BDB7-7EED-41CC-B57A-267CD431FC5A}"/>
+          </ac:spMkLst>
+        </pc:spChg>
+        <pc:spChg chg="add mod">
+          <ac:chgData name="Nath,D,Dipankar,JSN4 R" userId="68ef5e1d-3575-420b-8e94-66a68a391843" providerId="ADAL" clId="{57BCC521-4B82-43AE-A548-7B8B4F1C3972}" dt="2019-09-23T10:57:55.579" v="645" actId="20577"/>
+          <ac:spMkLst>
+            <pc:docMk/>
+            <pc:sldMk cId="2539858143" sldId="257"/>
+            <ac:spMk id="167" creationId="{A0807527-8900-4352-A6F4-3B0581078FE9}"/>
+          </ac:spMkLst>
+        </pc:spChg>
+        <pc:spChg chg="add mod">
+          <ac:chgData name="Nath,D,Dipankar,JSN4 R" userId="68ef5e1d-3575-420b-8e94-66a68a391843" providerId="ADAL" clId="{57BCC521-4B82-43AE-A548-7B8B4F1C3972}" dt="2019-09-23T10:58:06.347" v="649" actId="20577"/>
+          <ac:spMkLst>
+            <pc:docMk/>
+            <pc:sldMk cId="2539858143" sldId="257"/>
+            <ac:spMk id="168" creationId="{C8A7EA2A-0518-48C9-8E0E-EF78914A3C61}"/>
+          </ac:spMkLst>
+        </pc:spChg>
+        <pc:spChg chg="add mod">
+          <ac:chgData name="Nath,D,Dipankar,JSN4 R" userId="68ef5e1d-3575-420b-8e94-66a68a391843" providerId="ADAL" clId="{57BCC521-4B82-43AE-A548-7B8B4F1C3972}" dt="2019-09-23T10:59:40.139" v="666" actId="20577"/>
+          <ac:spMkLst>
+            <pc:docMk/>
+            <pc:sldMk cId="2539858143" sldId="257"/>
+            <ac:spMk id="169" creationId="{CD9134E1-0CA4-4258-93ED-2B91293C274F}"/>
+          </ac:spMkLst>
+        </pc:spChg>
+        <pc:spChg chg="add mod">
+          <ac:chgData name="Nath,D,Dipankar,JSN4 R" userId="68ef5e1d-3575-420b-8e94-66a68a391843" providerId="ADAL" clId="{57BCC521-4B82-43AE-A548-7B8B4F1C3972}" dt="2019-09-23T10:59:51.135" v="669" actId="20577"/>
+          <ac:spMkLst>
+            <pc:docMk/>
+            <pc:sldMk cId="2539858143" sldId="257"/>
+            <ac:spMk id="170" creationId="{671AFC6B-6AB0-469E-9026-FB0CD9341919}"/>
+          </ac:spMkLst>
+        </pc:spChg>
+        <pc:spChg chg="add mod">
+          <ac:chgData name="Nath,D,Dipankar,JSN4 R" userId="68ef5e1d-3575-420b-8e94-66a68a391843" providerId="ADAL" clId="{57BCC521-4B82-43AE-A548-7B8B4F1C3972}" dt="2019-09-23T11:01:13.481" v="707" actId="20577"/>
+          <ac:spMkLst>
+            <pc:docMk/>
+            <pc:sldMk cId="2539858143" sldId="257"/>
+            <ac:spMk id="171" creationId="{9917BE89-DD91-4E22-8ABC-ED1F24EA611B}"/>
+          </ac:spMkLst>
+        </pc:spChg>
+        <pc:cxnChg chg="mod">
+          <ac:chgData name="Nath,D,Dipankar,JSN4 R" userId="68ef5e1d-3575-420b-8e94-66a68a391843" providerId="ADAL" clId="{57BCC521-4B82-43AE-A548-7B8B4F1C3972}" dt="2019-09-23T08:48:51.578" v="517" actId="1036"/>
+          <ac:cxnSpMkLst>
+            <pc:docMk/>
+            <pc:sldMk cId="2539858143" sldId="257"/>
+            <ac:cxnSpMk id="9" creationId="{A27A610E-D81C-410B-93C3-D2935C3EF2A9}"/>
+          </ac:cxnSpMkLst>
+        </pc:cxnChg>
+        <pc:cxnChg chg="mod">
+          <ac:chgData name="Nath,D,Dipankar,JSN4 R" userId="68ef5e1d-3575-420b-8e94-66a68a391843" providerId="ADAL" clId="{57BCC521-4B82-43AE-A548-7B8B4F1C3972}" dt="2019-09-23T08:48:51.578" v="517" actId="1036"/>
+          <ac:cxnSpMkLst>
+            <pc:docMk/>
+            <pc:sldMk cId="2539858143" sldId="257"/>
+            <ac:cxnSpMk id="10" creationId="{6C08CEB9-2558-400F-A206-61AAC2738734}"/>
+          </ac:cxnSpMkLst>
+        </pc:cxnChg>
+        <pc:cxnChg chg="mod">
+          <ac:chgData name="Nath,D,Dipankar,JSN4 R" userId="68ef5e1d-3575-420b-8e94-66a68a391843" providerId="ADAL" clId="{57BCC521-4B82-43AE-A548-7B8B4F1C3972}" dt="2019-09-23T08:48:51.578" v="517" actId="1036"/>
+          <ac:cxnSpMkLst>
+            <pc:docMk/>
+            <pc:sldMk cId="2539858143" sldId="257"/>
+            <ac:cxnSpMk id="11" creationId="{D4ADC2EB-E9D0-4137-ADF5-FCBA474253A5}"/>
+          </ac:cxnSpMkLst>
+        </pc:cxnChg>
+        <pc:cxnChg chg="del">
+          <ac:chgData name="Nath,D,Dipankar,JSN4 R" userId="68ef5e1d-3575-420b-8e94-66a68a391843" providerId="ADAL" clId="{57BCC521-4B82-43AE-A548-7B8B4F1C3972}" dt="2019-09-23T06:29:12.892" v="18" actId="478"/>
+          <ac:cxnSpMkLst>
+            <pc:docMk/>
+            <pc:sldMk cId="2539858143" sldId="257"/>
+            <ac:cxnSpMk id="12" creationId="{D3F4EFF1-BDDD-4495-A99B-0752FF874922}"/>
+          </ac:cxnSpMkLst>
+        </pc:cxnChg>
+        <pc:cxnChg chg="mod">
+          <ac:chgData name="Nath,D,Dipankar,JSN4 R" userId="68ef5e1d-3575-420b-8e94-66a68a391843" providerId="ADAL" clId="{57BCC521-4B82-43AE-A548-7B8B4F1C3972}" dt="2019-09-23T08:48:51.578" v="517" actId="1036"/>
+          <ac:cxnSpMkLst>
+            <pc:docMk/>
+            <pc:sldMk cId="2539858143" sldId="257"/>
+            <ac:cxnSpMk id="18" creationId="{84D61050-D4C0-4AA8-9FFF-BDC8F533FB20}"/>
+          </ac:cxnSpMkLst>
+        </pc:cxnChg>
+        <pc:cxnChg chg="del mod">
+          <ac:chgData name="Nath,D,Dipankar,JSN4 R" userId="68ef5e1d-3575-420b-8e94-66a68a391843" providerId="ADAL" clId="{57BCC521-4B82-43AE-A548-7B8B4F1C3972}" dt="2019-09-23T06:29:30.832" v="49" actId="478"/>
+          <ac:cxnSpMkLst>
+            <pc:docMk/>
+            <pc:sldMk cId="2539858143" sldId="257"/>
+            <ac:cxnSpMk id="21" creationId="{0AE5445B-B05C-4DC2-B0A4-5B5E830FE310}"/>
+          </ac:cxnSpMkLst>
+        </pc:cxnChg>
+        <pc:cxnChg chg="del mod">
+          <ac:chgData name="Nath,D,Dipankar,JSN4 R" userId="68ef5e1d-3575-420b-8e94-66a68a391843" providerId="ADAL" clId="{57BCC521-4B82-43AE-A548-7B8B4F1C3972}" dt="2019-09-23T06:29:31.658" v="50" actId="478"/>
+          <ac:cxnSpMkLst>
+            <pc:docMk/>
+            <pc:sldMk cId="2539858143" sldId="257"/>
+            <ac:cxnSpMk id="23" creationId="{F22A3EE4-9970-4E37-8A9B-B916583D489B}"/>
+          </ac:cxnSpMkLst>
+        </pc:cxnChg>
+        <pc:cxnChg chg="del mod">
+          <ac:chgData name="Nath,D,Dipankar,JSN4 R" userId="68ef5e1d-3575-420b-8e94-66a68a391843" providerId="ADAL" clId="{57BCC521-4B82-43AE-A548-7B8B4F1C3972}" dt="2019-09-23T06:29:32.554" v="51" actId="478"/>
+          <ac:cxnSpMkLst>
+            <pc:docMk/>
+            <pc:sldMk cId="2539858143" sldId="257"/>
+            <ac:cxnSpMk id="25" creationId="{39EFF91E-4F63-4A5D-B5CF-8C36587FC3B0}"/>
+          </ac:cxnSpMkLst>
+        </pc:cxnChg>
+        <pc:cxnChg chg="mod">
+          <ac:chgData name="Nath,D,Dipankar,JSN4 R" userId="68ef5e1d-3575-420b-8e94-66a68a391843" providerId="ADAL" clId="{57BCC521-4B82-43AE-A548-7B8B4F1C3972}" dt="2019-09-23T10:55:52.345" v="559" actId="1076"/>
+          <ac:cxnSpMkLst>
+            <pc:docMk/>
+            <pc:sldMk cId="2539858143" sldId="257"/>
+            <ac:cxnSpMk id="37" creationId="{B87B5085-5F4A-4FA7-B2E1-B382455E2AC8}"/>
+          </ac:cxnSpMkLst>
+        </pc:cxnChg>
+        <pc:cxnChg chg="add mod">
+          <ac:chgData name="Nath,D,Dipankar,JSN4 R" userId="68ef5e1d-3575-420b-8e94-66a68a391843" providerId="ADAL" clId="{57BCC521-4B82-43AE-A548-7B8B4F1C3972}" dt="2019-09-23T08:48:51.578" v="517" actId="1036"/>
+          <ac:cxnSpMkLst>
+            <pc:docMk/>
+            <pc:sldMk cId="2539858143" sldId="257"/>
+            <ac:cxnSpMk id="47" creationId="{8516F72E-D7A2-4864-AD6C-8E4B73AAF615}"/>
+          </ac:cxnSpMkLst>
+        </pc:cxnChg>
+        <pc:cxnChg chg="add mod">
+          <ac:chgData name="Nath,D,Dipankar,JSN4 R" userId="68ef5e1d-3575-420b-8e94-66a68a391843" providerId="ADAL" clId="{57BCC521-4B82-43AE-A548-7B8B4F1C3972}" dt="2019-09-23T08:48:51.578" v="517" actId="1036"/>
+          <ac:cxnSpMkLst>
+            <pc:docMk/>
+            <pc:sldMk cId="2539858143" sldId="257"/>
+            <ac:cxnSpMk id="48" creationId="{E96B446A-6A8F-4FF1-823B-C1CDE3F40292}"/>
+          </ac:cxnSpMkLst>
+        </pc:cxnChg>
+        <pc:cxnChg chg="add mod">
+          <ac:chgData name="Nath,D,Dipankar,JSN4 R" userId="68ef5e1d-3575-420b-8e94-66a68a391843" providerId="ADAL" clId="{57BCC521-4B82-43AE-A548-7B8B4F1C3972}" dt="2019-09-23T08:48:51.578" v="517" actId="1036"/>
+          <ac:cxnSpMkLst>
+            <pc:docMk/>
+            <pc:sldMk cId="2539858143" sldId="257"/>
+            <ac:cxnSpMk id="49" creationId="{19438947-4292-4E0D-8FFA-61015F24CDCE}"/>
+          </ac:cxnSpMkLst>
+        </pc:cxnChg>
+        <pc:cxnChg chg="add mod">
+          <ac:chgData name="Nath,D,Dipankar,JSN4 R" userId="68ef5e1d-3575-420b-8e94-66a68a391843" providerId="ADAL" clId="{57BCC521-4B82-43AE-A548-7B8B4F1C3972}" dt="2019-09-23T08:48:51.578" v="517" actId="1036"/>
+          <ac:cxnSpMkLst>
+            <pc:docMk/>
+            <pc:sldMk cId="2539858143" sldId="257"/>
+            <ac:cxnSpMk id="51" creationId="{1AFF5E69-64EB-4BB3-8EC7-76D3BD5D5646}"/>
+          </ac:cxnSpMkLst>
+        </pc:cxnChg>
+        <pc:cxnChg chg="add mod">
+          <ac:chgData name="Nath,D,Dipankar,JSN4 R" userId="68ef5e1d-3575-420b-8e94-66a68a391843" providerId="ADAL" clId="{57BCC521-4B82-43AE-A548-7B8B4F1C3972}" dt="2019-09-23T08:48:51.578" v="517" actId="1036"/>
+          <ac:cxnSpMkLst>
+            <pc:docMk/>
+            <pc:sldMk cId="2539858143" sldId="257"/>
+            <ac:cxnSpMk id="54" creationId="{AED91834-1D44-4ED2-858F-FA5F354E490A}"/>
+          </ac:cxnSpMkLst>
+        </pc:cxnChg>
+        <pc:cxnChg chg="add mod">
+          <ac:chgData name="Nath,D,Dipankar,JSN4 R" userId="68ef5e1d-3575-420b-8e94-66a68a391843" providerId="ADAL" clId="{57BCC521-4B82-43AE-A548-7B8B4F1C3972}" dt="2019-09-23T08:48:51.578" v="517" actId="1036"/>
+          <ac:cxnSpMkLst>
+            <pc:docMk/>
+            <pc:sldMk cId="2539858143" sldId="257"/>
+            <ac:cxnSpMk id="57" creationId="{C6A9087B-88A7-4633-B02A-516A1A4738E9}"/>
+          </ac:cxnSpMkLst>
+        </pc:cxnChg>
+        <pc:cxnChg chg="add mod">
+          <ac:chgData name="Nath,D,Dipankar,JSN4 R" userId="68ef5e1d-3575-420b-8e94-66a68a391843" providerId="ADAL" clId="{57BCC521-4B82-43AE-A548-7B8B4F1C3972}" dt="2019-09-23T08:48:51.578" v="517" actId="1036"/>
+          <ac:cxnSpMkLst>
+            <pc:docMk/>
+            <pc:sldMk cId="2539858143" sldId="257"/>
+            <ac:cxnSpMk id="60" creationId="{D92A2F1F-10D0-4ABF-B195-70646AA6ECB6}"/>
+          </ac:cxnSpMkLst>
+        </pc:cxnChg>
+        <pc:cxnChg chg="add mod">
+          <ac:chgData name="Nath,D,Dipankar,JSN4 R" userId="68ef5e1d-3575-420b-8e94-66a68a391843" providerId="ADAL" clId="{57BCC521-4B82-43AE-A548-7B8B4F1C3972}" dt="2019-09-23T08:48:51.578" v="517" actId="1036"/>
+          <ac:cxnSpMkLst>
+            <pc:docMk/>
+            <pc:sldMk cId="2539858143" sldId="257"/>
+            <ac:cxnSpMk id="63" creationId="{673E1280-A610-4DC4-AF8A-BDC380EA397C}"/>
+          </ac:cxnSpMkLst>
+        </pc:cxnChg>
+        <pc:cxnChg chg="add mod">
+          <ac:chgData name="Nath,D,Dipankar,JSN4 R" userId="68ef5e1d-3575-420b-8e94-66a68a391843" providerId="ADAL" clId="{57BCC521-4B82-43AE-A548-7B8B4F1C3972}" dt="2019-09-23T08:48:51.578" v="517" actId="1036"/>
+          <ac:cxnSpMkLst>
+            <pc:docMk/>
+            <pc:sldMk cId="2539858143" sldId="257"/>
+            <ac:cxnSpMk id="66" creationId="{2AF8DD20-701F-47B3-8DFB-A9C7C659FDC7}"/>
+          </ac:cxnSpMkLst>
+        </pc:cxnChg>
+        <pc:cxnChg chg="add mod">
+          <ac:chgData name="Nath,D,Dipankar,JSN4 R" userId="68ef5e1d-3575-420b-8e94-66a68a391843" providerId="ADAL" clId="{57BCC521-4B82-43AE-A548-7B8B4F1C3972}" dt="2019-09-23T08:48:51.578" v="517" actId="1036"/>
+          <ac:cxnSpMkLst>
+            <pc:docMk/>
+            <pc:sldMk cId="2539858143" sldId="257"/>
+            <ac:cxnSpMk id="69" creationId="{2B48E7D1-C1A3-49C5-B46C-227E532855D3}"/>
+          </ac:cxnSpMkLst>
+        </pc:cxnChg>
+        <pc:cxnChg chg="add mod">
+          <ac:chgData name="Nath,D,Dipankar,JSN4 R" userId="68ef5e1d-3575-420b-8e94-66a68a391843" providerId="ADAL" clId="{57BCC521-4B82-43AE-A548-7B8B4F1C3972}" dt="2019-09-23T10:53:08.833" v="527" actId="1076"/>
+          <ac:cxnSpMkLst>
+            <pc:docMk/>
+            <pc:sldMk cId="2539858143" sldId="257"/>
+            <ac:cxnSpMk id="72" creationId="{FB65906D-E410-4161-8C80-B7D364F34E9B}"/>
+          </ac:cxnSpMkLst>
+        </pc:cxnChg>
+        <pc:cxnChg chg="add mod">
+          <ac:chgData name="Nath,D,Dipankar,JSN4 R" userId="68ef5e1d-3575-420b-8e94-66a68a391843" providerId="ADAL" clId="{57BCC521-4B82-43AE-A548-7B8B4F1C3972}" dt="2019-09-23T10:53:08.833" v="527" actId="1076"/>
+          <ac:cxnSpMkLst>
+            <pc:docMk/>
+            <pc:sldMk cId="2539858143" sldId="257"/>
+            <ac:cxnSpMk id="75" creationId="{E2B9CB7E-1D9D-4043-9378-160BB7BDB596}"/>
+          </ac:cxnSpMkLst>
+        </pc:cxnChg>
+        <pc:cxnChg chg="add mod">
+          <ac:chgData name="Nath,D,Dipankar,JSN4 R" userId="68ef5e1d-3575-420b-8e94-66a68a391843" providerId="ADAL" clId="{57BCC521-4B82-43AE-A548-7B8B4F1C3972}" dt="2019-09-23T10:53:08.833" v="527" actId="1076"/>
+          <ac:cxnSpMkLst>
+            <pc:docMk/>
+            <pc:sldMk cId="2539858143" sldId="257"/>
+            <ac:cxnSpMk id="78" creationId="{4DB0BDF1-E355-4552-AE6F-DEE19D7509DF}"/>
+          </ac:cxnSpMkLst>
+        </pc:cxnChg>
+        <pc:cxnChg chg="add del mod">
+          <ac:chgData name="Nath,D,Dipankar,JSN4 R" userId="68ef5e1d-3575-420b-8e94-66a68a391843" providerId="ADAL" clId="{57BCC521-4B82-43AE-A548-7B8B4F1C3972}" dt="2019-09-23T10:54:04.438" v="542"/>
+          <ac:cxnSpMkLst>
+            <pc:docMk/>
+            <pc:sldMk cId="2539858143" sldId="257"/>
+            <ac:cxnSpMk id="81" creationId="{A1E8012D-F20F-4724-86E8-A506A3CB7A3A}"/>
+          </ac:cxnSpMkLst>
+        </pc:cxnChg>
+        <pc:cxnChg chg="add del">
+          <ac:chgData name="Nath,D,Dipankar,JSN4 R" userId="68ef5e1d-3575-420b-8e94-66a68a391843" providerId="ADAL" clId="{57BCC521-4B82-43AE-A548-7B8B4F1C3972}" dt="2019-09-23T06:59:24.043" v="272"/>
+          <ac:cxnSpMkLst>
+            <pc:docMk/>
+            <pc:sldMk cId="2539858143" sldId="257"/>
+            <ac:cxnSpMk id="84" creationId="{DC5BA0CC-A60E-40E0-AC8C-8D8DDE786A45}"/>
+          </ac:cxnSpMkLst>
+        </pc:cxnChg>
+        <pc:cxnChg chg="add mod">
+          <ac:chgData name="Nath,D,Dipankar,JSN4 R" userId="68ef5e1d-3575-420b-8e94-66a68a391843" providerId="ADAL" clId="{57BCC521-4B82-43AE-A548-7B8B4F1C3972}" dt="2019-09-23T10:55:52.345" v="559" actId="1076"/>
+          <ac:cxnSpMkLst>
+            <pc:docMk/>
+            <pc:sldMk cId="2539858143" sldId="257"/>
+            <ac:cxnSpMk id="87" creationId="{000B91A5-B0D0-4EDD-BD4F-826D3C4284AF}"/>
+          </ac:cxnSpMkLst>
+        </pc:cxnChg>
+        <pc:cxnChg chg="add mod">
+          <ac:chgData name="Nath,D,Dipankar,JSN4 R" userId="68ef5e1d-3575-420b-8e94-66a68a391843" providerId="ADAL" clId="{57BCC521-4B82-43AE-A548-7B8B4F1C3972}" dt="2019-09-23T10:55:52.345" v="559" actId="1076"/>
+          <ac:cxnSpMkLst>
+            <pc:docMk/>
+            <pc:sldMk cId="2539858143" sldId="257"/>
+            <ac:cxnSpMk id="90" creationId="{8ED885C0-9DF3-41A1-8F7C-F33FB6ACC049}"/>
+          </ac:cxnSpMkLst>
+        </pc:cxnChg>
+        <pc:cxnChg chg="add mod">
+          <ac:chgData name="Nath,D,Dipankar,JSN4 R" userId="68ef5e1d-3575-420b-8e94-66a68a391843" providerId="ADAL" clId="{57BCC521-4B82-43AE-A548-7B8B4F1C3972}" dt="2019-09-23T10:55:52.345" v="559" actId="1076"/>
+          <ac:cxnSpMkLst>
+            <pc:docMk/>
+            <pc:sldMk cId="2539858143" sldId="257"/>
+            <ac:cxnSpMk id="92" creationId="{70F0B245-89B3-49AB-8745-1FC569F46E5A}"/>
+          </ac:cxnSpMkLst>
+        </pc:cxnChg>
+        <pc:cxnChg chg="add mod">
+          <ac:chgData name="Nath,D,Dipankar,JSN4 R" userId="68ef5e1d-3575-420b-8e94-66a68a391843" providerId="ADAL" clId="{57BCC521-4B82-43AE-A548-7B8B4F1C3972}" dt="2019-09-23T10:55:52.345" v="559" actId="1076"/>
+          <ac:cxnSpMkLst>
+            <pc:docMk/>
+            <pc:sldMk cId="2539858143" sldId="257"/>
+            <ac:cxnSpMk id="96" creationId="{21FA1C28-EC22-43CB-870A-4C8C53C26CB6}"/>
+          </ac:cxnSpMkLst>
+        </pc:cxnChg>
+        <pc:cxnChg chg="add mod">
+          <ac:chgData name="Nath,D,Dipankar,JSN4 R" userId="68ef5e1d-3575-420b-8e94-66a68a391843" providerId="ADAL" clId="{57BCC521-4B82-43AE-A548-7B8B4F1C3972}" dt="2019-09-23T10:55:52.345" v="559" actId="1076"/>
+          <ac:cxnSpMkLst>
+            <pc:docMk/>
+            <pc:sldMk cId="2539858143" sldId="257"/>
+            <ac:cxnSpMk id="99" creationId="{3B3CE7E2-FAC5-4269-ACEA-9CAD08D19F20}"/>
+          </ac:cxnSpMkLst>
+        </pc:cxnChg>
+        <pc:cxnChg chg="add mod">
+          <ac:chgData name="Nath,D,Dipankar,JSN4 R" userId="68ef5e1d-3575-420b-8e94-66a68a391843" providerId="ADAL" clId="{57BCC521-4B82-43AE-A548-7B8B4F1C3972}" dt="2019-09-23T11:00:06.267" v="673" actId="20577"/>
+          <ac:cxnSpMkLst>
+            <pc:docMk/>
+            <pc:sldMk cId="2539858143" sldId="257"/>
+            <ac:cxnSpMk id="100" creationId="{793C58D6-76E0-4AC9-8A7B-2C3E211D5F87}"/>
+          </ac:cxnSpMkLst>
+        </pc:cxnChg>
+        <pc:cxnChg chg="add mod">
+          <ac:chgData name="Nath,D,Dipankar,JSN4 R" userId="68ef5e1d-3575-420b-8e94-66a68a391843" providerId="ADAL" clId="{57BCC521-4B82-43AE-A548-7B8B4F1C3972}" dt="2019-09-23T10:53:42.497" v="534" actId="14100"/>
+          <ac:cxnSpMkLst>
+            <pc:docMk/>
+            <pc:sldMk cId="2539858143" sldId="257"/>
+            <ac:cxnSpMk id="114" creationId="{F8DFD9B1-0521-485F-B4AA-82D690B2A1E9}"/>
+          </ac:cxnSpMkLst>
+        </pc:cxnChg>
+        <pc:cxnChg chg="add mod">
+          <ac:chgData name="Nath,D,Dipankar,JSN4 R" userId="68ef5e1d-3575-420b-8e94-66a68a391843" providerId="ADAL" clId="{57BCC521-4B82-43AE-A548-7B8B4F1C3972}" dt="2019-09-23T10:53:52.664" v="538" actId="14100"/>
+          <ac:cxnSpMkLst>
+            <pc:docMk/>
+            <pc:sldMk cId="2539858143" sldId="257"/>
+            <ac:cxnSpMk id="117" creationId="{9037E52A-3B13-4264-89A2-554B35344C39}"/>
+          </ac:cxnSpMkLst>
+        </pc:cxnChg>
+        <pc:cxnChg chg="add mod">
+          <ac:chgData name="Nath,D,Dipankar,JSN4 R" userId="68ef5e1d-3575-420b-8e94-66a68a391843" providerId="ADAL" clId="{57BCC521-4B82-43AE-A548-7B8B4F1C3972}" dt="2019-09-23T10:54:01.440" v="541" actId="14100"/>
+          <ac:cxnSpMkLst>
+            <pc:docMk/>
+            <pc:sldMk cId="2539858143" sldId="257"/>
+            <ac:cxnSpMk id="120" creationId="{DD7505F9-E6CB-4D5C-A10B-57B6FAD9EBC7}"/>
+          </ac:cxnSpMkLst>
+        </pc:cxnChg>
+        <pc:cxnChg chg="add">
+          <ac:chgData name="Nath,D,Dipankar,JSN4 R" userId="68ef5e1d-3575-420b-8e94-66a68a391843" providerId="ADAL" clId="{57BCC521-4B82-43AE-A548-7B8B4F1C3972}" dt="2019-09-23T10:54:07.789" v="543"/>
+          <ac:cxnSpMkLst>
+            <pc:docMk/>
+            <pc:sldMk cId="2539858143" sldId="257"/>
+            <ac:cxnSpMk id="123" creationId="{DF922A8D-83CE-4B85-9DF8-0621978312AC}"/>
+          </ac:cxnSpMkLst>
+        </pc:cxnChg>
+        <pc:cxnChg chg="add mod">
+          <ac:chgData name="Nath,D,Dipankar,JSN4 R" userId="68ef5e1d-3575-420b-8e94-66a68a391843" providerId="ADAL" clId="{57BCC521-4B82-43AE-A548-7B8B4F1C3972}" dt="2019-09-23T10:54:15.456" v="546" actId="14100"/>
+          <ac:cxnSpMkLst>
+            <pc:docMk/>
+            <pc:sldMk cId="2539858143" sldId="257"/>
+            <ac:cxnSpMk id="124" creationId="{BD63DAC6-F4FC-45F4-8EDA-7152E86D7D65}"/>
+          </ac:cxnSpMkLst>
+        </pc:cxnChg>
+        <pc:cxnChg chg="add mod">
+          <ac:chgData name="Nath,D,Dipankar,JSN4 R" userId="68ef5e1d-3575-420b-8e94-66a68a391843" providerId="ADAL" clId="{57BCC521-4B82-43AE-A548-7B8B4F1C3972}" dt="2019-09-23T10:54:25.945" v="549" actId="14100"/>
+          <ac:cxnSpMkLst>
+            <pc:docMk/>
+            <pc:sldMk cId="2539858143" sldId="257"/>
+            <ac:cxnSpMk id="127" creationId="{5847EF14-5B7B-4A6C-8DB2-16BB943DC7B4}"/>
+          </ac:cxnSpMkLst>
+        </pc:cxnChg>
+        <pc:cxnChg chg="add mod">
+          <ac:chgData name="Nath,D,Dipankar,JSN4 R" userId="68ef5e1d-3575-420b-8e94-66a68a391843" providerId="ADAL" clId="{57BCC521-4B82-43AE-A548-7B8B4F1C3972}" dt="2019-09-23T10:54:34.793" v="552" actId="14100"/>
+          <ac:cxnSpMkLst>
+            <pc:docMk/>
+            <pc:sldMk cId="2539858143" sldId="257"/>
+            <ac:cxnSpMk id="130" creationId="{DA20233E-A18F-4CBB-9EBF-878138938893}"/>
+          </ac:cxnSpMkLst>
+        </pc:cxnChg>
+        <pc:cxnChg chg="add mod">
+          <ac:chgData name="Nath,D,Dipankar,JSN4 R" userId="68ef5e1d-3575-420b-8e94-66a68a391843" providerId="ADAL" clId="{57BCC521-4B82-43AE-A548-7B8B4F1C3972}" dt="2019-09-23T10:54:43.064" v="555" actId="14100"/>
+          <ac:cxnSpMkLst>
+            <pc:docMk/>
+            <pc:sldMk cId="2539858143" sldId="257"/>
+            <ac:cxnSpMk id="133" creationId="{724F04DE-F6F7-46DB-B772-0C389410DFA7}"/>
+          </ac:cxnSpMkLst>
+        </pc:cxnChg>
+        <pc:cxnChg chg="add mod">
+          <ac:chgData name="Nath,D,Dipankar,JSN4 R" userId="68ef5e1d-3575-420b-8e94-66a68a391843" providerId="ADAL" clId="{57BCC521-4B82-43AE-A548-7B8B4F1C3972}" dt="2019-09-23T10:54:59.984" v="558" actId="14100"/>
+          <ac:cxnSpMkLst>
+            <pc:docMk/>
+            <pc:sldMk cId="2539858143" sldId="257"/>
+            <ac:cxnSpMk id="136" creationId="{A6A6B50D-5B01-484F-8E9C-53768A1CE6F1}"/>
+          </ac:cxnSpMkLst>
+        </pc:cxnChg>
+        <pc:cxnChg chg="add del mod">
+          <ac:chgData name="Nath,D,Dipankar,JSN4 R" userId="68ef5e1d-3575-420b-8e94-66a68a391843" providerId="ADAL" clId="{57BCC521-4B82-43AE-A548-7B8B4F1C3972}" dt="2019-09-23T10:56:17.229" v="631" actId="478"/>
+          <ac:cxnSpMkLst>
+            <pc:docMk/>
+            <pc:sldMk cId="2539858143" sldId="257"/>
+            <ac:cxnSpMk id="139" creationId="{EA8C963B-3C47-453A-AA66-A46594ED9775}"/>
+          </ac:cxnSpMkLst>
+        </pc:cxnChg>
+        <pc:cxnChg chg="add del mod">
+          <ac:chgData name="Nath,D,Dipankar,JSN4 R" userId="68ef5e1d-3575-420b-8e94-66a68a391843" providerId="ADAL" clId="{57BCC521-4B82-43AE-A548-7B8B4F1C3972}" dt="2019-09-23T10:56:17.229" v="631" actId="478"/>
+          <ac:cxnSpMkLst>
+            <pc:docMk/>
+            <pc:sldMk cId="2539858143" sldId="257"/>
+            <ac:cxnSpMk id="141" creationId="{028FB428-71FD-441A-B977-DC0B74D76AB8}"/>
+          </ac:cxnSpMkLst>
+        </pc:cxnChg>
+        <pc:cxnChg chg="add del mod">
+          <ac:chgData name="Nath,D,Dipankar,JSN4 R" userId="68ef5e1d-3575-420b-8e94-66a68a391843" providerId="ADAL" clId="{57BCC521-4B82-43AE-A548-7B8B4F1C3972}" dt="2019-09-23T10:56:17.229" v="631" actId="478"/>
+          <ac:cxnSpMkLst>
+            <pc:docMk/>
+            <pc:sldMk cId="2539858143" sldId="257"/>
+            <ac:cxnSpMk id="142" creationId="{1CBD3B3C-5C3A-4F7A-9BEF-CC38FD4462DE}"/>
+          </ac:cxnSpMkLst>
+        </pc:cxnChg>
+        <pc:cxnChg chg="add del mod">
+          <ac:chgData name="Nath,D,Dipankar,JSN4 R" userId="68ef5e1d-3575-420b-8e94-66a68a391843" providerId="ADAL" clId="{57BCC521-4B82-43AE-A548-7B8B4F1C3972}" dt="2019-09-23T10:56:17.229" v="631" actId="478"/>
+          <ac:cxnSpMkLst>
+            <pc:docMk/>
+            <pc:sldMk cId="2539858143" sldId="257"/>
+            <ac:cxnSpMk id="143" creationId="{2B707468-606A-4A92-827D-F9E7AC8D005C}"/>
+          </ac:cxnSpMkLst>
+        </pc:cxnChg>
+        <pc:cxnChg chg="add del mod">
+          <ac:chgData name="Nath,D,Dipankar,JSN4 R" userId="68ef5e1d-3575-420b-8e94-66a68a391843" providerId="ADAL" clId="{57BCC521-4B82-43AE-A548-7B8B4F1C3972}" dt="2019-09-23T10:56:17.229" v="631" actId="478"/>
+          <ac:cxnSpMkLst>
+            <pc:docMk/>
+            <pc:sldMk cId="2539858143" sldId="257"/>
+            <ac:cxnSpMk id="144" creationId="{3564CB75-4CE2-4E10-87D1-527E3DBF7434}"/>
+          </ac:cxnSpMkLst>
+        </pc:cxnChg>
+        <pc:cxnChg chg="add del mod">
+          <ac:chgData name="Nath,D,Dipankar,JSN4 R" userId="68ef5e1d-3575-420b-8e94-66a68a391843" providerId="ADAL" clId="{57BCC521-4B82-43AE-A548-7B8B4F1C3972}" dt="2019-09-23T10:56:17.229" v="631" actId="478"/>
+          <ac:cxnSpMkLst>
+            <pc:docMk/>
+            <pc:sldMk cId="2539858143" sldId="257"/>
+            <ac:cxnSpMk id="145" creationId="{3F2F720D-2BE9-4542-8A80-C09AF323AF37}"/>
+          </ac:cxnSpMkLst>
+        </pc:cxnChg>
+        <pc:cxnChg chg="add del mod">
+          <ac:chgData name="Nath,D,Dipankar,JSN4 R" userId="68ef5e1d-3575-420b-8e94-66a68a391843" providerId="ADAL" clId="{57BCC521-4B82-43AE-A548-7B8B4F1C3972}" dt="2019-09-23T10:56:17.229" v="631" actId="478"/>
+          <ac:cxnSpMkLst>
+            <pc:docMk/>
+            <pc:sldMk cId="2539858143" sldId="257"/>
+            <ac:cxnSpMk id="146" creationId="{2DF5C1D7-16D3-47B0-AB90-5A3E2BDAAC7E}"/>
+          </ac:cxnSpMkLst>
+        </pc:cxnChg>
+        <pc:cxnChg chg="add mod">
+          <ac:chgData name="Nath,D,Dipankar,JSN4 R" userId="68ef5e1d-3575-420b-8e94-66a68a391843" providerId="ADAL" clId="{57BCC521-4B82-43AE-A548-7B8B4F1C3972}" dt="2019-09-23T10:56:24.345" v="633" actId="1076"/>
+          <ac:cxnSpMkLst>
+            <pc:docMk/>
+            <pc:sldMk cId="2539858143" sldId="257"/>
+            <ac:cxnSpMk id="148" creationId="{E387586C-96F2-46D4-AB55-E762C3C608BD}"/>
+          </ac:cxnSpMkLst>
+        </pc:cxnChg>
+        <pc:cxnChg chg="add mod">
+          <ac:chgData name="Nath,D,Dipankar,JSN4 R" userId="68ef5e1d-3575-420b-8e94-66a68a391843" providerId="ADAL" clId="{57BCC521-4B82-43AE-A548-7B8B4F1C3972}" dt="2019-09-23T10:56:24.345" v="633" actId="1076"/>
+          <ac:cxnSpMkLst>
+            <pc:docMk/>
+            <pc:sldMk cId="2539858143" sldId="257"/>
+            <ac:cxnSpMk id="151" creationId="{49A1DA50-583D-4FCC-8E88-B6A9232864D9}"/>
+          </ac:cxnSpMkLst>
+        </pc:cxnChg>
+        <pc:cxnChg chg="add mod">
+          <ac:chgData name="Nath,D,Dipankar,JSN4 R" userId="68ef5e1d-3575-420b-8e94-66a68a391843" providerId="ADAL" clId="{57BCC521-4B82-43AE-A548-7B8B4F1C3972}" dt="2019-09-23T10:56:24.345" v="633" actId="1076"/>
+          <ac:cxnSpMkLst>
+            <pc:docMk/>
+            <pc:sldMk cId="2539858143" sldId="257"/>
+            <ac:cxnSpMk id="152" creationId="{34897DDA-7BFF-4D69-8460-5171E69CFB89}"/>
+          </ac:cxnSpMkLst>
+        </pc:cxnChg>
+        <pc:cxnChg chg="add mod">
+          <ac:chgData name="Nath,D,Dipankar,JSN4 R" userId="68ef5e1d-3575-420b-8e94-66a68a391843" providerId="ADAL" clId="{57BCC521-4B82-43AE-A548-7B8B4F1C3972}" dt="2019-09-23T10:56:24.345" v="633" actId="1076"/>
+          <ac:cxnSpMkLst>
+            <pc:docMk/>
+            <pc:sldMk cId="2539858143" sldId="257"/>
+            <ac:cxnSpMk id="153" creationId="{F7385991-B733-466C-ADCF-E79997E1D7B0}"/>
+          </ac:cxnSpMkLst>
+        </pc:cxnChg>
+        <pc:cxnChg chg="add mod">
+          <ac:chgData name="Nath,D,Dipankar,JSN4 R" userId="68ef5e1d-3575-420b-8e94-66a68a391843" providerId="ADAL" clId="{57BCC521-4B82-43AE-A548-7B8B4F1C3972}" dt="2019-09-23T10:56:24.345" v="633" actId="1076"/>
+          <ac:cxnSpMkLst>
+            <pc:docMk/>
+            <pc:sldMk cId="2539858143" sldId="257"/>
+            <ac:cxnSpMk id="154" creationId="{D31F3D95-77B7-4A1E-A3D1-D9B7D9777020}"/>
+          </ac:cxnSpMkLst>
+        </pc:cxnChg>
+        <pc:cxnChg chg="add mod">
+          <ac:chgData name="Nath,D,Dipankar,JSN4 R" userId="68ef5e1d-3575-420b-8e94-66a68a391843" providerId="ADAL" clId="{57BCC521-4B82-43AE-A548-7B8B4F1C3972}" dt="2019-09-23T10:56:24.345" v="633" actId="1076"/>
+          <ac:cxnSpMkLst>
+            <pc:docMk/>
+            <pc:sldMk cId="2539858143" sldId="257"/>
+            <ac:cxnSpMk id="155" creationId="{B341147D-5BA6-4A38-925E-5C4D88732113}"/>
+          </ac:cxnSpMkLst>
+        </pc:cxnChg>
+        <pc:cxnChg chg="add mod">
+          <ac:chgData name="Nath,D,Dipankar,JSN4 R" userId="68ef5e1d-3575-420b-8e94-66a68a391843" providerId="ADAL" clId="{57BCC521-4B82-43AE-A548-7B8B4F1C3972}" dt="2019-09-23T11:00:20.106" v="676" actId="20577"/>
+          <ac:cxnSpMkLst>
+            <pc:docMk/>
+            <pc:sldMk cId="2539858143" sldId="257"/>
+            <ac:cxnSpMk id="156" creationId="{BEB4C520-6F1F-4C49-A119-76455643C276}"/>
+          </ac:cxnSpMkLst>
+        </pc:cxnChg>
+        <pc:cxnChg chg="add mod">
+          <ac:chgData name="Nath,D,Dipankar,JSN4 R" userId="68ef5e1d-3575-420b-8e94-66a68a391843" providerId="ADAL" clId="{57BCC521-4B82-43AE-A548-7B8B4F1C3972}" dt="2019-09-23T10:56:45.329" v="637" actId="1076"/>
+          <ac:cxnSpMkLst>
+            <pc:docMk/>
+            <pc:sldMk cId="2539858143" sldId="257"/>
+            <ac:cxnSpMk id="157" creationId="{6FC80E3B-B591-430F-B6C1-EAC760309764}"/>
+          </ac:cxnSpMkLst>
+        </pc:cxnChg>
+        <pc:cxnChg chg="add mod">
+          <ac:chgData name="Nath,D,Dipankar,JSN4 R" userId="68ef5e1d-3575-420b-8e94-66a68a391843" providerId="ADAL" clId="{57BCC521-4B82-43AE-A548-7B8B4F1C3972}" dt="2019-09-23T10:56:45.329" v="637" actId="1076"/>
+          <ac:cxnSpMkLst>
+            <pc:docMk/>
+            <pc:sldMk cId="2539858143" sldId="257"/>
+            <ac:cxnSpMk id="160" creationId="{314683E0-912E-43E9-99A7-88BDEF5BF95D}"/>
+          </ac:cxnSpMkLst>
+        </pc:cxnChg>
+        <pc:cxnChg chg="add mod">
+          <ac:chgData name="Nath,D,Dipankar,JSN4 R" userId="68ef5e1d-3575-420b-8e94-66a68a391843" providerId="ADAL" clId="{57BCC521-4B82-43AE-A548-7B8B4F1C3972}" dt="2019-09-23T10:56:45.329" v="637" actId="1076"/>
+          <ac:cxnSpMkLst>
+            <pc:docMk/>
+            <pc:sldMk cId="2539858143" sldId="257"/>
+            <ac:cxnSpMk id="161" creationId="{FA76320C-3DBD-420F-8CC5-A78DD58675BD}"/>
+          </ac:cxnSpMkLst>
+        </pc:cxnChg>
+        <pc:cxnChg chg="add mod">
+          <ac:chgData name="Nath,D,Dipankar,JSN4 R" userId="68ef5e1d-3575-420b-8e94-66a68a391843" providerId="ADAL" clId="{57BCC521-4B82-43AE-A548-7B8B4F1C3972}" dt="2019-09-23T10:56:45.329" v="637" actId="1076"/>
+          <ac:cxnSpMkLst>
+            <pc:docMk/>
+            <pc:sldMk cId="2539858143" sldId="257"/>
+            <ac:cxnSpMk id="162" creationId="{9604B2DA-6EE1-448A-80A8-3835E9E624FB}"/>
+          </ac:cxnSpMkLst>
+        </pc:cxnChg>
+        <pc:cxnChg chg="add mod">
+          <ac:chgData name="Nath,D,Dipankar,JSN4 R" userId="68ef5e1d-3575-420b-8e94-66a68a391843" providerId="ADAL" clId="{57BCC521-4B82-43AE-A548-7B8B4F1C3972}" dt="2019-09-23T10:56:45.329" v="637" actId="1076"/>
+          <ac:cxnSpMkLst>
+            <pc:docMk/>
+            <pc:sldMk cId="2539858143" sldId="257"/>
+            <ac:cxnSpMk id="163" creationId="{21930FBB-D1EC-4C69-A96A-588E3DDE84FD}"/>
+          </ac:cxnSpMkLst>
+        </pc:cxnChg>
+        <pc:cxnChg chg="add mod">
+          <ac:chgData name="Nath,D,Dipankar,JSN4 R" userId="68ef5e1d-3575-420b-8e94-66a68a391843" providerId="ADAL" clId="{57BCC521-4B82-43AE-A548-7B8B4F1C3972}" dt="2019-09-23T10:56:45.329" v="637" actId="1076"/>
+          <ac:cxnSpMkLst>
+            <pc:docMk/>
+            <pc:sldMk cId="2539858143" sldId="257"/>
+            <ac:cxnSpMk id="164" creationId="{BE77A020-C234-48E0-81E4-3FC849143B3E}"/>
+          </ac:cxnSpMkLst>
+        </pc:cxnChg>
+        <pc:cxnChg chg="add mod">
+          <ac:chgData name="Nath,D,Dipankar,JSN4 R" userId="68ef5e1d-3575-420b-8e94-66a68a391843" providerId="ADAL" clId="{57BCC521-4B82-43AE-A548-7B8B4F1C3972}" dt="2019-09-23T11:00:23.374" v="677" actId="20577"/>
+          <ac:cxnSpMkLst>
+            <pc:docMk/>
+            <pc:sldMk cId="2539858143" sldId="257"/>
+            <ac:cxnSpMk id="165" creationId="{AE587070-0A34-40D7-B823-502DE1058CAB}"/>
+          </ac:cxnSpMkLst>
+        </pc:cxnChg>
+      </pc:sldChg>
+      <pc:sldChg chg="addSp modSp add">
+        <pc:chgData name="Nath,D,Dipankar,JSN4 R" userId="68ef5e1d-3575-420b-8e94-66a68a391843" providerId="ADAL" clId="{57BCC521-4B82-43AE-A548-7B8B4F1C3972}" dt="2019-09-23T07:13:03.944" v="441" actId="1038"/>
+        <pc:sldMkLst>
+          <pc:docMk/>
+          <pc:sldMk cId="3437342905" sldId="258"/>
+        </pc:sldMkLst>
+        <pc:spChg chg="mod">
+          <ac:chgData name="Nath,D,Dipankar,JSN4 R" userId="68ef5e1d-3575-420b-8e94-66a68a391843" providerId="ADAL" clId="{57BCC521-4B82-43AE-A548-7B8B4F1C3972}" dt="2019-09-23T07:13:03.944" v="441" actId="1038"/>
+          <ac:spMkLst>
+            <pc:docMk/>
+            <pc:sldMk cId="3437342905" sldId="258"/>
+            <ac:spMk id="2" creationId="{34E7EA03-B2A3-4337-8FA8-3854CDFD1694}"/>
+          </ac:spMkLst>
+        </pc:spChg>
+        <pc:spChg chg="add mod">
+          <ac:chgData name="Nath,D,Dipankar,JSN4 R" userId="68ef5e1d-3575-420b-8e94-66a68a391843" providerId="ADAL" clId="{57BCC521-4B82-43AE-A548-7B8B4F1C3972}" dt="2019-09-23T07:12:27.761" v="435" actId="164"/>
+          <ac:spMkLst>
+            <pc:docMk/>
+            <pc:sldMk cId="3437342905" sldId="258"/>
+            <ac:spMk id="26" creationId="{456E04F2-F289-4564-BBAA-5F3B1D4D1EE8}"/>
+          </ac:spMkLst>
+        </pc:spChg>
+        <pc:grpChg chg="add mod">
+          <ac:chgData name="Nath,D,Dipankar,JSN4 R" userId="68ef5e1d-3575-420b-8e94-66a68a391843" providerId="ADAL" clId="{57BCC521-4B82-43AE-A548-7B8B4F1C3972}" dt="2019-09-23T07:12:27.761" v="435" actId="164"/>
+          <ac:grpSpMkLst>
+            <pc:docMk/>
+            <pc:sldMk cId="3437342905" sldId="258"/>
+            <ac:grpSpMk id="3" creationId="{38BB2135-8529-4FCD-B53F-18674600C2CD}"/>
+          </ac:grpSpMkLst>
+        </pc:grpChg>
+        <pc:cxnChg chg="add mod">
+          <ac:chgData name="Nath,D,Dipankar,JSN4 R" userId="68ef5e1d-3575-420b-8e94-66a68a391843" providerId="ADAL" clId="{57BCC521-4B82-43AE-A548-7B8B4F1C3972}" dt="2019-09-23T07:12:27.761" v="435" actId="164"/>
+          <ac:cxnSpMkLst>
+            <pc:docMk/>
+            <pc:sldMk cId="3437342905" sldId="258"/>
+            <ac:cxnSpMk id="27" creationId="{158082C5-AF01-4030-B506-0634BCCEC5FB}"/>
+          </ac:cxnSpMkLst>
+        </pc:cxnChg>
+        <pc:cxnChg chg="add mod">
+          <ac:chgData name="Nath,D,Dipankar,JSN4 R" userId="68ef5e1d-3575-420b-8e94-66a68a391843" providerId="ADAL" clId="{57BCC521-4B82-43AE-A548-7B8B4F1C3972}" dt="2019-09-23T07:12:27.761" v="435" actId="164"/>
+          <ac:cxnSpMkLst>
+            <pc:docMk/>
+            <pc:sldMk cId="3437342905" sldId="258"/>
+            <ac:cxnSpMk id="28" creationId="{9269E283-E40E-4689-AC2F-3B107E07890B}"/>
+          </ac:cxnSpMkLst>
+        </pc:cxnChg>
+        <pc:cxnChg chg="add mod">
+          <ac:chgData name="Nath,D,Dipankar,JSN4 R" userId="68ef5e1d-3575-420b-8e94-66a68a391843" providerId="ADAL" clId="{57BCC521-4B82-43AE-A548-7B8B4F1C3972}" dt="2019-09-23T07:12:27.761" v="435" actId="164"/>
+          <ac:cxnSpMkLst>
+            <pc:docMk/>
+            <pc:sldMk cId="3437342905" sldId="258"/>
+            <ac:cxnSpMk id="30" creationId="{DD5B6BBB-27EA-42F0-ABA4-871065E03528}"/>
+          </ac:cxnSpMkLst>
+        </pc:cxnChg>
+        <pc:cxnChg chg="add mod">
+          <ac:chgData name="Nath,D,Dipankar,JSN4 R" userId="68ef5e1d-3575-420b-8e94-66a68a391843" providerId="ADAL" clId="{57BCC521-4B82-43AE-A548-7B8B4F1C3972}" dt="2019-09-23T07:12:27.761" v="435" actId="164"/>
+          <ac:cxnSpMkLst>
+            <pc:docMk/>
+            <pc:sldMk cId="3437342905" sldId="258"/>
+            <ac:cxnSpMk id="36" creationId="{A64858D3-8476-4616-8393-7B008D057973}"/>
+          </ac:cxnSpMkLst>
+        </pc:cxnChg>
+        <pc:cxnChg chg="add mod">
+          <ac:chgData name="Nath,D,Dipankar,JSN4 R" userId="68ef5e1d-3575-420b-8e94-66a68a391843" providerId="ADAL" clId="{57BCC521-4B82-43AE-A548-7B8B4F1C3972}" dt="2019-09-23T07:12:27.761" v="435" actId="164"/>
+          <ac:cxnSpMkLst>
+            <pc:docMk/>
+            <pc:sldMk cId="3437342905" sldId="258"/>
+            <ac:cxnSpMk id="38" creationId="{6997154F-2FA3-47AD-B997-A651E0142BC0}"/>
+          </ac:cxnSpMkLst>
+        </pc:cxnChg>
+        <pc:cxnChg chg="add mod">
+          <ac:chgData name="Nath,D,Dipankar,JSN4 R" userId="68ef5e1d-3575-420b-8e94-66a68a391843" providerId="ADAL" clId="{57BCC521-4B82-43AE-A548-7B8B4F1C3972}" dt="2019-09-23T07:12:56.678" v="438" actId="14100"/>
+          <ac:cxnSpMkLst>
+            <pc:docMk/>
+            <pc:sldMk cId="3437342905" sldId="258"/>
+            <ac:cxnSpMk id="39" creationId="{DE93A66F-C506-4D3B-9569-A72C4DA614FA}"/>
+          </ac:cxnSpMkLst>
+        </pc:cxnChg>
+      </pc:sldChg>
+    </pc:docChg>
+  </pc:docChgLst>
+  <pc:docChgLst>
     <pc:chgData name="Nath,D,Dipankar,JSN4 R" userId="68ef5e1d-3575-420b-8e94-66a68a391843" providerId="ADAL" clId="{C708F02D-52FC-43DE-A3EF-3911D8FDF405}"/>
     <pc:docChg chg="custSel addSld modSld">
       <pc:chgData name="Nath,D,Dipankar,JSN4 R" userId="68ef5e1d-3575-420b-8e94-66a68a391843" providerId="ADAL" clId="{C708F02D-52FC-43DE-A3EF-3911D8FDF405}" dt="2019-09-24T11:49:00.656" v="2" actId="478"/>
@@ -1828,1020 +2844,6 @@
             <ac:spMk id="3" creationId="{39C5C576-1F77-4886-870A-0B0FD7290A7F}"/>
           </ac:spMkLst>
         </pc:spChg>
-      </pc:sldChg>
-    </pc:docChg>
-  </pc:docChgLst>
-  <pc:docChgLst>
-    <pc:chgData name="Nath,D,Dipankar,JSN4 R" userId="68ef5e1d-3575-420b-8e94-66a68a391843" providerId="ADAL" clId="{57BCC521-4B82-43AE-A548-7B8B4F1C3972}"/>
-    <pc:docChg chg="undo custSel addSld modSld">
-      <pc:chgData name="Nath,D,Dipankar,JSN4 R" userId="68ef5e1d-3575-420b-8e94-66a68a391843" providerId="ADAL" clId="{57BCC521-4B82-43AE-A548-7B8B4F1C3972}" dt="2019-09-23T11:01:13.481" v="707" actId="20577"/>
-      <pc:docMkLst>
-        <pc:docMk/>
-      </pc:docMkLst>
-      <pc:sldChg chg="addSp delSp modSp">
-        <pc:chgData name="Nath,D,Dipankar,JSN4 R" userId="68ef5e1d-3575-420b-8e94-66a68a391843" providerId="ADAL" clId="{57BCC521-4B82-43AE-A548-7B8B4F1C3972}" dt="2019-09-22T07:42:57.036" v="16" actId="20577"/>
-        <pc:sldMkLst>
-          <pc:docMk/>
-          <pc:sldMk cId="1413392138" sldId="256"/>
-        </pc:sldMkLst>
-        <pc:spChg chg="mod">
-          <ac:chgData name="Nath,D,Dipankar,JSN4 R" userId="68ef5e1d-3575-420b-8e94-66a68a391843" providerId="ADAL" clId="{57BCC521-4B82-43AE-A548-7B8B4F1C3972}" dt="2019-09-22T07:31:22.918" v="1" actId="1076"/>
-          <ac:spMkLst>
-            <pc:docMk/>
-            <pc:sldMk cId="1413392138" sldId="256"/>
-            <ac:spMk id="2" creationId="{34E7EA03-B2A3-4337-8FA8-3854CDFD1694}"/>
-          </ac:spMkLst>
-        </pc:spChg>
-        <pc:spChg chg="mod">
-          <ac:chgData name="Nath,D,Dipankar,JSN4 R" userId="68ef5e1d-3575-420b-8e94-66a68a391843" providerId="ADAL" clId="{57BCC521-4B82-43AE-A548-7B8B4F1C3972}" dt="2019-09-22T07:42:16.109" v="4" actId="1076"/>
-          <ac:spMkLst>
-            <pc:docMk/>
-            <pc:sldMk cId="1413392138" sldId="256"/>
-            <ac:spMk id="8" creationId="{C2748455-0466-4CB9-A103-39F0C9E0DE8C}"/>
-          </ac:spMkLst>
-        </pc:spChg>
-        <pc:spChg chg="del">
-          <ac:chgData name="Nath,D,Dipankar,JSN4 R" userId="68ef5e1d-3575-420b-8e94-66a68a391843" providerId="ADAL" clId="{57BCC521-4B82-43AE-A548-7B8B4F1C3972}" dt="2019-09-22T07:42:08.282" v="3" actId="478"/>
-          <ac:spMkLst>
-            <pc:docMk/>
-            <pc:sldMk cId="1413392138" sldId="256"/>
-            <ac:spMk id="14" creationId="{4D56BF6D-A5F8-4D14-8797-8AFDE51D6952}"/>
-          </ac:spMkLst>
-        </pc:spChg>
-        <pc:spChg chg="del">
-          <ac:chgData name="Nath,D,Dipankar,JSN4 R" userId="68ef5e1d-3575-420b-8e94-66a68a391843" providerId="ADAL" clId="{57BCC521-4B82-43AE-A548-7B8B4F1C3972}" dt="2019-09-22T07:42:21.884" v="5" actId="478"/>
-          <ac:spMkLst>
-            <pc:docMk/>
-            <pc:sldMk cId="1413392138" sldId="256"/>
-            <ac:spMk id="15" creationId="{95F20935-0E89-4634-A503-7D7E4DDE3D9E}"/>
-          </ac:spMkLst>
-        </pc:spChg>
-        <pc:spChg chg="mod">
-          <ac:chgData name="Nath,D,Dipankar,JSN4 R" userId="68ef5e1d-3575-420b-8e94-66a68a391843" providerId="ADAL" clId="{57BCC521-4B82-43AE-A548-7B8B4F1C3972}" dt="2019-09-22T07:42:48.076" v="13" actId="20577"/>
-          <ac:spMkLst>
-            <pc:docMk/>
-            <pc:sldMk cId="1413392138" sldId="256"/>
-            <ac:spMk id="16" creationId="{BD906657-7720-4AC7-B53B-9F056D092227}"/>
-          </ac:spMkLst>
-        </pc:spChg>
-        <pc:spChg chg="mod">
-          <ac:chgData name="Nath,D,Dipankar,JSN4 R" userId="68ef5e1d-3575-420b-8e94-66a68a391843" providerId="ADAL" clId="{57BCC521-4B82-43AE-A548-7B8B4F1C3972}" dt="2019-09-22T07:42:57.036" v="16" actId="20577"/>
-          <ac:spMkLst>
-            <pc:docMk/>
-            <pc:sldMk cId="1413392138" sldId="256"/>
-            <ac:spMk id="17" creationId="{A4F4FFD8-A5B0-4FED-8E8D-26548960DD3E}"/>
-          </ac:spMkLst>
-        </pc:spChg>
-        <pc:spChg chg="add mod">
-          <ac:chgData name="Nath,D,Dipankar,JSN4 R" userId="68ef5e1d-3575-420b-8e94-66a68a391843" providerId="ADAL" clId="{57BCC521-4B82-43AE-A548-7B8B4F1C3972}" dt="2019-09-22T07:42:34.411" v="9" actId="20577"/>
-          <ac:spMkLst>
-            <pc:docMk/>
-            <pc:sldMk cId="1413392138" sldId="256"/>
-            <ac:spMk id="29" creationId="{0C1F6C98-9D18-4803-9D4A-010A3965F8EE}"/>
-          </ac:spMkLst>
-        </pc:spChg>
-        <pc:spChg chg="del">
-          <ac:chgData name="Nath,D,Dipankar,JSN4 R" userId="68ef5e1d-3575-420b-8e94-66a68a391843" providerId="ADAL" clId="{57BCC521-4B82-43AE-A548-7B8B4F1C3972}" dt="2019-09-22T07:31:10.627" v="0" actId="478"/>
-          <ac:spMkLst>
-            <pc:docMk/>
-            <pc:sldMk cId="1413392138" sldId="256"/>
-            <ac:spMk id="43" creationId="{7A79D8E1-5E24-4D62-A81F-0C457C02B725}"/>
-          </ac:spMkLst>
-        </pc:spChg>
-        <pc:cxnChg chg="mod">
-          <ac:chgData name="Nath,D,Dipankar,JSN4 R" userId="68ef5e1d-3575-420b-8e94-66a68a391843" providerId="ADAL" clId="{57BCC521-4B82-43AE-A548-7B8B4F1C3972}" dt="2019-09-22T07:31:43.547" v="2" actId="14100"/>
-          <ac:cxnSpMkLst>
-            <pc:docMk/>
-            <pc:sldMk cId="1413392138" sldId="256"/>
-            <ac:cxnSpMk id="37" creationId="{B87B5085-5F4A-4FA7-B2E1-B382455E2AC8}"/>
-          </ac:cxnSpMkLst>
-        </pc:cxnChg>
-      </pc:sldChg>
-      <pc:sldChg chg="addSp delSp modSp add">
-        <pc:chgData name="Nath,D,Dipankar,JSN4 R" userId="68ef5e1d-3575-420b-8e94-66a68a391843" providerId="ADAL" clId="{57BCC521-4B82-43AE-A548-7B8B4F1C3972}" dt="2019-09-23T11:01:13.481" v="707" actId="20577"/>
-        <pc:sldMkLst>
-          <pc:docMk/>
-          <pc:sldMk cId="2539858143" sldId="257"/>
-        </pc:sldMkLst>
-        <pc:spChg chg="mod">
-          <ac:chgData name="Nath,D,Dipankar,JSN4 R" userId="68ef5e1d-3575-420b-8e94-66a68a391843" providerId="ADAL" clId="{57BCC521-4B82-43AE-A548-7B8B4F1C3972}" dt="2019-09-23T11:00:14.035" v="675" actId="114"/>
-          <ac:spMkLst>
-            <pc:docMk/>
-            <pc:sldMk cId="2539858143" sldId="257"/>
-            <ac:spMk id="2" creationId="{34E7EA03-B2A3-4337-8FA8-3854CDFD1694}"/>
-          </ac:spMkLst>
-        </pc:spChg>
-        <pc:spChg chg="del">
-          <ac:chgData name="Nath,D,Dipankar,JSN4 R" userId="68ef5e1d-3575-420b-8e94-66a68a391843" providerId="ADAL" clId="{57BCC521-4B82-43AE-A548-7B8B4F1C3972}" dt="2019-09-23T06:29:12.892" v="18" actId="478"/>
-          <ac:spMkLst>
-            <pc:docMk/>
-            <pc:sldMk cId="2539858143" sldId="257"/>
-            <ac:spMk id="4" creationId="{D66223AA-9824-4FC5-908B-0A53C49D35D4}"/>
-          </ac:spMkLst>
-        </pc:spChg>
-        <pc:spChg chg="mod">
-          <ac:chgData name="Nath,D,Dipankar,JSN4 R" userId="68ef5e1d-3575-420b-8e94-66a68a391843" providerId="ADAL" clId="{57BCC521-4B82-43AE-A548-7B8B4F1C3972}" dt="2019-09-23T08:48:51.578" v="517" actId="1036"/>
-          <ac:spMkLst>
-            <pc:docMk/>
-            <pc:sldMk cId="2539858143" sldId="257"/>
-            <ac:spMk id="5" creationId="{64E72F56-5CC3-4D1C-BC04-ECBD7A1D4773}"/>
-          </ac:spMkLst>
-        </pc:spChg>
-        <pc:spChg chg="mod">
-          <ac:chgData name="Nath,D,Dipankar,JSN4 R" userId="68ef5e1d-3575-420b-8e94-66a68a391843" providerId="ADAL" clId="{57BCC521-4B82-43AE-A548-7B8B4F1C3972}" dt="2019-09-23T08:48:51.578" v="517" actId="1036"/>
-          <ac:spMkLst>
-            <pc:docMk/>
-            <pc:sldMk cId="2539858143" sldId="257"/>
-            <ac:spMk id="6" creationId="{488D355B-948F-47FC-BBCF-0B8EA172656C}"/>
-          </ac:spMkLst>
-        </pc:spChg>
-        <pc:spChg chg="mod">
-          <ac:chgData name="Nath,D,Dipankar,JSN4 R" userId="68ef5e1d-3575-420b-8e94-66a68a391843" providerId="ADAL" clId="{57BCC521-4B82-43AE-A548-7B8B4F1C3972}" dt="2019-09-23T08:48:51.578" v="517" actId="1036"/>
-          <ac:spMkLst>
-            <pc:docMk/>
-            <pc:sldMk cId="2539858143" sldId="257"/>
-            <ac:spMk id="7" creationId="{13DEF136-6826-4178-AD5A-CE65AECAE053}"/>
-          </ac:spMkLst>
-        </pc:spChg>
-        <pc:spChg chg="del">
-          <ac:chgData name="Nath,D,Dipankar,JSN4 R" userId="68ef5e1d-3575-420b-8e94-66a68a391843" providerId="ADAL" clId="{57BCC521-4B82-43AE-A548-7B8B4F1C3972}" dt="2019-09-23T06:29:12.892" v="18" actId="478"/>
-          <ac:spMkLst>
-            <pc:docMk/>
-            <pc:sldMk cId="2539858143" sldId="257"/>
-            <ac:spMk id="8" creationId="{C2748455-0466-4CB9-A103-39F0C9E0DE8C}"/>
-          </ac:spMkLst>
-        </pc:spChg>
-        <pc:spChg chg="del mod">
-          <ac:chgData name="Nath,D,Dipankar,JSN4 R" userId="68ef5e1d-3575-420b-8e94-66a68a391843" providerId="ADAL" clId="{57BCC521-4B82-43AE-A548-7B8B4F1C3972}" dt="2019-09-23T10:51:49.739" v="518" actId="478"/>
-          <ac:spMkLst>
-            <pc:docMk/>
-            <pc:sldMk cId="2539858143" sldId="257"/>
-            <ac:spMk id="13" creationId="{AADAAAA6-B721-44BF-8372-E8129AFCBF10}"/>
-          </ac:spMkLst>
-        </pc:spChg>
-        <pc:spChg chg="mod">
-          <ac:chgData name="Nath,D,Dipankar,JSN4 R" userId="68ef5e1d-3575-420b-8e94-66a68a391843" providerId="ADAL" clId="{57BCC521-4B82-43AE-A548-7B8B4F1C3972}" dt="2019-09-23T08:48:51.578" v="517" actId="1036"/>
-          <ac:spMkLst>
-            <pc:docMk/>
-            <pc:sldMk cId="2539858143" sldId="257"/>
-            <ac:spMk id="16" creationId="{BD906657-7720-4AC7-B53B-9F056D092227}"/>
-          </ac:spMkLst>
-        </pc:spChg>
-        <pc:spChg chg="mod">
-          <ac:chgData name="Nath,D,Dipankar,JSN4 R" userId="68ef5e1d-3575-420b-8e94-66a68a391843" providerId="ADAL" clId="{57BCC521-4B82-43AE-A548-7B8B4F1C3972}" dt="2019-09-23T08:48:51.578" v="517" actId="1036"/>
-          <ac:spMkLst>
-            <pc:docMk/>
-            <pc:sldMk cId="2539858143" sldId="257"/>
-            <ac:spMk id="17" creationId="{A4F4FFD8-A5B0-4FED-8E8D-26548960DD3E}"/>
-          </ac:spMkLst>
-        </pc:spChg>
-        <pc:spChg chg="add del">
-          <ac:chgData name="Nath,D,Dipankar,JSN4 R" userId="68ef5e1d-3575-420b-8e94-66a68a391843" providerId="ADAL" clId="{57BCC521-4B82-43AE-A548-7B8B4F1C3972}" dt="2019-09-23T06:29:56.742" v="86"/>
-          <ac:spMkLst>
-            <pc:docMk/>
-            <pc:sldMk cId="2539858143" sldId="257"/>
-            <ac:spMk id="26" creationId="{B2D389FA-5492-4182-9320-C3455F607CFE}"/>
-          </ac:spMkLst>
-        </pc:spChg>
-        <pc:spChg chg="add del">
-          <ac:chgData name="Nath,D,Dipankar,JSN4 R" userId="68ef5e1d-3575-420b-8e94-66a68a391843" providerId="ADAL" clId="{57BCC521-4B82-43AE-A548-7B8B4F1C3972}" dt="2019-09-23T06:29:56.742" v="86"/>
-          <ac:spMkLst>
-            <pc:docMk/>
-            <pc:sldMk cId="2539858143" sldId="257"/>
-            <ac:spMk id="27" creationId="{FD7FE0BD-63F3-4B98-8B35-4CCA0C6EAC4F}"/>
-          </ac:spMkLst>
-        </pc:spChg>
-        <pc:spChg chg="add del">
-          <ac:chgData name="Nath,D,Dipankar,JSN4 R" userId="68ef5e1d-3575-420b-8e94-66a68a391843" providerId="ADAL" clId="{57BCC521-4B82-43AE-A548-7B8B4F1C3972}" dt="2019-09-23T06:29:56.742" v="86"/>
-          <ac:spMkLst>
-            <pc:docMk/>
-            <pc:sldMk cId="2539858143" sldId="257"/>
-            <ac:spMk id="28" creationId="{3897E86C-5EE6-4852-A483-E6CBE3CD8F5A}"/>
-          </ac:spMkLst>
-        </pc:spChg>
-        <pc:spChg chg="mod">
-          <ac:chgData name="Nath,D,Dipankar,JSN4 R" userId="68ef5e1d-3575-420b-8e94-66a68a391843" providerId="ADAL" clId="{57BCC521-4B82-43AE-A548-7B8B4F1C3972}" dt="2019-09-23T08:48:51.578" v="517" actId="1036"/>
-          <ac:spMkLst>
-            <pc:docMk/>
-            <pc:sldMk cId="2539858143" sldId="257"/>
-            <ac:spMk id="29" creationId="{0C1F6C98-9D18-4803-9D4A-010A3965F8EE}"/>
-          </ac:spMkLst>
-        </pc:spChg>
-        <pc:spChg chg="add del">
-          <ac:chgData name="Nath,D,Dipankar,JSN4 R" userId="68ef5e1d-3575-420b-8e94-66a68a391843" providerId="ADAL" clId="{57BCC521-4B82-43AE-A548-7B8B4F1C3972}" dt="2019-09-23T06:29:56.742" v="86"/>
-          <ac:spMkLst>
-            <pc:docMk/>
-            <pc:sldMk cId="2539858143" sldId="257"/>
-            <ac:spMk id="30" creationId="{F0AA7496-2FAC-43CF-9837-E9CE7CBAE845}"/>
-          </ac:spMkLst>
-        </pc:spChg>
-        <pc:spChg chg="del">
-          <ac:chgData name="Nath,D,Dipankar,JSN4 R" userId="68ef5e1d-3575-420b-8e94-66a68a391843" providerId="ADAL" clId="{57BCC521-4B82-43AE-A548-7B8B4F1C3972}" dt="2019-09-23T06:29:12.892" v="18" actId="478"/>
-          <ac:spMkLst>
-            <pc:docMk/>
-            <pc:sldMk cId="2539858143" sldId="257"/>
-            <ac:spMk id="31" creationId="{AB7401FE-5AC9-436F-9BF4-F929F445F68E}"/>
-          </ac:spMkLst>
-        </pc:spChg>
-        <pc:spChg chg="mod">
-          <ac:chgData name="Nath,D,Dipankar,JSN4 R" userId="68ef5e1d-3575-420b-8e94-66a68a391843" providerId="ADAL" clId="{57BCC521-4B82-43AE-A548-7B8B4F1C3972}" dt="2019-09-23T10:59:26.375" v="659" actId="1076"/>
-          <ac:spMkLst>
-            <pc:docMk/>
-            <pc:sldMk cId="2539858143" sldId="257"/>
-            <ac:spMk id="32" creationId="{64A260CF-4BDC-4678-AAD1-0A6748665567}"/>
-          </ac:spMkLst>
-        </pc:spChg>
-        <pc:spChg chg="del mod">
-          <ac:chgData name="Nath,D,Dipankar,JSN4 R" userId="68ef5e1d-3575-420b-8e94-66a68a391843" providerId="ADAL" clId="{57BCC521-4B82-43AE-A548-7B8B4F1C3972}" dt="2019-09-23T10:59:14.360" v="657" actId="478"/>
-          <ac:spMkLst>
-            <pc:docMk/>
-            <pc:sldMk cId="2539858143" sldId="257"/>
-            <ac:spMk id="33" creationId="{36F942B9-5371-4426-AF4C-C53ABEA65550}"/>
-          </ac:spMkLst>
-        </pc:spChg>
-        <pc:spChg chg="del mod">
-          <ac:chgData name="Nath,D,Dipankar,JSN4 R" userId="68ef5e1d-3575-420b-8e94-66a68a391843" providerId="ADAL" clId="{57BCC521-4B82-43AE-A548-7B8B4F1C3972}" dt="2019-09-23T10:59:29.560" v="660" actId="478"/>
-          <ac:spMkLst>
-            <pc:docMk/>
-            <pc:sldMk cId="2539858143" sldId="257"/>
-            <ac:spMk id="34" creationId="{740F9285-6E61-44D5-B5E6-7998B7AAF212}"/>
-          </ac:spMkLst>
-        </pc:spChg>
-        <pc:spChg chg="del mod">
-          <ac:chgData name="Nath,D,Dipankar,JSN4 R" userId="68ef5e1d-3575-420b-8e94-66a68a391843" providerId="ADAL" clId="{57BCC521-4B82-43AE-A548-7B8B4F1C3972}" dt="2019-09-23T10:56:37.079" v="636" actId="478"/>
-          <ac:spMkLst>
-            <pc:docMk/>
-            <pc:sldMk cId="2539858143" sldId="257"/>
-            <ac:spMk id="35" creationId="{EF2CF209-B2C6-49A3-A921-CAB5AE58AC20}"/>
-          </ac:spMkLst>
-        </pc:spChg>
-        <pc:spChg chg="add del">
-          <ac:chgData name="Nath,D,Dipankar,JSN4 R" userId="68ef5e1d-3575-420b-8e94-66a68a391843" providerId="ADAL" clId="{57BCC521-4B82-43AE-A548-7B8B4F1C3972}" dt="2019-09-23T06:29:56.742" v="86"/>
-          <ac:spMkLst>
-            <pc:docMk/>
-            <pc:sldMk cId="2539858143" sldId="257"/>
-            <ac:spMk id="36" creationId="{61CFDFC2-8D31-4493-8C0A-A8CDCFA1CFFF}"/>
-          </ac:spMkLst>
-        </pc:spChg>
-        <pc:spChg chg="add del">
-          <ac:chgData name="Nath,D,Dipankar,JSN4 R" userId="68ef5e1d-3575-420b-8e94-66a68a391843" providerId="ADAL" clId="{57BCC521-4B82-43AE-A548-7B8B4F1C3972}" dt="2019-09-23T06:29:56.742" v="86"/>
-          <ac:spMkLst>
-            <pc:docMk/>
-            <pc:sldMk cId="2539858143" sldId="257"/>
-            <ac:spMk id="38" creationId="{D74A7A91-9255-4405-89D7-7AF18991DA25}"/>
-          </ac:spMkLst>
-        </pc:spChg>
-        <pc:spChg chg="add mod">
-          <ac:chgData name="Nath,D,Dipankar,JSN4 R" userId="68ef5e1d-3575-420b-8e94-66a68a391843" providerId="ADAL" clId="{57BCC521-4B82-43AE-A548-7B8B4F1C3972}" dt="2019-09-23T06:59:18.526" v="270" actId="1037"/>
-          <ac:spMkLst>
-            <pc:docMk/>
-            <pc:sldMk cId="2539858143" sldId="257"/>
-            <ac:spMk id="39" creationId="{6AE01B17-E02D-4B0C-9413-5383BE6A78AD}"/>
-          </ac:spMkLst>
-        </pc:spChg>
-        <pc:spChg chg="add mod">
-          <ac:chgData name="Nath,D,Dipankar,JSN4 R" userId="68ef5e1d-3575-420b-8e94-66a68a391843" providerId="ADAL" clId="{57BCC521-4B82-43AE-A548-7B8B4F1C3972}" dt="2019-09-23T06:59:18.526" v="270" actId="1037"/>
-          <ac:spMkLst>
-            <pc:docMk/>
-            <pc:sldMk cId="2539858143" sldId="257"/>
-            <ac:spMk id="40" creationId="{5B1C2100-88BD-413B-81F9-786A219B90D0}"/>
-          </ac:spMkLst>
-        </pc:spChg>
-        <pc:spChg chg="add mod">
-          <ac:chgData name="Nath,D,Dipankar,JSN4 R" userId="68ef5e1d-3575-420b-8e94-66a68a391843" providerId="ADAL" clId="{57BCC521-4B82-43AE-A548-7B8B4F1C3972}" dt="2019-09-23T06:59:18.526" v="270" actId="1037"/>
-          <ac:spMkLst>
-            <pc:docMk/>
-            <pc:sldMk cId="2539858143" sldId="257"/>
-            <ac:spMk id="41" creationId="{EB7C1DDD-32DC-48A0-8F46-83368F07CEEF}"/>
-          </ac:spMkLst>
-        </pc:spChg>
-        <pc:spChg chg="add mod">
-          <ac:chgData name="Nath,D,Dipankar,JSN4 R" userId="68ef5e1d-3575-420b-8e94-66a68a391843" providerId="ADAL" clId="{57BCC521-4B82-43AE-A548-7B8B4F1C3972}" dt="2019-09-23T06:59:18.526" v="270" actId="1037"/>
-          <ac:spMkLst>
-            <pc:docMk/>
-            <pc:sldMk cId="2539858143" sldId="257"/>
-            <ac:spMk id="42" creationId="{3E444187-2910-4152-9516-2F66FD05E8BF}"/>
-          </ac:spMkLst>
-        </pc:spChg>
-        <pc:spChg chg="add mod">
-          <ac:chgData name="Nath,D,Dipankar,JSN4 R" userId="68ef5e1d-3575-420b-8e94-66a68a391843" providerId="ADAL" clId="{57BCC521-4B82-43AE-A548-7B8B4F1C3972}" dt="2019-09-23T06:59:18.526" v="270" actId="1037"/>
-          <ac:spMkLst>
-            <pc:docMk/>
-            <pc:sldMk cId="2539858143" sldId="257"/>
-            <ac:spMk id="43" creationId="{7A14D1C7-612D-44ED-9C42-11C268E74308}"/>
-          </ac:spMkLst>
-        </pc:spChg>
-        <pc:spChg chg="add mod">
-          <ac:chgData name="Nath,D,Dipankar,JSN4 R" userId="68ef5e1d-3575-420b-8e94-66a68a391843" providerId="ADAL" clId="{57BCC521-4B82-43AE-A548-7B8B4F1C3972}" dt="2019-09-23T06:59:18.526" v="270" actId="1037"/>
-          <ac:spMkLst>
-            <pc:docMk/>
-            <pc:sldMk cId="2539858143" sldId="257"/>
-            <ac:spMk id="44" creationId="{DD43DEC2-0FAE-4740-BD8E-A6C06F36A528}"/>
-          </ac:spMkLst>
-        </pc:spChg>
-        <pc:spChg chg="add mod">
-          <ac:chgData name="Nath,D,Dipankar,JSN4 R" userId="68ef5e1d-3575-420b-8e94-66a68a391843" providerId="ADAL" clId="{57BCC521-4B82-43AE-A548-7B8B4F1C3972}" dt="2019-09-23T06:59:18.526" v="270" actId="1037"/>
-          <ac:spMkLst>
-            <pc:docMk/>
-            <pc:sldMk cId="2539858143" sldId="257"/>
-            <ac:spMk id="45" creationId="{238A7B8E-095F-488F-8D1E-B5ABC2880FA8}"/>
-          </ac:spMkLst>
-        </pc:spChg>
-        <pc:spChg chg="add mod">
-          <ac:chgData name="Nath,D,Dipankar,JSN4 R" userId="68ef5e1d-3575-420b-8e94-66a68a391843" providerId="ADAL" clId="{57BCC521-4B82-43AE-A548-7B8B4F1C3972}" dt="2019-09-23T06:59:18.526" v="270" actId="1037"/>
-          <ac:spMkLst>
-            <pc:docMk/>
-            <pc:sldMk cId="2539858143" sldId="257"/>
-            <ac:spMk id="46" creationId="{45FB0751-943B-41E1-8175-68A81C9C6004}"/>
-          </ac:spMkLst>
-        </pc:spChg>
-        <pc:spChg chg="add del mod">
-          <ac:chgData name="Nath,D,Dipankar,JSN4 R" userId="68ef5e1d-3575-420b-8e94-66a68a391843" providerId="ADAL" clId="{57BCC521-4B82-43AE-A548-7B8B4F1C3972}" dt="2019-09-23T10:58:11.543" v="650" actId="478"/>
-          <ac:spMkLst>
-            <pc:docMk/>
-            <pc:sldMk cId="2539858143" sldId="257"/>
-            <ac:spMk id="85" creationId="{FC52DCEF-1309-4EFA-BDC2-16193D95502C}"/>
-          </ac:spMkLst>
-        </pc:spChg>
-        <pc:spChg chg="add mod">
-          <ac:chgData name="Nath,D,Dipankar,JSN4 R" userId="68ef5e1d-3575-420b-8e94-66a68a391843" providerId="ADAL" clId="{57BCC521-4B82-43AE-A548-7B8B4F1C3972}" dt="2019-09-23T10:53:08.833" v="527" actId="1076"/>
-          <ac:spMkLst>
-            <pc:docMk/>
-            <pc:sldMk cId="2539858143" sldId="257"/>
-            <ac:spMk id="103" creationId="{79A2E817-A7FB-4BAB-88ED-0EC14AF76E8D}"/>
-          </ac:spMkLst>
-        </pc:spChg>
-        <pc:spChg chg="add mod">
-          <ac:chgData name="Nath,D,Dipankar,JSN4 R" userId="68ef5e1d-3575-420b-8e94-66a68a391843" providerId="ADAL" clId="{57BCC521-4B82-43AE-A548-7B8B4F1C3972}" dt="2019-09-23T10:53:20.791" v="529" actId="1076"/>
-          <ac:spMkLst>
-            <pc:docMk/>
-            <pc:sldMk cId="2539858143" sldId="257"/>
-            <ac:spMk id="104" creationId="{A0A5B050-B229-4620-9977-2ADCDABEF20E}"/>
-          </ac:spMkLst>
-        </pc:spChg>
-        <pc:spChg chg="add mod">
-          <ac:chgData name="Nath,D,Dipankar,JSN4 R" userId="68ef5e1d-3575-420b-8e94-66a68a391843" providerId="ADAL" clId="{57BCC521-4B82-43AE-A548-7B8B4F1C3972}" dt="2019-09-23T10:53:33.840" v="531" actId="1076"/>
-          <ac:spMkLst>
-            <pc:docMk/>
-            <pc:sldMk cId="2539858143" sldId="257"/>
-            <ac:spMk id="113" creationId="{3085BBF0-E1CF-4D6E-85DC-365D9C558D22}"/>
-          </ac:spMkLst>
-        </pc:spChg>
-        <pc:spChg chg="add del mod">
-          <ac:chgData name="Nath,D,Dipankar,JSN4 R" userId="68ef5e1d-3575-420b-8e94-66a68a391843" providerId="ADAL" clId="{57BCC521-4B82-43AE-A548-7B8B4F1C3972}" dt="2019-09-23T10:56:17.229" v="631" actId="478"/>
-          <ac:spMkLst>
-            <pc:docMk/>
-            <pc:sldMk cId="2539858143" sldId="257"/>
-            <ac:spMk id="140" creationId="{38CD408A-FE41-4A76-80BE-BB558ECC853A}"/>
-          </ac:spMkLst>
-        </pc:spChg>
-        <pc:spChg chg="add del mod">
-          <ac:chgData name="Nath,D,Dipankar,JSN4 R" userId="68ef5e1d-3575-420b-8e94-66a68a391843" providerId="ADAL" clId="{57BCC521-4B82-43AE-A548-7B8B4F1C3972}" dt="2019-09-23T10:56:11.100" v="630"/>
-          <ac:spMkLst>
-            <pc:docMk/>
-            <pc:sldMk cId="2539858143" sldId="257"/>
-            <ac:spMk id="147" creationId="{22ACFE5A-9F5A-499F-B66A-78BA3419C1A9}"/>
-          </ac:spMkLst>
-        </pc:spChg>
-        <pc:spChg chg="add mod">
-          <ac:chgData name="Nath,D,Dipankar,JSN4 R" userId="68ef5e1d-3575-420b-8e94-66a68a391843" providerId="ADAL" clId="{57BCC521-4B82-43AE-A548-7B8B4F1C3972}" dt="2019-09-23T11:00:20.106" v="676" actId="20577"/>
-          <ac:spMkLst>
-            <pc:docMk/>
-            <pc:sldMk cId="2539858143" sldId="257"/>
-            <ac:spMk id="149" creationId="{70E3A410-420D-409A-B570-37A7A3D5DCFD}"/>
-          </ac:spMkLst>
-        </pc:spChg>
-        <pc:spChg chg="add del mod">
-          <ac:chgData name="Nath,D,Dipankar,JSN4 R" userId="68ef5e1d-3575-420b-8e94-66a68a391843" providerId="ADAL" clId="{57BCC521-4B82-43AE-A548-7B8B4F1C3972}" dt="2019-09-23T10:58:13.163" v="651" actId="478"/>
-          <ac:spMkLst>
-            <pc:docMk/>
-            <pc:sldMk cId="2539858143" sldId="257"/>
-            <ac:spMk id="150" creationId="{FDFCA58B-BE7C-41FF-9D4E-FD51125EC100}"/>
-          </ac:spMkLst>
-        </pc:spChg>
-        <pc:spChg chg="add mod">
-          <ac:chgData name="Nath,D,Dipankar,JSN4 R" userId="68ef5e1d-3575-420b-8e94-66a68a391843" providerId="ADAL" clId="{57BCC521-4B82-43AE-A548-7B8B4F1C3972}" dt="2019-09-23T11:00:23.374" v="677" actId="20577"/>
-          <ac:spMkLst>
-            <pc:docMk/>
-            <pc:sldMk cId="2539858143" sldId="257"/>
-            <ac:spMk id="158" creationId="{3302CDF6-5908-463A-94AC-CF8F267D03CD}"/>
-          </ac:spMkLst>
-        </pc:spChg>
-        <pc:spChg chg="add del mod">
-          <ac:chgData name="Nath,D,Dipankar,JSN4 R" userId="68ef5e1d-3575-420b-8e94-66a68a391843" providerId="ADAL" clId="{57BCC521-4B82-43AE-A548-7B8B4F1C3972}" dt="2019-09-23T10:58:14.928" v="652" actId="478"/>
-          <ac:spMkLst>
-            <pc:docMk/>
-            <pc:sldMk cId="2539858143" sldId="257"/>
-            <ac:spMk id="159" creationId="{E6FE4651-D741-495D-92F3-74EE20188833}"/>
-          </ac:spMkLst>
-        </pc:spChg>
-        <pc:spChg chg="add mod">
-          <ac:chgData name="Nath,D,Dipankar,JSN4 R" userId="68ef5e1d-3575-420b-8e94-66a68a391843" providerId="ADAL" clId="{57BCC521-4B82-43AE-A548-7B8B4F1C3972}" dt="2019-09-23T10:57:45.595" v="641" actId="20577"/>
-          <ac:spMkLst>
-            <pc:docMk/>
-            <pc:sldMk cId="2539858143" sldId="257"/>
-            <ac:spMk id="166" creationId="{B6C0BDB7-7EED-41CC-B57A-267CD431FC5A}"/>
-          </ac:spMkLst>
-        </pc:spChg>
-        <pc:spChg chg="add mod">
-          <ac:chgData name="Nath,D,Dipankar,JSN4 R" userId="68ef5e1d-3575-420b-8e94-66a68a391843" providerId="ADAL" clId="{57BCC521-4B82-43AE-A548-7B8B4F1C3972}" dt="2019-09-23T10:57:55.579" v="645" actId="20577"/>
-          <ac:spMkLst>
-            <pc:docMk/>
-            <pc:sldMk cId="2539858143" sldId="257"/>
-            <ac:spMk id="167" creationId="{A0807527-8900-4352-A6F4-3B0581078FE9}"/>
-          </ac:spMkLst>
-        </pc:spChg>
-        <pc:spChg chg="add mod">
-          <ac:chgData name="Nath,D,Dipankar,JSN4 R" userId="68ef5e1d-3575-420b-8e94-66a68a391843" providerId="ADAL" clId="{57BCC521-4B82-43AE-A548-7B8B4F1C3972}" dt="2019-09-23T10:58:06.347" v="649" actId="20577"/>
-          <ac:spMkLst>
-            <pc:docMk/>
-            <pc:sldMk cId="2539858143" sldId="257"/>
-            <ac:spMk id="168" creationId="{C8A7EA2A-0518-48C9-8E0E-EF78914A3C61}"/>
-          </ac:spMkLst>
-        </pc:spChg>
-        <pc:spChg chg="add mod">
-          <ac:chgData name="Nath,D,Dipankar,JSN4 R" userId="68ef5e1d-3575-420b-8e94-66a68a391843" providerId="ADAL" clId="{57BCC521-4B82-43AE-A548-7B8B4F1C3972}" dt="2019-09-23T10:59:40.139" v="666" actId="20577"/>
-          <ac:spMkLst>
-            <pc:docMk/>
-            <pc:sldMk cId="2539858143" sldId="257"/>
-            <ac:spMk id="169" creationId="{CD9134E1-0CA4-4258-93ED-2B91293C274F}"/>
-          </ac:spMkLst>
-        </pc:spChg>
-        <pc:spChg chg="add mod">
-          <ac:chgData name="Nath,D,Dipankar,JSN4 R" userId="68ef5e1d-3575-420b-8e94-66a68a391843" providerId="ADAL" clId="{57BCC521-4B82-43AE-A548-7B8B4F1C3972}" dt="2019-09-23T10:59:51.135" v="669" actId="20577"/>
-          <ac:spMkLst>
-            <pc:docMk/>
-            <pc:sldMk cId="2539858143" sldId="257"/>
-            <ac:spMk id="170" creationId="{671AFC6B-6AB0-469E-9026-FB0CD9341919}"/>
-          </ac:spMkLst>
-        </pc:spChg>
-        <pc:spChg chg="add mod">
-          <ac:chgData name="Nath,D,Dipankar,JSN4 R" userId="68ef5e1d-3575-420b-8e94-66a68a391843" providerId="ADAL" clId="{57BCC521-4B82-43AE-A548-7B8B4F1C3972}" dt="2019-09-23T11:01:13.481" v="707" actId="20577"/>
-          <ac:spMkLst>
-            <pc:docMk/>
-            <pc:sldMk cId="2539858143" sldId="257"/>
-            <ac:spMk id="171" creationId="{9917BE89-DD91-4E22-8ABC-ED1F24EA611B}"/>
-          </ac:spMkLst>
-        </pc:spChg>
-        <pc:cxnChg chg="mod">
-          <ac:chgData name="Nath,D,Dipankar,JSN4 R" userId="68ef5e1d-3575-420b-8e94-66a68a391843" providerId="ADAL" clId="{57BCC521-4B82-43AE-A548-7B8B4F1C3972}" dt="2019-09-23T08:48:51.578" v="517" actId="1036"/>
-          <ac:cxnSpMkLst>
-            <pc:docMk/>
-            <pc:sldMk cId="2539858143" sldId="257"/>
-            <ac:cxnSpMk id="9" creationId="{A27A610E-D81C-410B-93C3-D2935C3EF2A9}"/>
-          </ac:cxnSpMkLst>
-        </pc:cxnChg>
-        <pc:cxnChg chg="mod">
-          <ac:chgData name="Nath,D,Dipankar,JSN4 R" userId="68ef5e1d-3575-420b-8e94-66a68a391843" providerId="ADAL" clId="{57BCC521-4B82-43AE-A548-7B8B4F1C3972}" dt="2019-09-23T08:48:51.578" v="517" actId="1036"/>
-          <ac:cxnSpMkLst>
-            <pc:docMk/>
-            <pc:sldMk cId="2539858143" sldId="257"/>
-            <ac:cxnSpMk id="10" creationId="{6C08CEB9-2558-400F-A206-61AAC2738734}"/>
-          </ac:cxnSpMkLst>
-        </pc:cxnChg>
-        <pc:cxnChg chg="mod">
-          <ac:chgData name="Nath,D,Dipankar,JSN4 R" userId="68ef5e1d-3575-420b-8e94-66a68a391843" providerId="ADAL" clId="{57BCC521-4B82-43AE-A548-7B8B4F1C3972}" dt="2019-09-23T08:48:51.578" v="517" actId="1036"/>
-          <ac:cxnSpMkLst>
-            <pc:docMk/>
-            <pc:sldMk cId="2539858143" sldId="257"/>
-            <ac:cxnSpMk id="11" creationId="{D4ADC2EB-E9D0-4137-ADF5-FCBA474253A5}"/>
-          </ac:cxnSpMkLst>
-        </pc:cxnChg>
-        <pc:cxnChg chg="del">
-          <ac:chgData name="Nath,D,Dipankar,JSN4 R" userId="68ef5e1d-3575-420b-8e94-66a68a391843" providerId="ADAL" clId="{57BCC521-4B82-43AE-A548-7B8B4F1C3972}" dt="2019-09-23T06:29:12.892" v="18" actId="478"/>
-          <ac:cxnSpMkLst>
-            <pc:docMk/>
-            <pc:sldMk cId="2539858143" sldId="257"/>
-            <ac:cxnSpMk id="12" creationId="{D3F4EFF1-BDDD-4495-A99B-0752FF874922}"/>
-          </ac:cxnSpMkLst>
-        </pc:cxnChg>
-        <pc:cxnChg chg="mod">
-          <ac:chgData name="Nath,D,Dipankar,JSN4 R" userId="68ef5e1d-3575-420b-8e94-66a68a391843" providerId="ADAL" clId="{57BCC521-4B82-43AE-A548-7B8B4F1C3972}" dt="2019-09-23T08:48:51.578" v="517" actId="1036"/>
-          <ac:cxnSpMkLst>
-            <pc:docMk/>
-            <pc:sldMk cId="2539858143" sldId="257"/>
-            <ac:cxnSpMk id="18" creationId="{84D61050-D4C0-4AA8-9FFF-BDC8F533FB20}"/>
-          </ac:cxnSpMkLst>
-        </pc:cxnChg>
-        <pc:cxnChg chg="del mod">
-          <ac:chgData name="Nath,D,Dipankar,JSN4 R" userId="68ef5e1d-3575-420b-8e94-66a68a391843" providerId="ADAL" clId="{57BCC521-4B82-43AE-A548-7B8B4F1C3972}" dt="2019-09-23T06:29:30.832" v="49" actId="478"/>
-          <ac:cxnSpMkLst>
-            <pc:docMk/>
-            <pc:sldMk cId="2539858143" sldId="257"/>
-            <ac:cxnSpMk id="21" creationId="{0AE5445B-B05C-4DC2-B0A4-5B5E830FE310}"/>
-          </ac:cxnSpMkLst>
-        </pc:cxnChg>
-        <pc:cxnChg chg="del mod">
-          <ac:chgData name="Nath,D,Dipankar,JSN4 R" userId="68ef5e1d-3575-420b-8e94-66a68a391843" providerId="ADAL" clId="{57BCC521-4B82-43AE-A548-7B8B4F1C3972}" dt="2019-09-23T06:29:31.658" v="50" actId="478"/>
-          <ac:cxnSpMkLst>
-            <pc:docMk/>
-            <pc:sldMk cId="2539858143" sldId="257"/>
-            <ac:cxnSpMk id="23" creationId="{F22A3EE4-9970-4E37-8A9B-B916583D489B}"/>
-          </ac:cxnSpMkLst>
-        </pc:cxnChg>
-        <pc:cxnChg chg="del mod">
-          <ac:chgData name="Nath,D,Dipankar,JSN4 R" userId="68ef5e1d-3575-420b-8e94-66a68a391843" providerId="ADAL" clId="{57BCC521-4B82-43AE-A548-7B8B4F1C3972}" dt="2019-09-23T06:29:32.554" v="51" actId="478"/>
-          <ac:cxnSpMkLst>
-            <pc:docMk/>
-            <pc:sldMk cId="2539858143" sldId="257"/>
-            <ac:cxnSpMk id="25" creationId="{39EFF91E-4F63-4A5D-B5CF-8C36587FC3B0}"/>
-          </ac:cxnSpMkLst>
-        </pc:cxnChg>
-        <pc:cxnChg chg="mod">
-          <ac:chgData name="Nath,D,Dipankar,JSN4 R" userId="68ef5e1d-3575-420b-8e94-66a68a391843" providerId="ADAL" clId="{57BCC521-4B82-43AE-A548-7B8B4F1C3972}" dt="2019-09-23T10:55:52.345" v="559" actId="1076"/>
-          <ac:cxnSpMkLst>
-            <pc:docMk/>
-            <pc:sldMk cId="2539858143" sldId="257"/>
-            <ac:cxnSpMk id="37" creationId="{B87B5085-5F4A-4FA7-B2E1-B382455E2AC8}"/>
-          </ac:cxnSpMkLst>
-        </pc:cxnChg>
-        <pc:cxnChg chg="add mod">
-          <ac:chgData name="Nath,D,Dipankar,JSN4 R" userId="68ef5e1d-3575-420b-8e94-66a68a391843" providerId="ADAL" clId="{57BCC521-4B82-43AE-A548-7B8B4F1C3972}" dt="2019-09-23T08:48:51.578" v="517" actId="1036"/>
-          <ac:cxnSpMkLst>
-            <pc:docMk/>
-            <pc:sldMk cId="2539858143" sldId="257"/>
-            <ac:cxnSpMk id="47" creationId="{8516F72E-D7A2-4864-AD6C-8E4B73AAF615}"/>
-          </ac:cxnSpMkLst>
-        </pc:cxnChg>
-        <pc:cxnChg chg="add mod">
-          <ac:chgData name="Nath,D,Dipankar,JSN4 R" userId="68ef5e1d-3575-420b-8e94-66a68a391843" providerId="ADAL" clId="{57BCC521-4B82-43AE-A548-7B8B4F1C3972}" dt="2019-09-23T08:48:51.578" v="517" actId="1036"/>
-          <ac:cxnSpMkLst>
-            <pc:docMk/>
-            <pc:sldMk cId="2539858143" sldId="257"/>
-            <ac:cxnSpMk id="48" creationId="{E96B446A-6A8F-4FF1-823B-C1CDE3F40292}"/>
-          </ac:cxnSpMkLst>
-        </pc:cxnChg>
-        <pc:cxnChg chg="add mod">
-          <ac:chgData name="Nath,D,Dipankar,JSN4 R" userId="68ef5e1d-3575-420b-8e94-66a68a391843" providerId="ADAL" clId="{57BCC521-4B82-43AE-A548-7B8B4F1C3972}" dt="2019-09-23T08:48:51.578" v="517" actId="1036"/>
-          <ac:cxnSpMkLst>
-            <pc:docMk/>
-            <pc:sldMk cId="2539858143" sldId="257"/>
-            <ac:cxnSpMk id="49" creationId="{19438947-4292-4E0D-8FFA-61015F24CDCE}"/>
-          </ac:cxnSpMkLst>
-        </pc:cxnChg>
-        <pc:cxnChg chg="add mod">
-          <ac:chgData name="Nath,D,Dipankar,JSN4 R" userId="68ef5e1d-3575-420b-8e94-66a68a391843" providerId="ADAL" clId="{57BCC521-4B82-43AE-A548-7B8B4F1C3972}" dt="2019-09-23T08:48:51.578" v="517" actId="1036"/>
-          <ac:cxnSpMkLst>
-            <pc:docMk/>
-            <pc:sldMk cId="2539858143" sldId="257"/>
-            <ac:cxnSpMk id="51" creationId="{1AFF5E69-64EB-4BB3-8EC7-76D3BD5D5646}"/>
-          </ac:cxnSpMkLst>
-        </pc:cxnChg>
-        <pc:cxnChg chg="add mod">
-          <ac:chgData name="Nath,D,Dipankar,JSN4 R" userId="68ef5e1d-3575-420b-8e94-66a68a391843" providerId="ADAL" clId="{57BCC521-4B82-43AE-A548-7B8B4F1C3972}" dt="2019-09-23T08:48:51.578" v="517" actId="1036"/>
-          <ac:cxnSpMkLst>
-            <pc:docMk/>
-            <pc:sldMk cId="2539858143" sldId="257"/>
-            <ac:cxnSpMk id="54" creationId="{AED91834-1D44-4ED2-858F-FA5F354E490A}"/>
-          </ac:cxnSpMkLst>
-        </pc:cxnChg>
-        <pc:cxnChg chg="add mod">
-          <ac:chgData name="Nath,D,Dipankar,JSN4 R" userId="68ef5e1d-3575-420b-8e94-66a68a391843" providerId="ADAL" clId="{57BCC521-4B82-43AE-A548-7B8B4F1C3972}" dt="2019-09-23T08:48:51.578" v="517" actId="1036"/>
-          <ac:cxnSpMkLst>
-            <pc:docMk/>
-            <pc:sldMk cId="2539858143" sldId="257"/>
-            <ac:cxnSpMk id="57" creationId="{C6A9087B-88A7-4633-B02A-516A1A4738E9}"/>
-          </ac:cxnSpMkLst>
-        </pc:cxnChg>
-        <pc:cxnChg chg="add mod">
-          <ac:chgData name="Nath,D,Dipankar,JSN4 R" userId="68ef5e1d-3575-420b-8e94-66a68a391843" providerId="ADAL" clId="{57BCC521-4B82-43AE-A548-7B8B4F1C3972}" dt="2019-09-23T08:48:51.578" v="517" actId="1036"/>
-          <ac:cxnSpMkLst>
-            <pc:docMk/>
-            <pc:sldMk cId="2539858143" sldId="257"/>
-            <ac:cxnSpMk id="60" creationId="{D92A2F1F-10D0-4ABF-B195-70646AA6ECB6}"/>
-          </ac:cxnSpMkLst>
-        </pc:cxnChg>
-        <pc:cxnChg chg="add mod">
-          <ac:chgData name="Nath,D,Dipankar,JSN4 R" userId="68ef5e1d-3575-420b-8e94-66a68a391843" providerId="ADAL" clId="{57BCC521-4B82-43AE-A548-7B8B4F1C3972}" dt="2019-09-23T08:48:51.578" v="517" actId="1036"/>
-          <ac:cxnSpMkLst>
-            <pc:docMk/>
-            <pc:sldMk cId="2539858143" sldId="257"/>
-            <ac:cxnSpMk id="63" creationId="{673E1280-A610-4DC4-AF8A-BDC380EA397C}"/>
-          </ac:cxnSpMkLst>
-        </pc:cxnChg>
-        <pc:cxnChg chg="add mod">
-          <ac:chgData name="Nath,D,Dipankar,JSN4 R" userId="68ef5e1d-3575-420b-8e94-66a68a391843" providerId="ADAL" clId="{57BCC521-4B82-43AE-A548-7B8B4F1C3972}" dt="2019-09-23T08:48:51.578" v="517" actId="1036"/>
-          <ac:cxnSpMkLst>
-            <pc:docMk/>
-            <pc:sldMk cId="2539858143" sldId="257"/>
-            <ac:cxnSpMk id="66" creationId="{2AF8DD20-701F-47B3-8DFB-A9C7C659FDC7}"/>
-          </ac:cxnSpMkLst>
-        </pc:cxnChg>
-        <pc:cxnChg chg="add mod">
-          <ac:chgData name="Nath,D,Dipankar,JSN4 R" userId="68ef5e1d-3575-420b-8e94-66a68a391843" providerId="ADAL" clId="{57BCC521-4B82-43AE-A548-7B8B4F1C3972}" dt="2019-09-23T08:48:51.578" v="517" actId="1036"/>
-          <ac:cxnSpMkLst>
-            <pc:docMk/>
-            <pc:sldMk cId="2539858143" sldId="257"/>
-            <ac:cxnSpMk id="69" creationId="{2B48E7D1-C1A3-49C5-B46C-227E532855D3}"/>
-          </ac:cxnSpMkLst>
-        </pc:cxnChg>
-        <pc:cxnChg chg="add mod">
-          <ac:chgData name="Nath,D,Dipankar,JSN4 R" userId="68ef5e1d-3575-420b-8e94-66a68a391843" providerId="ADAL" clId="{57BCC521-4B82-43AE-A548-7B8B4F1C3972}" dt="2019-09-23T10:53:08.833" v="527" actId="1076"/>
-          <ac:cxnSpMkLst>
-            <pc:docMk/>
-            <pc:sldMk cId="2539858143" sldId="257"/>
-            <ac:cxnSpMk id="72" creationId="{FB65906D-E410-4161-8C80-B7D364F34E9B}"/>
-          </ac:cxnSpMkLst>
-        </pc:cxnChg>
-        <pc:cxnChg chg="add mod">
-          <ac:chgData name="Nath,D,Dipankar,JSN4 R" userId="68ef5e1d-3575-420b-8e94-66a68a391843" providerId="ADAL" clId="{57BCC521-4B82-43AE-A548-7B8B4F1C3972}" dt="2019-09-23T10:53:08.833" v="527" actId="1076"/>
-          <ac:cxnSpMkLst>
-            <pc:docMk/>
-            <pc:sldMk cId="2539858143" sldId="257"/>
-            <ac:cxnSpMk id="75" creationId="{E2B9CB7E-1D9D-4043-9378-160BB7BDB596}"/>
-          </ac:cxnSpMkLst>
-        </pc:cxnChg>
-        <pc:cxnChg chg="add mod">
-          <ac:chgData name="Nath,D,Dipankar,JSN4 R" userId="68ef5e1d-3575-420b-8e94-66a68a391843" providerId="ADAL" clId="{57BCC521-4B82-43AE-A548-7B8B4F1C3972}" dt="2019-09-23T10:53:08.833" v="527" actId="1076"/>
-          <ac:cxnSpMkLst>
-            <pc:docMk/>
-            <pc:sldMk cId="2539858143" sldId="257"/>
-            <ac:cxnSpMk id="78" creationId="{4DB0BDF1-E355-4552-AE6F-DEE19D7509DF}"/>
-          </ac:cxnSpMkLst>
-        </pc:cxnChg>
-        <pc:cxnChg chg="add del mod">
-          <ac:chgData name="Nath,D,Dipankar,JSN4 R" userId="68ef5e1d-3575-420b-8e94-66a68a391843" providerId="ADAL" clId="{57BCC521-4B82-43AE-A548-7B8B4F1C3972}" dt="2019-09-23T10:54:04.438" v="542"/>
-          <ac:cxnSpMkLst>
-            <pc:docMk/>
-            <pc:sldMk cId="2539858143" sldId="257"/>
-            <ac:cxnSpMk id="81" creationId="{A1E8012D-F20F-4724-86E8-A506A3CB7A3A}"/>
-          </ac:cxnSpMkLst>
-        </pc:cxnChg>
-        <pc:cxnChg chg="add del">
-          <ac:chgData name="Nath,D,Dipankar,JSN4 R" userId="68ef5e1d-3575-420b-8e94-66a68a391843" providerId="ADAL" clId="{57BCC521-4B82-43AE-A548-7B8B4F1C3972}" dt="2019-09-23T06:59:24.043" v="272"/>
-          <ac:cxnSpMkLst>
-            <pc:docMk/>
-            <pc:sldMk cId="2539858143" sldId="257"/>
-            <ac:cxnSpMk id="84" creationId="{DC5BA0CC-A60E-40E0-AC8C-8D8DDE786A45}"/>
-          </ac:cxnSpMkLst>
-        </pc:cxnChg>
-        <pc:cxnChg chg="add mod">
-          <ac:chgData name="Nath,D,Dipankar,JSN4 R" userId="68ef5e1d-3575-420b-8e94-66a68a391843" providerId="ADAL" clId="{57BCC521-4B82-43AE-A548-7B8B4F1C3972}" dt="2019-09-23T10:55:52.345" v="559" actId="1076"/>
-          <ac:cxnSpMkLst>
-            <pc:docMk/>
-            <pc:sldMk cId="2539858143" sldId="257"/>
-            <ac:cxnSpMk id="87" creationId="{000B91A5-B0D0-4EDD-BD4F-826D3C4284AF}"/>
-          </ac:cxnSpMkLst>
-        </pc:cxnChg>
-        <pc:cxnChg chg="add mod">
-          <ac:chgData name="Nath,D,Dipankar,JSN4 R" userId="68ef5e1d-3575-420b-8e94-66a68a391843" providerId="ADAL" clId="{57BCC521-4B82-43AE-A548-7B8B4F1C3972}" dt="2019-09-23T10:55:52.345" v="559" actId="1076"/>
-          <ac:cxnSpMkLst>
-            <pc:docMk/>
-            <pc:sldMk cId="2539858143" sldId="257"/>
-            <ac:cxnSpMk id="90" creationId="{8ED885C0-9DF3-41A1-8F7C-F33FB6ACC049}"/>
-          </ac:cxnSpMkLst>
-        </pc:cxnChg>
-        <pc:cxnChg chg="add mod">
-          <ac:chgData name="Nath,D,Dipankar,JSN4 R" userId="68ef5e1d-3575-420b-8e94-66a68a391843" providerId="ADAL" clId="{57BCC521-4B82-43AE-A548-7B8B4F1C3972}" dt="2019-09-23T10:55:52.345" v="559" actId="1076"/>
-          <ac:cxnSpMkLst>
-            <pc:docMk/>
-            <pc:sldMk cId="2539858143" sldId="257"/>
-            <ac:cxnSpMk id="92" creationId="{70F0B245-89B3-49AB-8745-1FC569F46E5A}"/>
-          </ac:cxnSpMkLst>
-        </pc:cxnChg>
-        <pc:cxnChg chg="add mod">
-          <ac:chgData name="Nath,D,Dipankar,JSN4 R" userId="68ef5e1d-3575-420b-8e94-66a68a391843" providerId="ADAL" clId="{57BCC521-4B82-43AE-A548-7B8B4F1C3972}" dt="2019-09-23T10:55:52.345" v="559" actId="1076"/>
-          <ac:cxnSpMkLst>
-            <pc:docMk/>
-            <pc:sldMk cId="2539858143" sldId="257"/>
-            <ac:cxnSpMk id="96" creationId="{21FA1C28-EC22-43CB-870A-4C8C53C26CB6}"/>
-          </ac:cxnSpMkLst>
-        </pc:cxnChg>
-        <pc:cxnChg chg="add mod">
-          <ac:chgData name="Nath,D,Dipankar,JSN4 R" userId="68ef5e1d-3575-420b-8e94-66a68a391843" providerId="ADAL" clId="{57BCC521-4B82-43AE-A548-7B8B4F1C3972}" dt="2019-09-23T10:55:52.345" v="559" actId="1076"/>
-          <ac:cxnSpMkLst>
-            <pc:docMk/>
-            <pc:sldMk cId="2539858143" sldId="257"/>
-            <ac:cxnSpMk id="99" creationId="{3B3CE7E2-FAC5-4269-ACEA-9CAD08D19F20}"/>
-          </ac:cxnSpMkLst>
-        </pc:cxnChg>
-        <pc:cxnChg chg="add mod">
-          <ac:chgData name="Nath,D,Dipankar,JSN4 R" userId="68ef5e1d-3575-420b-8e94-66a68a391843" providerId="ADAL" clId="{57BCC521-4B82-43AE-A548-7B8B4F1C3972}" dt="2019-09-23T11:00:06.267" v="673" actId="20577"/>
-          <ac:cxnSpMkLst>
-            <pc:docMk/>
-            <pc:sldMk cId="2539858143" sldId="257"/>
-            <ac:cxnSpMk id="100" creationId="{793C58D6-76E0-4AC9-8A7B-2C3E211D5F87}"/>
-          </ac:cxnSpMkLst>
-        </pc:cxnChg>
-        <pc:cxnChg chg="add mod">
-          <ac:chgData name="Nath,D,Dipankar,JSN4 R" userId="68ef5e1d-3575-420b-8e94-66a68a391843" providerId="ADAL" clId="{57BCC521-4B82-43AE-A548-7B8B4F1C3972}" dt="2019-09-23T10:53:42.497" v="534" actId="14100"/>
-          <ac:cxnSpMkLst>
-            <pc:docMk/>
-            <pc:sldMk cId="2539858143" sldId="257"/>
-            <ac:cxnSpMk id="114" creationId="{F8DFD9B1-0521-485F-B4AA-82D690B2A1E9}"/>
-          </ac:cxnSpMkLst>
-        </pc:cxnChg>
-        <pc:cxnChg chg="add mod">
-          <ac:chgData name="Nath,D,Dipankar,JSN4 R" userId="68ef5e1d-3575-420b-8e94-66a68a391843" providerId="ADAL" clId="{57BCC521-4B82-43AE-A548-7B8B4F1C3972}" dt="2019-09-23T10:53:52.664" v="538" actId="14100"/>
-          <ac:cxnSpMkLst>
-            <pc:docMk/>
-            <pc:sldMk cId="2539858143" sldId="257"/>
-            <ac:cxnSpMk id="117" creationId="{9037E52A-3B13-4264-89A2-554B35344C39}"/>
-          </ac:cxnSpMkLst>
-        </pc:cxnChg>
-        <pc:cxnChg chg="add mod">
-          <ac:chgData name="Nath,D,Dipankar,JSN4 R" userId="68ef5e1d-3575-420b-8e94-66a68a391843" providerId="ADAL" clId="{57BCC521-4B82-43AE-A548-7B8B4F1C3972}" dt="2019-09-23T10:54:01.440" v="541" actId="14100"/>
-          <ac:cxnSpMkLst>
-            <pc:docMk/>
-            <pc:sldMk cId="2539858143" sldId="257"/>
-            <ac:cxnSpMk id="120" creationId="{DD7505F9-E6CB-4D5C-A10B-57B6FAD9EBC7}"/>
-          </ac:cxnSpMkLst>
-        </pc:cxnChg>
-        <pc:cxnChg chg="add">
-          <ac:chgData name="Nath,D,Dipankar,JSN4 R" userId="68ef5e1d-3575-420b-8e94-66a68a391843" providerId="ADAL" clId="{57BCC521-4B82-43AE-A548-7B8B4F1C3972}" dt="2019-09-23T10:54:07.789" v="543"/>
-          <ac:cxnSpMkLst>
-            <pc:docMk/>
-            <pc:sldMk cId="2539858143" sldId="257"/>
-            <ac:cxnSpMk id="123" creationId="{DF922A8D-83CE-4B85-9DF8-0621978312AC}"/>
-          </ac:cxnSpMkLst>
-        </pc:cxnChg>
-        <pc:cxnChg chg="add mod">
-          <ac:chgData name="Nath,D,Dipankar,JSN4 R" userId="68ef5e1d-3575-420b-8e94-66a68a391843" providerId="ADAL" clId="{57BCC521-4B82-43AE-A548-7B8B4F1C3972}" dt="2019-09-23T10:54:15.456" v="546" actId="14100"/>
-          <ac:cxnSpMkLst>
-            <pc:docMk/>
-            <pc:sldMk cId="2539858143" sldId="257"/>
-            <ac:cxnSpMk id="124" creationId="{BD63DAC6-F4FC-45F4-8EDA-7152E86D7D65}"/>
-          </ac:cxnSpMkLst>
-        </pc:cxnChg>
-        <pc:cxnChg chg="add mod">
-          <ac:chgData name="Nath,D,Dipankar,JSN4 R" userId="68ef5e1d-3575-420b-8e94-66a68a391843" providerId="ADAL" clId="{57BCC521-4B82-43AE-A548-7B8B4F1C3972}" dt="2019-09-23T10:54:25.945" v="549" actId="14100"/>
-          <ac:cxnSpMkLst>
-            <pc:docMk/>
-            <pc:sldMk cId="2539858143" sldId="257"/>
-            <ac:cxnSpMk id="127" creationId="{5847EF14-5B7B-4A6C-8DB2-16BB943DC7B4}"/>
-          </ac:cxnSpMkLst>
-        </pc:cxnChg>
-        <pc:cxnChg chg="add mod">
-          <ac:chgData name="Nath,D,Dipankar,JSN4 R" userId="68ef5e1d-3575-420b-8e94-66a68a391843" providerId="ADAL" clId="{57BCC521-4B82-43AE-A548-7B8B4F1C3972}" dt="2019-09-23T10:54:34.793" v="552" actId="14100"/>
-          <ac:cxnSpMkLst>
-            <pc:docMk/>
-            <pc:sldMk cId="2539858143" sldId="257"/>
-            <ac:cxnSpMk id="130" creationId="{DA20233E-A18F-4CBB-9EBF-878138938893}"/>
-          </ac:cxnSpMkLst>
-        </pc:cxnChg>
-        <pc:cxnChg chg="add mod">
-          <ac:chgData name="Nath,D,Dipankar,JSN4 R" userId="68ef5e1d-3575-420b-8e94-66a68a391843" providerId="ADAL" clId="{57BCC521-4B82-43AE-A548-7B8B4F1C3972}" dt="2019-09-23T10:54:43.064" v="555" actId="14100"/>
-          <ac:cxnSpMkLst>
-            <pc:docMk/>
-            <pc:sldMk cId="2539858143" sldId="257"/>
-            <ac:cxnSpMk id="133" creationId="{724F04DE-F6F7-46DB-B772-0C389410DFA7}"/>
-          </ac:cxnSpMkLst>
-        </pc:cxnChg>
-        <pc:cxnChg chg="add mod">
-          <ac:chgData name="Nath,D,Dipankar,JSN4 R" userId="68ef5e1d-3575-420b-8e94-66a68a391843" providerId="ADAL" clId="{57BCC521-4B82-43AE-A548-7B8B4F1C3972}" dt="2019-09-23T10:54:59.984" v="558" actId="14100"/>
-          <ac:cxnSpMkLst>
-            <pc:docMk/>
-            <pc:sldMk cId="2539858143" sldId="257"/>
-            <ac:cxnSpMk id="136" creationId="{A6A6B50D-5B01-484F-8E9C-53768A1CE6F1}"/>
-          </ac:cxnSpMkLst>
-        </pc:cxnChg>
-        <pc:cxnChg chg="add del mod">
-          <ac:chgData name="Nath,D,Dipankar,JSN4 R" userId="68ef5e1d-3575-420b-8e94-66a68a391843" providerId="ADAL" clId="{57BCC521-4B82-43AE-A548-7B8B4F1C3972}" dt="2019-09-23T10:56:17.229" v="631" actId="478"/>
-          <ac:cxnSpMkLst>
-            <pc:docMk/>
-            <pc:sldMk cId="2539858143" sldId="257"/>
-            <ac:cxnSpMk id="139" creationId="{EA8C963B-3C47-453A-AA66-A46594ED9775}"/>
-          </ac:cxnSpMkLst>
-        </pc:cxnChg>
-        <pc:cxnChg chg="add del mod">
-          <ac:chgData name="Nath,D,Dipankar,JSN4 R" userId="68ef5e1d-3575-420b-8e94-66a68a391843" providerId="ADAL" clId="{57BCC521-4B82-43AE-A548-7B8B4F1C3972}" dt="2019-09-23T10:56:17.229" v="631" actId="478"/>
-          <ac:cxnSpMkLst>
-            <pc:docMk/>
-            <pc:sldMk cId="2539858143" sldId="257"/>
-            <ac:cxnSpMk id="141" creationId="{028FB428-71FD-441A-B977-DC0B74D76AB8}"/>
-          </ac:cxnSpMkLst>
-        </pc:cxnChg>
-        <pc:cxnChg chg="add del mod">
-          <ac:chgData name="Nath,D,Dipankar,JSN4 R" userId="68ef5e1d-3575-420b-8e94-66a68a391843" providerId="ADAL" clId="{57BCC521-4B82-43AE-A548-7B8B4F1C3972}" dt="2019-09-23T10:56:17.229" v="631" actId="478"/>
-          <ac:cxnSpMkLst>
-            <pc:docMk/>
-            <pc:sldMk cId="2539858143" sldId="257"/>
-            <ac:cxnSpMk id="142" creationId="{1CBD3B3C-5C3A-4F7A-9BEF-CC38FD4462DE}"/>
-          </ac:cxnSpMkLst>
-        </pc:cxnChg>
-        <pc:cxnChg chg="add del mod">
-          <ac:chgData name="Nath,D,Dipankar,JSN4 R" userId="68ef5e1d-3575-420b-8e94-66a68a391843" providerId="ADAL" clId="{57BCC521-4B82-43AE-A548-7B8B4F1C3972}" dt="2019-09-23T10:56:17.229" v="631" actId="478"/>
-          <ac:cxnSpMkLst>
-            <pc:docMk/>
-            <pc:sldMk cId="2539858143" sldId="257"/>
-            <ac:cxnSpMk id="143" creationId="{2B707468-606A-4A92-827D-F9E7AC8D005C}"/>
-          </ac:cxnSpMkLst>
-        </pc:cxnChg>
-        <pc:cxnChg chg="add del mod">
-          <ac:chgData name="Nath,D,Dipankar,JSN4 R" userId="68ef5e1d-3575-420b-8e94-66a68a391843" providerId="ADAL" clId="{57BCC521-4B82-43AE-A548-7B8B4F1C3972}" dt="2019-09-23T10:56:17.229" v="631" actId="478"/>
-          <ac:cxnSpMkLst>
-            <pc:docMk/>
-            <pc:sldMk cId="2539858143" sldId="257"/>
-            <ac:cxnSpMk id="144" creationId="{3564CB75-4CE2-4E10-87D1-527E3DBF7434}"/>
-          </ac:cxnSpMkLst>
-        </pc:cxnChg>
-        <pc:cxnChg chg="add del mod">
-          <ac:chgData name="Nath,D,Dipankar,JSN4 R" userId="68ef5e1d-3575-420b-8e94-66a68a391843" providerId="ADAL" clId="{57BCC521-4B82-43AE-A548-7B8B4F1C3972}" dt="2019-09-23T10:56:17.229" v="631" actId="478"/>
-          <ac:cxnSpMkLst>
-            <pc:docMk/>
-            <pc:sldMk cId="2539858143" sldId="257"/>
-            <ac:cxnSpMk id="145" creationId="{3F2F720D-2BE9-4542-8A80-C09AF323AF37}"/>
-          </ac:cxnSpMkLst>
-        </pc:cxnChg>
-        <pc:cxnChg chg="add del mod">
-          <ac:chgData name="Nath,D,Dipankar,JSN4 R" userId="68ef5e1d-3575-420b-8e94-66a68a391843" providerId="ADAL" clId="{57BCC521-4B82-43AE-A548-7B8B4F1C3972}" dt="2019-09-23T10:56:17.229" v="631" actId="478"/>
-          <ac:cxnSpMkLst>
-            <pc:docMk/>
-            <pc:sldMk cId="2539858143" sldId="257"/>
-            <ac:cxnSpMk id="146" creationId="{2DF5C1D7-16D3-47B0-AB90-5A3E2BDAAC7E}"/>
-          </ac:cxnSpMkLst>
-        </pc:cxnChg>
-        <pc:cxnChg chg="add mod">
-          <ac:chgData name="Nath,D,Dipankar,JSN4 R" userId="68ef5e1d-3575-420b-8e94-66a68a391843" providerId="ADAL" clId="{57BCC521-4B82-43AE-A548-7B8B4F1C3972}" dt="2019-09-23T10:56:24.345" v="633" actId="1076"/>
-          <ac:cxnSpMkLst>
-            <pc:docMk/>
-            <pc:sldMk cId="2539858143" sldId="257"/>
-            <ac:cxnSpMk id="148" creationId="{E387586C-96F2-46D4-AB55-E762C3C608BD}"/>
-          </ac:cxnSpMkLst>
-        </pc:cxnChg>
-        <pc:cxnChg chg="add mod">
-          <ac:chgData name="Nath,D,Dipankar,JSN4 R" userId="68ef5e1d-3575-420b-8e94-66a68a391843" providerId="ADAL" clId="{57BCC521-4B82-43AE-A548-7B8B4F1C3972}" dt="2019-09-23T10:56:24.345" v="633" actId="1076"/>
-          <ac:cxnSpMkLst>
-            <pc:docMk/>
-            <pc:sldMk cId="2539858143" sldId="257"/>
-            <ac:cxnSpMk id="151" creationId="{49A1DA50-583D-4FCC-8E88-B6A9232864D9}"/>
-          </ac:cxnSpMkLst>
-        </pc:cxnChg>
-        <pc:cxnChg chg="add mod">
-          <ac:chgData name="Nath,D,Dipankar,JSN4 R" userId="68ef5e1d-3575-420b-8e94-66a68a391843" providerId="ADAL" clId="{57BCC521-4B82-43AE-A548-7B8B4F1C3972}" dt="2019-09-23T10:56:24.345" v="633" actId="1076"/>
-          <ac:cxnSpMkLst>
-            <pc:docMk/>
-            <pc:sldMk cId="2539858143" sldId="257"/>
-            <ac:cxnSpMk id="152" creationId="{34897DDA-7BFF-4D69-8460-5171E69CFB89}"/>
-          </ac:cxnSpMkLst>
-        </pc:cxnChg>
-        <pc:cxnChg chg="add mod">
-          <ac:chgData name="Nath,D,Dipankar,JSN4 R" userId="68ef5e1d-3575-420b-8e94-66a68a391843" providerId="ADAL" clId="{57BCC521-4B82-43AE-A548-7B8B4F1C3972}" dt="2019-09-23T10:56:24.345" v="633" actId="1076"/>
-          <ac:cxnSpMkLst>
-            <pc:docMk/>
-            <pc:sldMk cId="2539858143" sldId="257"/>
-            <ac:cxnSpMk id="153" creationId="{F7385991-B733-466C-ADCF-E79997E1D7B0}"/>
-          </ac:cxnSpMkLst>
-        </pc:cxnChg>
-        <pc:cxnChg chg="add mod">
-          <ac:chgData name="Nath,D,Dipankar,JSN4 R" userId="68ef5e1d-3575-420b-8e94-66a68a391843" providerId="ADAL" clId="{57BCC521-4B82-43AE-A548-7B8B4F1C3972}" dt="2019-09-23T10:56:24.345" v="633" actId="1076"/>
-          <ac:cxnSpMkLst>
-            <pc:docMk/>
-            <pc:sldMk cId="2539858143" sldId="257"/>
-            <ac:cxnSpMk id="154" creationId="{D31F3D95-77B7-4A1E-A3D1-D9B7D9777020}"/>
-          </ac:cxnSpMkLst>
-        </pc:cxnChg>
-        <pc:cxnChg chg="add mod">
-          <ac:chgData name="Nath,D,Dipankar,JSN4 R" userId="68ef5e1d-3575-420b-8e94-66a68a391843" providerId="ADAL" clId="{57BCC521-4B82-43AE-A548-7B8B4F1C3972}" dt="2019-09-23T10:56:24.345" v="633" actId="1076"/>
-          <ac:cxnSpMkLst>
-            <pc:docMk/>
-            <pc:sldMk cId="2539858143" sldId="257"/>
-            <ac:cxnSpMk id="155" creationId="{B341147D-5BA6-4A38-925E-5C4D88732113}"/>
-          </ac:cxnSpMkLst>
-        </pc:cxnChg>
-        <pc:cxnChg chg="add mod">
-          <ac:chgData name="Nath,D,Dipankar,JSN4 R" userId="68ef5e1d-3575-420b-8e94-66a68a391843" providerId="ADAL" clId="{57BCC521-4B82-43AE-A548-7B8B4F1C3972}" dt="2019-09-23T11:00:20.106" v="676" actId="20577"/>
-          <ac:cxnSpMkLst>
-            <pc:docMk/>
-            <pc:sldMk cId="2539858143" sldId="257"/>
-            <ac:cxnSpMk id="156" creationId="{BEB4C520-6F1F-4C49-A119-76455643C276}"/>
-          </ac:cxnSpMkLst>
-        </pc:cxnChg>
-        <pc:cxnChg chg="add mod">
-          <ac:chgData name="Nath,D,Dipankar,JSN4 R" userId="68ef5e1d-3575-420b-8e94-66a68a391843" providerId="ADAL" clId="{57BCC521-4B82-43AE-A548-7B8B4F1C3972}" dt="2019-09-23T10:56:45.329" v="637" actId="1076"/>
-          <ac:cxnSpMkLst>
-            <pc:docMk/>
-            <pc:sldMk cId="2539858143" sldId="257"/>
-            <ac:cxnSpMk id="157" creationId="{6FC80E3B-B591-430F-B6C1-EAC760309764}"/>
-          </ac:cxnSpMkLst>
-        </pc:cxnChg>
-        <pc:cxnChg chg="add mod">
-          <ac:chgData name="Nath,D,Dipankar,JSN4 R" userId="68ef5e1d-3575-420b-8e94-66a68a391843" providerId="ADAL" clId="{57BCC521-4B82-43AE-A548-7B8B4F1C3972}" dt="2019-09-23T10:56:45.329" v="637" actId="1076"/>
-          <ac:cxnSpMkLst>
-            <pc:docMk/>
-            <pc:sldMk cId="2539858143" sldId="257"/>
-            <ac:cxnSpMk id="160" creationId="{314683E0-912E-43E9-99A7-88BDEF5BF95D}"/>
-          </ac:cxnSpMkLst>
-        </pc:cxnChg>
-        <pc:cxnChg chg="add mod">
-          <ac:chgData name="Nath,D,Dipankar,JSN4 R" userId="68ef5e1d-3575-420b-8e94-66a68a391843" providerId="ADAL" clId="{57BCC521-4B82-43AE-A548-7B8B4F1C3972}" dt="2019-09-23T10:56:45.329" v="637" actId="1076"/>
-          <ac:cxnSpMkLst>
-            <pc:docMk/>
-            <pc:sldMk cId="2539858143" sldId="257"/>
-            <ac:cxnSpMk id="161" creationId="{FA76320C-3DBD-420F-8CC5-A78DD58675BD}"/>
-          </ac:cxnSpMkLst>
-        </pc:cxnChg>
-        <pc:cxnChg chg="add mod">
-          <ac:chgData name="Nath,D,Dipankar,JSN4 R" userId="68ef5e1d-3575-420b-8e94-66a68a391843" providerId="ADAL" clId="{57BCC521-4B82-43AE-A548-7B8B4F1C3972}" dt="2019-09-23T10:56:45.329" v="637" actId="1076"/>
-          <ac:cxnSpMkLst>
-            <pc:docMk/>
-            <pc:sldMk cId="2539858143" sldId="257"/>
-            <ac:cxnSpMk id="162" creationId="{9604B2DA-6EE1-448A-80A8-3835E9E624FB}"/>
-          </ac:cxnSpMkLst>
-        </pc:cxnChg>
-        <pc:cxnChg chg="add mod">
-          <ac:chgData name="Nath,D,Dipankar,JSN4 R" userId="68ef5e1d-3575-420b-8e94-66a68a391843" providerId="ADAL" clId="{57BCC521-4B82-43AE-A548-7B8B4F1C3972}" dt="2019-09-23T10:56:45.329" v="637" actId="1076"/>
-          <ac:cxnSpMkLst>
-            <pc:docMk/>
-            <pc:sldMk cId="2539858143" sldId="257"/>
-            <ac:cxnSpMk id="163" creationId="{21930FBB-D1EC-4C69-A96A-588E3DDE84FD}"/>
-          </ac:cxnSpMkLst>
-        </pc:cxnChg>
-        <pc:cxnChg chg="add mod">
-          <ac:chgData name="Nath,D,Dipankar,JSN4 R" userId="68ef5e1d-3575-420b-8e94-66a68a391843" providerId="ADAL" clId="{57BCC521-4B82-43AE-A548-7B8B4F1C3972}" dt="2019-09-23T10:56:45.329" v="637" actId="1076"/>
-          <ac:cxnSpMkLst>
-            <pc:docMk/>
-            <pc:sldMk cId="2539858143" sldId="257"/>
-            <ac:cxnSpMk id="164" creationId="{BE77A020-C234-48E0-81E4-3FC849143B3E}"/>
-          </ac:cxnSpMkLst>
-        </pc:cxnChg>
-        <pc:cxnChg chg="add mod">
-          <ac:chgData name="Nath,D,Dipankar,JSN4 R" userId="68ef5e1d-3575-420b-8e94-66a68a391843" providerId="ADAL" clId="{57BCC521-4B82-43AE-A548-7B8B4F1C3972}" dt="2019-09-23T11:00:23.374" v="677" actId="20577"/>
-          <ac:cxnSpMkLst>
-            <pc:docMk/>
-            <pc:sldMk cId="2539858143" sldId="257"/>
-            <ac:cxnSpMk id="165" creationId="{AE587070-0A34-40D7-B823-502DE1058CAB}"/>
-          </ac:cxnSpMkLst>
-        </pc:cxnChg>
-      </pc:sldChg>
-      <pc:sldChg chg="addSp modSp add">
-        <pc:chgData name="Nath,D,Dipankar,JSN4 R" userId="68ef5e1d-3575-420b-8e94-66a68a391843" providerId="ADAL" clId="{57BCC521-4B82-43AE-A548-7B8B4F1C3972}" dt="2019-09-23T07:13:03.944" v="441" actId="1038"/>
-        <pc:sldMkLst>
-          <pc:docMk/>
-          <pc:sldMk cId="3437342905" sldId="258"/>
-        </pc:sldMkLst>
-        <pc:spChg chg="mod">
-          <ac:chgData name="Nath,D,Dipankar,JSN4 R" userId="68ef5e1d-3575-420b-8e94-66a68a391843" providerId="ADAL" clId="{57BCC521-4B82-43AE-A548-7B8B4F1C3972}" dt="2019-09-23T07:13:03.944" v="441" actId="1038"/>
-          <ac:spMkLst>
-            <pc:docMk/>
-            <pc:sldMk cId="3437342905" sldId="258"/>
-            <ac:spMk id="2" creationId="{34E7EA03-B2A3-4337-8FA8-3854CDFD1694}"/>
-          </ac:spMkLst>
-        </pc:spChg>
-        <pc:spChg chg="add mod">
-          <ac:chgData name="Nath,D,Dipankar,JSN4 R" userId="68ef5e1d-3575-420b-8e94-66a68a391843" providerId="ADAL" clId="{57BCC521-4B82-43AE-A548-7B8B4F1C3972}" dt="2019-09-23T07:12:27.761" v="435" actId="164"/>
-          <ac:spMkLst>
-            <pc:docMk/>
-            <pc:sldMk cId="3437342905" sldId="258"/>
-            <ac:spMk id="26" creationId="{456E04F2-F289-4564-BBAA-5F3B1D4D1EE8}"/>
-          </ac:spMkLst>
-        </pc:spChg>
-        <pc:grpChg chg="add mod">
-          <ac:chgData name="Nath,D,Dipankar,JSN4 R" userId="68ef5e1d-3575-420b-8e94-66a68a391843" providerId="ADAL" clId="{57BCC521-4B82-43AE-A548-7B8B4F1C3972}" dt="2019-09-23T07:12:27.761" v="435" actId="164"/>
-          <ac:grpSpMkLst>
-            <pc:docMk/>
-            <pc:sldMk cId="3437342905" sldId="258"/>
-            <ac:grpSpMk id="3" creationId="{38BB2135-8529-4FCD-B53F-18674600C2CD}"/>
-          </ac:grpSpMkLst>
-        </pc:grpChg>
-        <pc:cxnChg chg="add mod">
-          <ac:chgData name="Nath,D,Dipankar,JSN4 R" userId="68ef5e1d-3575-420b-8e94-66a68a391843" providerId="ADAL" clId="{57BCC521-4B82-43AE-A548-7B8B4F1C3972}" dt="2019-09-23T07:12:27.761" v="435" actId="164"/>
-          <ac:cxnSpMkLst>
-            <pc:docMk/>
-            <pc:sldMk cId="3437342905" sldId="258"/>
-            <ac:cxnSpMk id="27" creationId="{158082C5-AF01-4030-B506-0634BCCEC5FB}"/>
-          </ac:cxnSpMkLst>
-        </pc:cxnChg>
-        <pc:cxnChg chg="add mod">
-          <ac:chgData name="Nath,D,Dipankar,JSN4 R" userId="68ef5e1d-3575-420b-8e94-66a68a391843" providerId="ADAL" clId="{57BCC521-4B82-43AE-A548-7B8B4F1C3972}" dt="2019-09-23T07:12:27.761" v="435" actId="164"/>
-          <ac:cxnSpMkLst>
-            <pc:docMk/>
-            <pc:sldMk cId="3437342905" sldId="258"/>
-            <ac:cxnSpMk id="28" creationId="{9269E283-E40E-4689-AC2F-3B107E07890B}"/>
-          </ac:cxnSpMkLst>
-        </pc:cxnChg>
-        <pc:cxnChg chg="add mod">
-          <ac:chgData name="Nath,D,Dipankar,JSN4 R" userId="68ef5e1d-3575-420b-8e94-66a68a391843" providerId="ADAL" clId="{57BCC521-4B82-43AE-A548-7B8B4F1C3972}" dt="2019-09-23T07:12:27.761" v="435" actId="164"/>
-          <ac:cxnSpMkLst>
-            <pc:docMk/>
-            <pc:sldMk cId="3437342905" sldId="258"/>
-            <ac:cxnSpMk id="30" creationId="{DD5B6BBB-27EA-42F0-ABA4-871065E03528}"/>
-          </ac:cxnSpMkLst>
-        </pc:cxnChg>
-        <pc:cxnChg chg="add mod">
-          <ac:chgData name="Nath,D,Dipankar,JSN4 R" userId="68ef5e1d-3575-420b-8e94-66a68a391843" providerId="ADAL" clId="{57BCC521-4B82-43AE-A548-7B8B4F1C3972}" dt="2019-09-23T07:12:27.761" v="435" actId="164"/>
-          <ac:cxnSpMkLst>
-            <pc:docMk/>
-            <pc:sldMk cId="3437342905" sldId="258"/>
-            <ac:cxnSpMk id="36" creationId="{A64858D3-8476-4616-8393-7B008D057973}"/>
-          </ac:cxnSpMkLst>
-        </pc:cxnChg>
-        <pc:cxnChg chg="add mod">
-          <ac:chgData name="Nath,D,Dipankar,JSN4 R" userId="68ef5e1d-3575-420b-8e94-66a68a391843" providerId="ADAL" clId="{57BCC521-4B82-43AE-A548-7B8B4F1C3972}" dt="2019-09-23T07:12:27.761" v="435" actId="164"/>
-          <ac:cxnSpMkLst>
-            <pc:docMk/>
-            <pc:sldMk cId="3437342905" sldId="258"/>
-            <ac:cxnSpMk id="38" creationId="{6997154F-2FA3-47AD-B997-A651E0142BC0}"/>
-          </ac:cxnSpMkLst>
-        </pc:cxnChg>
-        <pc:cxnChg chg="add mod">
-          <ac:chgData name="Nath,D,Dipankar,JSN4 R" userId="68ef5e1d-3575-420b-8e94-66a68a391843" providerId="ADAL" clId="{57BCC521-4B82-43AE-A548-7B8B4F1C3972}" dt="2019-09-23T07:12:56.678" v="438" actId="14100"/>
-          <ac:cxnSpMkLst>
-            <pc:docMk/>
-            <pc:sldMk cId="3437342905" sldId="258"/>
-            <ac:cxnSpMk id="39" creationId="{DE93A66F-C506-4D3B-9569-A72C4DA614FA}"/>
-          </ac:cxnSpMkLst>
-        </pc:cxnChg>
       </pc:sldChg>
     </pc:docChg>
   </pc:docChgLst>
@@ -2997,7 +2999,7 @@
           <a:p>
             <a:fld id="{D01F0EC8-559C-4531-A8E8-340B9D3AA874}" type="datetimeFigureOut">
               <a:rPr lang="en-GB" smtClean="0"/>
-              <a:t>09/10/2019</a:t>
+              <a:t>21/01/2020</a:t>
             </a:fld>
             <a:endParaRPr lang="en-GB"/>
           </a:p>
@@ -3197,7 +3199,7 @@
           <a:p>
             <a:fld id="{D01F0EC8-559C-4531-A8E8-340B9D3AA874}" type="datetimeFigureOut">
               <a:rPr lang="en-GB" smtClean="0"/>
-              <a:t>09/10/2019</a:t>
+              <a:t>21/01/2020</a:t>
             </a:fld>
             <a:endParaRPr lang="en-GB"/>
           </a:p>
@@ -3407,7 +3409,7 @@
           <a:p>
             <a:fld id="{D01F0EC8-559C-4531-A8E8-340B9D3AA874}" type="datetimeFigureOut">
               <a:rPr lang="en-GB" smtClean="0"/>
-              <a:t>09/10/2019</a:t>
+              <a:t>21/01/2020</a:t>
             </a:fld>
             <a:endParaRPr lang="en-GB"/>
           </a:p>
@@ -3607,7 +3609,7 @@
           <a:p>
             <a:fld id="{D01F0EC8-559C-4531-A8E8-340B9D3AA874}" type="datetimeFigureOut">
               <a:rPr lang="en-GB" smtClean="0"/>
-              <a:t>09/10/2019</a:t>
+              <a:t>21/01/2020</a:t>
             </a:fld>
             <a:endParaRPr lang="en-GB"/>
           </a:p>
@@ -3883,7 +3885,7 @@
           <a:p>
             <a:fld id="{D01F0EC8-559C-4531-A8E8-340B9D3AA874}" type="datetimeFigureOut">
               <a:rPr lang="en-GB" smtClean="0"/>
-              <a:t>09/10/2019</a:t>
+              <a:t>21/01/2020</a:t>
             </a:fld>
             <a:endParaRPr lang="en-GB"/>
           </a:p>
@@ -4151,7 +4153,7 @@
           <a:p>
             <a:fld id="{D01F0EC8-559C-4531-A8E8-340B9D3AA874}" type="datetimeFigureOut">
               <a:rPr lang="en-GB" smtClean="0"/>
-              <a:t>09/10/2019</a:t>
+              <a:t>21/01/2020</a:t>
             </a:fld>
             <a:endParaRPr lang="en-GB"/>
           </a:p>
@@ -4566,7 +4568,7 @@
           <a:p>
             <a:fld id="{D01F0EC8-559C-4531-A8E8-340B9D3AA874}" type="datetimeFigureOut">
               <a:rPr lang="en-GB" smtClean="0"/>
-              <a:t>09/10/2019</a:t>
+              <a:t>21/01/2020</a:t>
             </a:fld>
             <a:endParaRPr lang="en-GB"/>
           </a:p>
@@ -4708,7 +4710,7 @@
           <a:p>
             <a:fld id="{D01F0EC8-559C-4531-A8E8-340B9D3AA874}" type="datetimeFigureOut">
               <a:rPr lang="en-GB" smtClean="0"/>
-              <a:t>09/10/2019</a:t>
+              <a:t>21/01/2020</a:t>
             </a:fld>
             <a:endParaRPr lang="en-GB"/>
           </a:p>
@@ -4821,7 +4823,7 @@
           <a:p>
             <a:fld id="{D01F0EC8-559C-4531-A8E8-340B9D3AA874}" type="datetimeFigureOut">
               <a:rPr lang="en-GB" smtClean="0"/>
-              <a:t>09/10/2019</a:t>
+              <a:t>21/01/2020</a:t>
             </a:fld>
             <a:endParaRPr lang="en-GB"/>
           </a:p>
@@ -5134,7 +5136,7 @@
           <a:p>
             <a:fld id="{D01F0EC8-559C-4531-A8E8-340B9D3AA874}" type="datetimeFigureOut">
               <a:rPr lang="en-GB" smtClean="0"/>
-              <a:t>09/10/2019</a:t>
+              <a:t>21/01/2020</a:t>
             </a:fld>
             <a:endParaRPr lang="en-GB"/>
           </a:p>
@@ -5423,7 +5425,7 @@
           <a:p>
             <a:fld id="{D01F0EC8-559C-4531-A8E8-340B9D3AA874}" type="datetimeFigureOut">
               <a:rPr lang="en-GB" smtClean="0"/>
-              <a:t>09/10/2019</a:t>
+              <a:t>21/01/2020</a:t>
             </a:fld>
             <a:endParaRPr lang="en-GB"/>
           </a:p>
@@ -5666,7 +5668,7 @@
           <a:p>
             <a:fld id="{D01F0EC8-559C-4531-A8E8-340B9D3AA874}" type="datetimeFigureOut">
               <a:rPr lang="en-GB" smtClean="0"/>
-              <a:t>09/10/2019</a:t>
+              <a:t>21/01/2020</a:t>
             </a:fld>
             <a:endParaRPr lang="en-GB"/>
           </a:p>
@@ -25836,6 +25838,804 @@
 </p:sld>
 </file>
 
+<file path=ppt/slides/slide8.xml><?xml version="1.0" encoding="utf-8"?>
+<p:sld xmlns:a="http://schemas.openxmlformats.org/drawingml/2006/main" xmlns:r="http://schemas.openxmlformats.org/officeDocument/2006/relationships" xmlns:p="http://schemas.openxmlformats.org/presentationml/2006/main">
+  <p:cSld>
+    <p:spTree>
+      <p:nvGrpSpPr>
+        <p:cNvPr id="1" name=""/>
+        <p:cNvGrpSpPr/>
+        <p:nvPr/>
+      </p:nvGrpSpPr>
+      <p:grpSpPr>
+        <a:xfrm>
+          <a:off x="0" y="0"/>
+          <a:ext cx="0" cy="0"/>
+          <a:chOff x="0" y="0"/>
+          <a:chExt cx="0" cy="0"/>
+        </a:xfrm>
+      </p:grpSpPr>
+      <p:sp>
+        <p:nvSpPr>
+          <p:cNvPr id="4" name="Oval 3">
+            <a:extLst>
+              <a:ext uri="{FF2B5EF4-FFF2-40B4-BE49-F238E27FC236}">
+                <a16:creationId xmlns:a16="http://schemas.microsoft.com/office/drawing/2014/main" id="{F15D4229-B255-46DF-A18C-4C9B19FBC6AB}"/>
+              </a:ext>
+            </a:extLst>
+          </p:cNvPr>
+          <p:cNvSpPr/>
+          <p:nvPr/>
+        </p:nvSpPr>
+        <p:spPr>
+          <a:xfrm>
+            <a:off x="4459564" y="604114"/>
+            <a:ext cx="956345" cy="914400"/>
+          </a:xfrm>
+          <a:prstGeom prst="ellipse">
+            <a:avLst/>
+          </a:prstGeom>
+          <a:solidFill>
+            <a:schemeClr val="bg1"/>
+          </a:solidFill>
+          <a:ln w="76200"/>
+        </p:spPr>
+        <p:style>
+          <a:lnRef idx="2">
+            <a:schemeClr val="accent1">
+              <a:shade val="50000"/>
+            </a:schemeClr>
+          </a:lnRef>
+          <a:fillRef idx="1">
+            <a:schemeClr val="accent1"/>
+          </a:fillRef>
+          <a:effectRef idx="0">
+            <a:schemeClr val="accent1"/>
+          </a:effectRef>
+          <a:fontRef idx="minor">
+            <a:schemeClr val="lt1"/>
+          </a:fontRef>
+        </p:style>
+        <p:txBody>
+          <a:bodyPr rtlCol="0" anchor="ctr"/>
+          <a:lstStyle/>
+          <a:p>
+            <a:pPr algn="ctr"/>
+            <a:endParaRPr lang="en-GB"/>
+          </a:p>
+        </p:txBody>
+      </p:sp>
+      <p:sp>
+        <p:nvSpPr>
+          <p:cNvPr id="5" name="Oval 4">
+            <a:extLst>
+              <a:ext uri="{FF2B5EF4-FFF2-40B4-BE49-F238E27FC236}">
+                <a16:creationId xmlns:a16="http://schemas.microsoft.com/office/drawing/2014/main" id="{D0B48D9D-A08E-44D8-A08E-D03B5F87AF43}"/>
+              </a:ext>
+            </a:extLst>
+          </p:cNvPr>
+          <p:cNvSpPr/>
+          <p:nvPr/>
+        </p:nvSpPr>
+        <p:spPr>
+          <a:xfrm>
+            <a:off x="6096000" y="2297850"/>
+            <a:ext cx="956345" cy="914400"/>
+          </a:xfrm>
+          <a:prstGeom prst="ellipse">
+            <a:avLst/>
+          </a:prstGeom>
+          <a:solidFill>
+            <a:schemeClr val="bg1"/>
+          </a:solidFill>
+          <a:ln w="76200"/>
+        </p:spPr>
+        <p:style>
+          <a:lnRef idx="2">
+            <a:schemeClr val="accent1">
+              <a:shade val="50000"/>
+            </a:schemeClr>
+          </a:lnRef>
+          <a:fillRef idx="1">
+            <a:schemeClr val="accent1"/>
+          </a:fillRef>
+          <a:effectRef idx="0">
+            <a:schemeClr val="accent1"/>
+          </a:effectRef>
+          <a:fontRef idx="minor">
+            <a:schemeClr val="lt1"/>
+          </a:fontRef>
+        </p:style>
+        <p:txBody>
+          <a:bodyPr rtlCol="0" anchor="ctr"/>
+          <a:lstStyle/>
+          <a:p>
+            <a:pPr algn="ctr"/>
+            <a:endParaRPr lang="en-GB"/>
+          </a:p>
+        </p:txBody>
+      </p:sp>
+      <p:cxnSp>
+        <p:nvCxnSpPr>
+          <p:cNvPr id="7" name="Straight Connector 6">
+            <a:extLst>
+              <a:ext uri="{FF2B5EF4-FFF2-40B4-BE49-F238E27FC236}">
+                <a16:creationId xmlns:a16="http://schemas.microsoft.com/office/drawing/2014/main" id="{483DF4B3-FE1E-47FE-8301-41B59A94A237}"/>
+              </a:ext>
+            </a:extLst>
+          </p:cNvPr>
+          <p:cNvCxnSpPr>
+            <a:cxnSpLocks/>
+            <a:stCxn id="4" idx="5"/>
+            <a:endCxn id="5" idx="1"/>
+          </p:cNvCxnSpPr>
+          <p:nvPr/>
+        </p:nvCxnSpPr>
+        <p:spPr>
+          <a:xfrm>
+            <a:off x="5275856" y="1384603"/>
+            <a:ext cx="960197" cy="1047158"/>
+          </a:xfrm>
+          <a:prstGeom prst="line">
+            <a:avLst/>
+          </a:prstGeom>
+        </p:spPr>
+        <p:style>
+          <a:lnRef idx="3">
+            <a:schemeClr val="dk1"/>
+          </a:lnRef>
+          <a:fillRef idx="0">
+            <a:schemeClr val="dk1"/>
+          </a:fillRef>
+          <a:effectRef idx="2">
+            <a:schemeClr val="dk1"/>
+          </a:effectRef>
+          <a:fontRef idx="minor">
+            <a:schemeClr val="tx1"/>
+          </a:fontRef>
+        </p:style>
+      </p:cxnSp>
+      <p:sp>
+        <p:nvSpPr>
+          <p:cNvPr id="11" name="TextBox 10">
+            <a:extLst>
+              <a:ext uri="{FF2B5EF4-FFF2-40B4-BE49-F238E27FC236}">
+                <a16:creationId xmlns:a16="http://schemas.microsoft.com/office/drawing/2014/main" id="{07FC053B-A830-4900-8C0F-333885D8D232}"/>
+              </a:ext>
+            </a:extLst>
+          </p:cNvPr>
+          <p:cNvSpPr txBox="1"/>
+          <p:nvPr/>
+        </p:nvSpPr>
+        <p:spPr>
+          <a:xfrm>
+            <a:off x="4506367" y="876648"/>
+            <a:ext cx="862737" cy="369332"/>
+          </a:xfrm>
+          <a:prstGeom prst="rect">
+            <a:avLst/>
+          </a:prstGeom>
+          <a:noFill/>
+        </p:spPr>
+        <p:txBody>
+          <a:bodyPr wrap="none" rtlCol="0">
+            <a:spAutoFit/>
+          </a:bodyPr>
+          <a:lstStyle/>
+          <a:p>
+            <a:r>
+              <a:rPr lang="en-IN" dirty="0"/>
+              <a:t>Node 1</a:t>
+            </a:r>
+          </a:p>
+        </p:txBody>
+      </p:sp>
+      <p:sp>
+        <p:nvSpPr>
+          <p:cNvPr id="12" name="TextBox 11">
+            <a:extLst>
+              <a:ext uri="{FF2B5EF4-FFF2-40B4-BE49-F238E27FC236}">
+                <a16:creationId xmlns:a16="http://schemas.microsoft.com/office/drawing/2014/main" id="{7E14AD92-4E50-4DAC-ADAC-95564A8F159A}"/>
+              </a:ext>
+            </a:extLst>
+          </p:cNvPr>
+          <p:cNvSpPr txBox="1"/>
+          <p:nvPr/>
+        </p:nvSpPr>
+        <p:spPr>
+          <a:xfrm>
+            <a:off x="6142803" y="2570384"/>
+            <a:ext cx="862737" cy="369332"/>
+          </a:xfrm>
+          <a:prstGeom prst="rect">
+            <a:avLst/>
+          </a:prstGeom>
+          <a:noFill/>
+        </p:spPr>
+        <p:txBody>
+          <a:bodyPr wrap="none" rtlCol="0">
+            <a:spAutoFit/>
+          </a:bodyPr>
+          <a:lstStyle/>
+          <a:p>
+            <a:r>
+              <a:rPr lang="en-IN" dirty="0"/>
+              <a:t>Node 2</a:t>
+            </a:r>
+          </a:p>
+        </p:txBody>
+      </p:sp>
+      <p:sp>
+        <p:nvSpPr>
+          <p:cNvPr id="13" name="TextBox 12">
+            <a:extLst>
+              <a:ext uri="{FF2B5EF4-FFF2-40B4-BE49-F238E27FC236}">
+                <a16:creationId xmlns:a16="http://schemas.microsoft.com/office/drawing/2014/main" id="{C248472E-B92A-48C9-8817-6D98D7A5C144}"/>
+              </a:ext>
+            </a:extLst>
+          </p:cNvPr>
+          <p:cNvSpPr txBox="1"/>
+          <p:nvPr/>
+        </p:nvSpPr>
+        <p:spPr>
+          <a:xfrm>
+            <a:off x="5709865" y="1471895"/>
+            <a:ext cx="637803" cy="369332"/>
+          </a:xfrm>
+          <a:prstGeom prst="rect">
+            <a:avLst/>
+          </a:prstGeom>
+          <a:noFill/>
+        </p:spPr>
+        <p:txBody>
+          <a:bodyPr wrap="none" rtlCol="0">
+            <a:spAutoFit/>
+          </a:bodyPr>
+          <a:lstStyle/>
+          <a:p>
+            <a:r>
+              <a:rPr lang="en-IN" dirty="0"/>
+              <a:t>Edge</a:t>
+            </a:r>
+          </a:p>
+        </p:txBody>
+      </p:sp>
+      <p:sp>
+        <p:nvSpPr>
+          <p:cNvPr id="14" name="Oval 13">
+            <a:extLst>
+              <a:ext uri="{FF2B5EF4-FFF2-40B4-BE49-F238E27FC236}">
+                <a16:creationId xmlns:a16="http://schemas.microsoft.com/office/drawing/2014/main" id="{9F3E1B8C-43ED-4BFD-BBF7-AF963448F898}"/>
+              </a:ext>
+            </a:extLst>
+          </p:cNvPr>
+          <p:cNvSpPr/>
+          <p:nvPr/>
+        </p:nvSpPr>
+        <p:spPr>
+          <a:xfrm>
+            <a:off x="3473042" y="360727"/>
+            <a:ext cx="4714613" cy="3162649"/>
+          </a:xfrm>
+          <a:prstGeom prst="ellipse">
+            <a:avLst/>
+          </a:prstGeom>
+          <a:noFill/>
+        </p:spPr>
+        <p:style>
+          <a:lnRef idx="2">
+            <a:schemeClr val="accent1">
+              <a:shade val="50000"/>
+            </a:schemeClr>
+          </a:lnRef>
+          <a:fillRef idx="1">
+            <a:schemeClr val="accent1"/>
+          </a:fillRef>
+          <a:effectRef idx="0">
+            <a:schemeClr val="accent1"/>
+          </a:effectRef>
+          <a:fontRef idx="minor">
+            <a:schemeClr val="lt1"/>
+          </a:fontRef>
+        </p:style>
+        <p:txBody>
+          <a:bodyPr rtlCol="0" anchor="ctr"/>
+          <a:lstStyle/>
+          <a:p>
+            <a:pPr algn="ctr"/>
+            <a:endParaRPr lang="en-IN"/>
+          </a:p>
+        </p:txBody>
+      </p:sp>
+      <p:sp>
+        <p:nvSpPr>
+          <p:cNvPr id="16" name="TextBox 15">
+            <a:extLst>
+              <a:ext uri="{FF2B5EF4-FFF2-40B4-BE49-F238E27FC236}">
+                <a16:creationId xmlns:a16="http://schemas.microsoft.com/office/drawing/2014/main" id="{4108BDA5-9EB9-4114-9354-E2C5FDA5C707}"/>
+              </a:ext>
+            </a:extLst>
+          </p:cNvPr>
+          <p:cNvSpPr txBox="1"/>
+          <p:nvPr/>
+        </p:nvSpPr>
+        <p:spPr>
+          <a:xfrm>
+            <a:off x="3739850" y="3338710"/>
+            <a:ext cx="760208" cy="369332"/>
+          </a:xfrm>
+          <a:prstGeom prst="rect">
+            <a:avLst/>
+          </a:prstGeom>
+          <a:noFill/>
+        </p:spPr>
+        <p:txBody>
+          <a:bodyPr wrap="none" rtlCol="0">
+            <a:spAutoFit/>
+          </a:bodyPr>
+          <a:lstStyle/>
+          <a:p>
+            <a:r>
+              <a:rPr lang="en-IN" dirty="0"/>
+              <a:t>Graph</a:t>
+            </a:r>
+          </a:p>
+        </p:txBody>
+      </p:sp>
+    </p:spTree>
+    <p:extLst>
+      <p:ext uri="{BB962C8B-B14F-4D97-AF65-F5344CB8AC3E}">
+        <p14:creationId xmlns:p14="http://schemas.microsoft.com/office/powerpoint/2010/main" val="3502179993"/>
+      </p:ext>
+    </p:extLst>
+  </p:cSld>
+  <p:clrMapOvr>
+    <a:masterClrMapping/>
+  </p:clrMapOvr>
+</p:sld>
+</file>
+
+<file path=ppt/slides/slide9.xml><?xml version="1.0" encoding="utf-8"?>
+<p:sld xmlns:a="http://schemas.openxmlformats.org/drawingml/2006/main" xmlns:r="http://schemas.openxmlformats.org/officeDocument/2006/relationships" xmlns:p="http://schemas.openxmlformats.org/presentationml/2006/main">
+  <p:cSld>
+    <p:spTree>
+      <p:nvGrpSpPr>
+        <p:cNvPr id="1" name=""/>
+        <p:cNvGrpSpPr/>
+        <p:nvPr/>
+      </p:nvGrpSpPr>
+      <p:grpSpPr>
+        <a:xfrm>
+          <a:off x="0" y="0"/>
+          <a:ext cx="0" cy="0"/>
+          <a:chOff x="0" y="0"/>
+          <a:chExt cx="0" cy="0"/>
+        </a:xfrm>
+      </p:grpSpPr>
+      <p:sp>
+        <p:nvSpPr>
+          <p:cNvPr id="4" name="Oval 3">
+            <a:extLst>
+              <a:ext uri="{FF2B5EF4-FFF2-40B4-BE49-F238E27FC236}">
+                <a16:creationId xmlns:a16="http://schemas.microsoft.com/office/drawing/2014/main" id="{F15D4229-B255-46DF-A18C-4C9B19FBC6AB}"/>
+              </a:ext>
+            </a:extLst>
+          </p:cNvPr>
+          <p:cNvSpPr/>
+          <p:nvPr/>
+        </p:nvSpPr>
+        <p:spPr>
+          <a:xfrm>
+            <a:off x="4459564" y="604114"/>
+            <a:ext cx="956345" cy="914400"/>
+          </a:xfrm>
+          <a:prstGeom prst="ellipse">
+            <a:avLst/>
+          </a:prstGeom>
+          <a:solidFill>
+            <a:schemeClr val="bg1"/>
+          </a:solidFill>
+          <a:ln w="76200"/>
+        </p:spPr>
+        <p:style>
+          <a:lnRef idx="2">
+            <a:schemeClr val="accent1">
+              <a:shade val="50000"/>
+            </a:schemeClr>
+          </a:lnRef>
+          <a:fillRef idx="1">
+            <a:schemeClr val="accent1"/>
+          </a:fillRef>
+          <a:effectRef idx="0">
+            <a:schemeClr val="accent1"/>
+          </a:effectRef>
+          <a:fontRef idx="minor">
+            <a:schemeClr val="lt1"/>
+          </a:fontRef>
+        </p:style>
+        <p:txBody>
+          <a:bodyPr rtlCol="0" anchor="ctr"/>
+          <a:lstStyle/>
+          <a:p>
+            <a:pPr algn="ctr"/>
+            <a:endParaRPr lang="en-GB"/>
+          </a:p>
+        </p:txBody>
+      </p:sp>
+      <p:sp>
+        <p:nvSpPr>
+          <p:cNvPr id="5" name="Oval 4">
+            <a:extLst>
+              <a:ext uri="{FF2B5EF4-FFF2-40B4-BE49-F238E27FC236}">
+                <a16:creationId xmlns:a16="http://schemas.microsoft.com/office/drawing/2014/main" id="{D0B48D9D-A08E-44D8-A08E-D03B5F87AF43}"/>
+              </a:ext>
+            </a:extLst>
+          </p:cNvPr>
+          <p:cNvSpPr/>
+          <p:nvPr/>
+        </p:nvSpPr>
+        <p:spPr>
+          <a:xfrm>
+            <a:off x="6096000" y="2297850"/>
+            <a:ext cx="956345" cy="914400"/>
+          </a:xfrm>
+          <a:prstGeom prst="ellipse">
+            <a:avLst/>
+          </a:prstGeom>
+          <a:solidFill>
+            <a:schemeClr val="bg1"/>
+          </a:solidFill>
+          <a:ln w="76200"/>
+        </p:spPr>
+        <p:style>
+          <a:lnRef idx="2">
+            <a:schemeClr val="accent1">
+              <a:shade val="50000"/>
+            </a:schemeClr>
+          </a:lnRef>
+          <a:fillRef idx="1">
+            <a:schemeClr val="accent1"/>
+          </a:fillRef>
+          <a:effectRef idx="0">
+            <a:schemeClr val="accent1"/>
+          </a:effectRef>
+          <a:fontRef idx="minor">
+            <a:schemeClr val="lt1"/>
+          </a:fontRef>
+        </p:style>
+        <p:txBody>
+          <a:bodyPr rtlCol="0" anchor="ctr"/>
+          <a:lstStyle/>
+          <a:p>
+            <a:pPr algn="ctr"/>
+            <a:endParaRPr lang="en-GB"/>
+          </a:p>
+        </p:txBody>
+      </p:sp>
+      <p:cxnSp>
+        <p:nvCxnSpPr>
+          <p:cNvPr id="7" name="Straight Connector 6">
+            <a:extLst>
+              <a:ext uri="{FF2B5EF4-FFF2-40B4-BE49-F238E27FC236}">
+                <a16:creationId xmlns:a16="http://schemas.microsoft.com/office/drawing/2014/main" id="{483DF4B3-FE1E-47FE-8301-41B59A94A237}"/>
+              </a:ext>
+            </a:extLst>
+          </p:cNvPr>
+          <p:cNvCxnSpPr>
+            <a:cxnSpLocks/>
+            <a:stCxn id="4" idx="5"/>
+            <a:endCxn id="5" idx="1"/>
+          </p:cNvCxnSpPr>
+          <p:nvPr/>
+        </p:nvCxnSpPr>
+        <p:spPr>
+          <a:xfrm>
+            <a:off x="5275856" y="1384603"/>
+            <a:ext cx="960197" cy="1047158"/>
+          </a:xfrm>
+          <a:prstGeom prst="line">
+            <a:avLst/>
+          </a:prstGeom>
+        </p:spPr>
+        <p:style>
+          <a:lnRef idx="3">
+            <a:schemeClr val="dk1"/>
+          </a:lnRef>
+          <a:fillRef idx="0">
+            <a:schemeClr val="dk1"/>
+          </a:fillRef>
+          <a:effectRef idx="2">
+            <a:schemeClr val="dk1"/>
+          </a:effectRef>
+          <a:fontRef idx="minor">
+            <a:schemeClr val="tx1"/>
+          </a:fontRef>
+        </p:style>
+      </p:cxnSp>
+      <p:sp>
+        <p:nvSpPr>
+          <p:cNvPr id="11" name="TextBox 10">
+            <a:extLst>
+              <a:ext uri="{FF2B5EF4-FFF2-40B4-BE49-F238E27FC236}">
+                <a16:creationId xmlns:a16="http://schemas.microsoft.com/office/drawing/2014/main" id="{07FC053B-A830-4900-8C0F-333885D8D232}"/>
+              </a:ext>
+            </a:extLst>
+          </p:cNvPr>
+          <p:cNvSpPr txBox="1"/>
+          <p:nvPr/>
+        </p:nvSpPr>
+        <p:spPr>
+          <a:xfrm>
+            <a:off x="4506367" y="876648"/>
+            <a:ext cx="873957" cy="369332"/>
+          </a:xfrm>
+          <a:prstGeom prst="rect">
+            <a:avLst/>
+          </a:prstGeom>
+          <a:noFill/>
+        </p:spPr>
+        <p:txBody>
+          <a:bodyPr wrap="none" rtlCol="0">
+            <a:spAutoFit/>
+          </a:bodyPr>
+          <a:lstStyle/>
+          <a:p>
+            <a:r>
+              <a:rPr lang="en-IN" dirty="0"/>
+              <a:t>ELEM 1</a:t>
+            </a:r>
+          </a:p>
+        </p:txBody>
+      </p:sp>
+      <p:sp>
+        <p:nvSpPr>
+          <p:cNvPr id="12" name="TextBox 11">
+            <a:extLst>
+              <a:ext uri="{FF2B5EF4-FFF2-40B4-BE49-F238E27FC236}">
+                <a16:creationId xmlns:a16="http://schemas.microsoft.com/office/drawing/2014/main" id="{7E14AD92-4E50-4DAC-ADAC-95564A8F159A}"/>
+              </a:ext>
+            </a:extLst>
+          </p:cNvPr>
+          <p:cNvSpPr txBox="1"/>
+          <p:nvPr/>
+        </p:nvSpPr>
+        <p:spPr>
+          <a:xfrm>
+            <a:off x="6142803" y="2570384"/>
+            <a:ext cx="873957" cy="369332"/>
+          </a:xfrm>
+          <a:prstGeom prst="rect">
+            <a:avLst/>
+          </a:prstGeom>
+          <a:noFill/>
+        </p:spPr>
+        <p:txBody>
+          <a:bodyPr wrap="none" rtlCol="0">
+            <a:spAutoFit/>
+          </a:bodyPr>
+          <a:lstStyle/>
+          <a:p>
+            <a:r>
+              <a:rPr lang="en-IN" dirty="0"/>
+              <a:t>ELEM 2</a:t>
+            </a:r>
+          </a:p>
+        </p:txBody>
+      </p:sp>
+      <p:sp>
+        <p:nvSpPr>
+          <p:cNvPr id="13" name="TextBox 12">
+            <a:extLst>
+              <a:ext uri="{FF2B5EF4-FFF2-40B4-BE49-F238E27FC236}">
+                <a16:creationId xmlns:a16="http://schemas.microsoft.com/office/drawing/2014/main" id="{C248472E-B92A-48C9-8817-6D98D7A5C144}"/>
+              </a:ext>
+            </a:extLst>
+          </p:cNvPr>
+          <p:cNvSpPr txBox="1"/>
+          <p:nvPr/>
+        </p:nvSpPr>
+        <p:spPr>
+          <a:xfrm>
+            <a:off x="5709865" y="1471895"/>
+            <a:ext cx="637803" cy="369332"/>
+          </a:xfrm>
+          <a:prstGeom prst="rect">
+            <a:avLst/>
+          </a:prstGeom>
+          <a:noFill/>
+        </p:spPr>
+        <p:txBody>
+          <a:bodyPr wrap="none" rtlCol="0">
+            <a:spAutoFit/>
+          </a:bodyPr>
+          <a:lstStyle/>
+          <a:p>
+            <a:r>
+              <a:rPr lang="en-IN" dirty="0"/>
+              <a:t>Edge</a:t>
+            </a:r>
+          </a:p>
+        </p:txBody>
+      </p:sp>
+      <p:sp>
+        <p:nvSpPr>
+          <p:cNvPr id="2" name="TextBox 1">
+            <a:extLst>
+              <a:ext uri="{FF2B5EF4-FFF2-40B4-BE49-F238E27FC236}">
+                <a16:creationId xmlns:a16="http://schemas.microsoft.com/office/drawing/2014/main" id="{E4D42DBF-276D-4C84-B4E3-125788859DC9}"/>
+              </a:ext>
+            </a:extLst>
+          </p:cNvPr>
+          <p:cNvSpPr txBox="1"/>
+          <p:nvPr/>
+        </p:nvSpPr>
+        <p:spPr>
+          <a:xfrm>
+            <a:off x="5408568" y="401017"/>
+            <a:ext cx="1222066" cy="646331"/>
+          </a:xfrm>
+          <a:prstGeom prst="rect">
+            <a:avLst/>
+          </a:prstGeom>
+          <a:noFill/>
+        </p:spPr>
+        <p:txBody>
+          <a:bodyPr wrap="none" rtlCol="0">
+            <a:spAutoFit/>
+          </a:bodyPr>
+          <a:lstStyle/>
+          <a:p>
+            <a:r>
+              <a:rPr lang="en-IN" sz="1200" dirty="0"/>
+              <a:t>Node Attributes:</a:t>
+            </a:r>
+          </a:p>
+          <a:p>
+            <a:pPr marL="342900" indent="-342900">
+              <a:buAutoNum type="arabicPeriod"/>
+            </a:pPr>
+            <a:r>
+              <a:rPr lang="en-IN" sz="1200" dirty="0"/>
+              <a:t>INC1</a:t>
+            </a:r>
+          </a:p>
+          <a:p>
+            <a:pPr marL="342900" indent="-342900">
+              <a:buAutoNum type="arabicPeriod"/>
+            </a:pPr>
+            <a:r>
+              <a:rPr lang="en-IN" sz="1200" dirty="0"/>
+              <a:t>SITE1 etc</a:t>
+            </a:r>
+          </a:p>
+        </p:txBody>
+      </p:sp>
+      <p:sp>
+        <p:nvSpPr>
+          <p:cNvPr id="15" name="TextBox 14">
+            <a:extLst>
+              <a:ext uri="{FF2B5EF4-FFF2-40B4-BE49-F238E27FC236}">
+                <a16:creationId xmlns:a16="http://schemas.microsoft.com/office/drawing/2014/main" id="{9E16603C-1E10-454D-B9E9-FA83117AA281}"/>
+              </a:ext>
+            </a:extLst>
+          </p:cNvPr>
+          <p:cNvSpPr txBox="1"/>
+          <p:nvPr/>
+        </p:nvSpPr>
+        <p:spPr>
+          <a:xfrm>
+            <a:off x="6952274" y="1942051"/>
+            <a:ext cx="1222066" cy="646331"/>
+          </a:xfrm>
+          <a:prstGeom prst="rect">
+            <a:avLst/>
+          </a:prstGeom>
+          <a:noFill/>
+        </p:spPr>
+        <p:txBody>
+          <a:bodyPr wrap="none" rtlCol="0">
+            <a:spAutoFit/>
+          </a:bodyPr>
+          <a:lstStyle/>
+          <a:p>
+            <a:r>
+              <a:rPr lang="en-IN" sz="1200" dirty="0"/>
+              <a:t>Node Attributes:</a:t>
+            </a:r>
+          </a:p>
+          <a:p>
+            <a:pPr marL="342900" indent="-342900">
+              <a:buAutoNum type="arabicPeriod"/>
+            </a:pPr>
+            <a:r>
+              <a:rPr lang="en-IN" sz="1200" dirty="0"/>
+              <a:t>INC2</a:t>
+            </a:r>
+          </a:p>
+          <a:p>
+            <a:pPr marL="342900" indent="-342900">
+              <a:buAutoNum type="arabicPeriod"/>
+            </a:pPr>
+            <a:r>
+              <a:rPr lang="en-IN" sz="1200" dirty="0"/>
+              <a:t>SITE2 etc</a:t>
+            </a:r>
+          </a:p>
+        </p:txBody>
+      </p:sp>
+      <p:sp>
+        <p:nvSpPr>
+          <p:cNvPr id="17" name="TextBox 16">
+            <a:extLst>
+              <a:ext uri="{FF2B5EF4-FFF2-40B4-BE49-F238E27FC236}">
+                <a16:creationId xmlns:a16="http://schemas.microsoft.com/office/drawing/2014/main" id="{2A072F01-AB07-4B71-A104-F74E98E01856}"/>
+              </a:ext>
+            </a:extLst>
+          </p:cNvPr>
+          <p:cNvSpPr txBox="1"/>
+          <p:nvPr/>
+        </p:nvSpPr>
+        <p:spPr>
+          <a:xfrm>
+            <a:off x="4458345" y="1683860"/>
+            <a:ext cx="1704056" cy="830997"/>
+          </a:xfrm>
+          <a:prstGeom prst="rect">
+            <a:avLst/>
+          </a:prstGeom>
+          <a:noFill/>
+        </p:spPr>
+        <p:txBody>
+          <a:bodyPr wrap="none" rtlCol="0">
+            <a:spAutoFit/>
+          </a:bodyPr>
+          <a:lstStyle/>
+          <a:p>
+            <a:r>
+              <a:rPr lang="en-IN" sz="1200" dirty="0"/>
+              <a:t>Edge Attributes:</a:t>
+            </a:r>
+          </a:p>
+          <a:p>
+            <a:pPr marL="228600" indent="-228600">
+              <a:buAutoNum type="arabicPeriod"/>
+            </a:pPr>
+            <a:r>
+              <a:rPr lang="en-IN" sz="1200" dirty="0"/>
+              <a:t>Association Type</a:t>
+            </a:r>
+          </a:p>
+          <a:p>
+            <a:pPr marL="228600" indent="-228600">
+              <a:buAutoNum type="arabicPeriod"/>
+            </a:pPr>
+            <a:r>
+              <a:rPr lang="en-IN" sz="1200" dirty="0"/>
+              <a:t>No of times </a:t>
+            </a:r>
+            <a:br>
+              <a:rPr lang="en-IN" sz="1200" dirty="0"/>
+            </a:br>
+            <a:r>
+              <a:rPr lang="en-IN" sz="1200" dirty="0"/>
+              <a:t>association occurred</a:t>
+            </a:r>
+          </a:p>
+        </p:txBody>
+      </p:sp>
+    </p:spTree>
+    <p:extLst>
+      <p:ext uri="{BB962C8B-B14F-4D97-AF65-F5344CB8AC3E}">
+        <p14:creationId xmlns:p14="http://schemas.microsoft.com/office/powerpoint/2010/main" val="2851403533"/>
+      </p:ext>
+    </p:extLst>
+  </p:cSld>
+  <p:clrMapOvr>
+    <a:masterClrMapping/>
+  </p:clrMapOvr>
+</p:sld>
+</file>
+
 <file path=ppt/theme/theme1.xml><?xml version="1.0" encoding="utf-8"?>
 <a:theme xmlns:a="http://schemas.openxmlformats.org/drawingml/2006/main" name="Office Theme">
   <a:themeElements>
@@ -26132,6 +26932,21 @@
 </file>
 
 <file path=customXml/item1.xml><?xml version="1.0" encoding="utf-8"?>
+<?mso-contentType ?>
+<FormTemplates xmlns="http://schemas.microsoft.com/sharepoint/v3/contenttype/forms">
+  <Display>DocumentLibraryForm</Display>
+  <Edit>DocumentLibraryForm</Edit>
+  <New>DocumentLibraryForm</New>
+</FormTemplates>
+</file>
+
+<file path=customXml/item2.xml><?xml version="1.0" encoding="utf-8"?>
+<p:properties xmlns:p="http://schemas.microsoft.com/office/2006/metadata/properties" xmlns:xsi="http://www.w3.org/2001/XMLSchema-instance" xmlns:pc="http://schemas.microsoft.com/office/infopath/2007/PartnerControls">
+  <documentManagement/>
+</p:properties>
+</file>
+
+<file path=customXml/item3.xml><?xml version="1.0" encoding="utf-8"?>
 <ct:contentTypeSchema xmlns:ct="http://schemas.microsoft.com/office/2006/metadata/contentType" xmlns:ma="http://schemas.microsoft.com/office/2006/metadata/properties/metaAttributes" ct:_="" ma:_="" ma:contentTypeName="Document" ma:contentTypeID="0x010100E5E90CE7D835DF49A54E7D3F39A82871" ma:contentTypeVersion="10" ma:contentTypeDescription="Create a new document." ma:contentTypeScope="" ma:versionID="ecb1bcfb5513d0ca4ca2e29515166e3d">
   <xsd:schema xmlns:xsd="http://www.w3.org/2001/XMLSchema" xmlns:xs="http://www.w3.org/2001/XMLSchema" xmlns:p="http://schemas.microsoft.com/office/2006/metadata/properties" xmlns:ns3="bdd987ea-5e3c-4d73-ab5b-afe2844564b9" xmlns:ns4="8eab65b4-4232-441d-b263-cd52eab97547" targetNamespace="http://schemas.microsoft.com/office/2006/metadata/properties" ma:root="true" ma:fieldsID="1c60ee05aeafbf51a253cd522014a061" ns3:_="" ns4:_="">
     <xsd:import namespace="bdd987ea-5e3c-4d73-ab5b-afe2844564b9"/>
@@ -26334,36 +27149,10 @@
 </ct:contentTypeSchema>
 </file>
 
-<file path=customXml/item2.xml><?xml version="1.0" encoding="utf-8"?>
-<p:properties xmlns:p="http://schemas.microsoft.com/office/2006/metadata/properties" xmlns:xsi="http://www.w3.org/2001/XMLSchema-instance" xmlns:pc="http://schemas.microsoft.com/office/infopath/2007/PartnerControls">
-  <documentManagement/>
-</p:properties>
-</file>
-
-<file path=customXml/item3.xml><?xml version="1.0" encoding="utf-8"?>
-<?mso-contentType ?>
-<FormTemplates xmlns="http://schemas.microsoft.com/sharepoint/v3/contenttype/forms">
-  <Display>DocumentLibraryForm</Display>
-  <Edit>DocumentLibraryForm</Edit>
-  <New>DocumentLibraryForm</New>
-</FormTemplates>
-</file>
-
 <file path=customXml/itemProps1.xml><?xml version="1.0" encoding="utf-8"?>
-<ds:datastoreItem xmlns:ds="http://schemas.openxmlformats.org/officeDocument/2006/customXml" ds:itemID="{A4141BA4-1192-479A-9875-9E50B86A06A0}">
+<ds:datastoreItem xmlns:ds="http://schemas.openxmlformats.org/officeDocument/2006/customXml" ds:itemID="{666DA301-B763-471A-885E-1C88D4229E18}">
   <ds:schemaRefs>
-    <ds:schemaRef ds:uri="http://schemas.microsoft.com/office/2006/metadata/contentType"/>
-    <ds:schemaRef ds:uri="http://schemas.microsoft.com/office/2006/metadata/properties/metaAttributes"/>
-    <ds:schemaRef ds:uri="http://www.w3.org/2001/XMLSchema"/>
-    <ds:schemaRef ds:uri="http://schemas.microsoft.com/office/2006/metadata/properties"/>
-    <ds:schemaRef ds:uri="bdd987ea-5e3c-4d73-ab5b-afe2844564b9"/>
-    <ds:schemaRef ds:uri="8eab65b4-4232-441d-b263-cd52eab97547"/>
-    <ds:schemaRef ds:uri="http://schemas.microsoft.com/office/2006/documentManagement/types"/>
-    <ds:schemaRef ds:uri="http://schemas.microsoft.com/office/infopath/2007/PartnerControls"/>
-    <ds:schemaRef ds:uri="http://schemas.openxmlformats.org/package/2006/metadata/core-properties"/>
-    <ds:schemaRef ds:uri="http://purl.org/dc/elements/1.1/"/>
-    <ds:schemaRef ds:uri="http://purl.org/dc/terms/"/>
-    <ds:schemaRef ds:uri="http://schemas.microsoft.com/internal/obd"/>
+    <ds:schemaRef ds:uri="http://schemas.microsoft.com/sharepoint/v3/contenttype/forms"/>
   </ds:schemaRefs>
 </ds:datastoreItem>
 </file>
@@ -26386,9 +27175,20 @@
 </file>
 
 <file path=customXml/itemProps3.xml><?xml version="1.0" encoding="utf-8"?>
-<ds:datastoreItem xmlns:ds="http://schemas.openxmlformats.org/officeDocument/2006/customXml" ds:itemID="{666DA301-B763-471A-885E-1C88D4229E18}">
+<ds:datastoreItem xmlns:ds="http://schemas.openxmlformats.org/officeDocument/2006/customXml" ds:itemID="{A4141BA4-1192-479A-9875-9E50B86A06A0}">
   <ds:schemaRefs>
-    <ds:schemaRef ds:uri="http://schemas.microsoft.com/sharepoint/v3/contenttype/forms"/>
+    <ds:schemaRef ds:uri="http://schemas.microsoft.com/office/2006/metadata/contentType"/>
+    <ds:schemaRef ds:uri="http://schemas.microsoft.com/office/2006/metadata/properties/metaAttributes"/>
+    <ds:schemaRef ds:uri="http://www.w3.org/2001/XMLSchema"/>
+    <ds:schemaRef ds:uri="http://schemas.microsoft.com/office/2006/metadata/properties"/>
+    <ds:schemaRef ds:uri="bdd987ea-5e3c-4d73-ab5b-afe2844564b9"/>
+    <ds:schemaRef ds:uri="8eab65b4-4232-441d-b263-cd52eab97547"/>
+    <ds:schemaRef ds:uri="http://schemas.microsoft.com/office/2006/documentManagement/types"/>
+    <ds:schemaRef ds:uri="http://schemas.microsoft.com/office/infopath/2007/PartnerControls"/>
+    <ds:schemaRef ds:uri="http://schemas.openxmlformats.org/package/2006/metadata/core-properties"/>
+    <ds:schemaRef ds:uri="http://purl.org/dc/elements/1.1/"/>
+    <ds:schemaRef ds:uri="http://purl.org/dc/terms/"/>
+    <ds:schemaRef ds:uri="http://schemas.microsoft.com/internal/obd"/>
   </ds:schemaRefs>
 </ds:datastoreItem>
 </file>
</xml_diff>

<commit_message>
Definition of Bipartite graph
</commit_message>
<xml_diff>
--- a/images/all_images.pptx
+++ b/images/all_images.pptx
@@ -2999,7 +2999,7 @@
           <a:p>
             <a:fld id="{D01F0EC8-559C-4531-A8E8-340B9D3AA874}" type="datetimeFigureOut">
               <a:rPr lang="en-GB" smtClean="0"/>
-              <a:t>21/01/2020</a:t>
+              <a:t>25/01/2020</a:t>
             </a:fld>
             <a:endParaRPr lang="en-GB"/>
           </a:p>
@@ -3199,7 +3199,7 @@
           <a:p>
             <a:fld id="{D01F0EC8-559C-4531-A8E8-340B9D3AA874}" type="datetimeFigureOut">
               <a:rPr lang="en-GB" smtClean="0"/>
-              <a:t>21/01/2020</a:t>
+              <a:t>25/01/2020</a:t>
             </a:fld>
             <a:endParaRPr lang="en-GB"/>
           </a:p>
@@ -3409,7 +3409,7 @@
           <a:p>
             <a:fld id="{D01F0EC8-559C-4531-A8E8-340B9D3AA874}" type="datetimeFigureOut">
               <a:rPr lang="en-GB" smtClean="0"/>
-              <a:t>21/01/2020</a:t>
+              <a:t>25/01/2020</a:t>
             </a:fld>
             <a:endParaRPr lang="en-GB"/>
           </a:p>
@@ -3609,7 +3609,7 @@
           <a:p>
             <a:fld id="{D01F0EC8-559C-4531-A8E8-340B9D3AA874}" type="datetimeFigureOut">
               <a:rPr lang="en-GB" smtClean="0"/>
-              <a:t>21/01/2020</a:t>
+              <a:t>25/01/2020</a:t>
             </a:fld>
             <a:endParaRPr lang="en-GB"/>
           </a:p>
@@ -3885,7 +3885,7 @@
           <a:p>
             <a:fld id="{D01F0EC8-559C-4531-A8E8-340B9D3AA874}" type="datetimeFigureOut">
               <a:rPr lang="en-GB" smtClean="0"/>
-              <a:t>21/01/2020</a:t>
+              <a:t>25/01/2020</a:t>
             </a:fld>
             <a:endParaRPr lang="en-GB"/>
           </a:p>
@@ -4153,7 +4153,7 @@
           <a:p>
             <a:fld id="{D01F0EC8-559C-4531-A8E8-340B9D3AA874}" type="datetimeFigureOut">
               <a:rPr lang="en-GB" smtClean="0"/>
-              <a:t>21/01/2020</a:t>
+              <a:t>25/01/2020</a:t>
             </a:fld>
             <a:endParaRPr lang="en-GB"/>
           </a:p>
@@ -4568,7 +4568,7 @@
           <a:p>
             <a:fld id="{D01F0EC8-559C-4531-A8E8-340B9D3AA874}" type="datetimeFigureOut">
               <a:rPr lang="en-GB" smtClean="0"/>
-              <a:t>21/01/2020</a:t>
+              <a:t>25/01/2020</a:t>
             </a:fld>
             <a:endParaRPr lang="en-GB"/>
           </a:p>
@@ -4710,7 +4710,7 @@
           <a:p>
             <a:fld id="{D01F0EC8-559C-4531-A8E8-340B9D3AA874}" type="datetimeFigureOut">
               <a:rPr lang="en-GB" smtClean="0"/>
-              <a:t>21/01/2020</a:t>
+              <a:t>25/01/2020</a:t>
             </a:fld>
             <a:endParaRPr lang="en-GB"/>
           </a:p>
@@ -4823,7 +4823,7 @@
           <a:p>
             <a:fld id="{D01F0EC8-559C-4531-A8E8-340B9D3AA874}" type="datetimeFigureOut">
               <a:rPr lang="en-GB" smtClean="0"/>
-              <a:t>21/01/2020</a:t>
+              <a:t>25/01/2020</a:t>
             </a:fld>
             <a:endParaRPr lang="en-GB"/>
           </a:p>
@@ -5136,7 +5136,7 @@
           <a:p>
             <a:fld id="{D01F0EC8-559C-4531-A8E8-340B9D3AA874}" type="datetimeFigureOut">
               <a:rPr lang="en-GB" smtClean="0"/>
-              <a:t>21/01/2020</a:t>
+              <a:t>25/01/2020</a:t>
             </a:fld>
             <a:endParaRPr lang="en-GB"/>
           </a:p>
@@ -5425,7 +5425,7 @@
           <a:p>
             <a:fld id="{D01F0EC8-559C-4531-A8E8-340B9D3AA874}" type="datetimeFigureOut">
               <a:rPr lang="en-GB" smtClean="0"/>
-              <a:t>21/01/2020</a:t>
+              <a:t>25/01/2020</a:t>
             </a:fld>
             <a:endParaRPr lang="en-GB"/>
           </a:p>
@@ -5668,7 +5668,7 @@
           <a:p>
             <a:fld id="{D01F0EC8-559C-4531-A8E8-340B9D3AA874}" type="datetimeFigureOut">
               <a:rPr lang="en-GB" smtClean="0"/>
-              <a:t>21/01/2020</a:t>
+              <a:t>25/01/2020</a:t>
             </a:fld>
             <a:endParaRPr lang="en-GB"/>
           </a:p>
@@ -26182,6 +26182,1010 @@
           </a:p>
         </p:txBody>
       </p:sp>
+      <p:sp>
+        <p:nvSpPr>
+          <p:cNvPr id="10" name="Oval 9">
+            <a:extLst>
+              <a:ext uri="{FF2B5EF4-FFF2-40B4-BE49-F238E27FC236}">
+                <a16:creationId xmlns:a16="http://schemas.microsoft.com/office/drawing/2014/main" id="{0BAF1DD5-890E-4574-BCCB-4A633B14D92D}"/>
+              </a:ext>
+            </a:extLst>
+          </p:cNvPr>
+          <p:cNvSpPr/>
+          <p:nvPr/>
+        </p:nvSpPr>
+        <p:spPr>
+          <a:xfrm>
+            <a:off x="8116950" y="4845804"/>
+            <a:ext cx="391886" cy="374469"/>
+          </a:xfrm>
+          <a:prstGeom prst="ellipse">
+            <a:avLst/>
+          </a:prstGeom>
+          <a:solidFill>
+            <a:schemeClr val="accent6">
+              <a:lumMod val="75000"/>
+            </a:schemeClr>
+          </a:solidFill>
+          <a:ln>
+            <a:noFill/>
+          </a:ln>
+        </p:spPr>
+        <p:style>
+          <a:lnRef idx="2">
+            <a:schemeClr val="accent1">
+              <a:shade val="50000"/>
+            </a:schemeClr>
+          </a:lnRef>
+          <a:fillRef idx="1">
+            <a:schemeClr val="accent1"/>
+          </a:fillRef>
+          <a:effectRef idx="0">
+            <a:schemeClr val="accent1"/>
+          </a:effectRef>
+          <a:fontRef idx="minor">
+            <a:schemeClr val="lt1"/>
+          </a:fontRef>
+        </p:style>
+        <p:txBody>
+          <a:bodyPr rtlCol="0" anchor="ctr"/>
+          <a:lstStyle/>
+          <a:p>
+            <a:pPr algn="ctr"/>
+            <a:endParaRPr lang="en-IN"/>
+          </a:p>
+        </p:txBody>
+      </p:sp>
+      <p:sp>
+        <p:nvSpPr>
+          <p:cNvPr id="15" name="Oval 14">
+            <a:extLst>
+              <a:ext uri="{FF2B5EF4-FFF2-40B4-BE49-F238E27FC236}">
+                <a16:creationId xmlns:a16="http://schemas.microsoft.com/office/drawing/2014/main" id="{0C4532A6-D47C-4234-A212-69CB52B32C48}"/>
+              </a:ext>
+            </a:extLst>
+          </p:cNvPr>
+          <p:cNvSpPr/>
+          <p:nvPr/>
+        </p:nvSpPr>
+        <p:spPr>
+          <a:xfrm>
+            <a:off x="8116950" y="4103615"/>
+            <a:ext cx="391886" cy="374469"/>
+          </a:xfrm>
+          <a:prstGeom prst="ellipse">
+            <a:avLst/>
+          </a:prstGeom>
+          <a:solidFill>
+            <a:srgbClr val="00B050"/>
+          </a:solidFill>
+          <a:ln>
+            <a:noFill/>
+          </a:ln>
+        </p:spPr>
+        <p:style>
+          <a:lnRef idx="2">
+            <a:schemeClr val="accent1">
+              <a:shade val="50000"/>
+            </a:schemeClr>
+          </a:lnRef>
+          <a:fillRef idx="1">
+            <a:schemeClr val="accent1"/>
+          </a:fillRef>
+          <a:effectRef idx="0">
+            <a:schemeClr val="accent1"/>
+          </a:effectRef>
+          <a:fontRef idx="minor">
+            <a:schemeClr val="lt1"/>
+          </a:fontRef>
+        </p:style>
+        <p:txBody>
+          <a:bodyPr rtlCol="0" anchor="ctr"/>
+          <a:lstStyle/>
+          <a:p>
+            <a:pPr algn="ctr"/>
+            <a:endParaRPr lang="en-IN"/>
+          </a:p>
+        </p:txBody>
+      </p:sp>
+      <p:sp>
+        <p:nvSpPr>
+          <p:cNvPr id="18" name="Oval 17">
+            <a:extLst>
+              <a:ext uri="{FF2B5EF4-FFF2-40B4-BE49-F238E27FC236}">
+                <a16:creationId xmlns:a16="http://schemas.microsoft.com/office/drawing/2014/main" id="{143BC462-1989-491C-8782-AF9C84D5C98C}"/>
+              </a:ext>
+            </a:extLst>
+          </p:cNvPr>
+          <p:cNvSpPr/>
+          <p:nvPr/>
+        </p:nvSpPr>
+        <p:spPr>
+          <a:xfrm>
+            <a:off x="9677034" y="5126490"/>
+            <a:ext cx="391886" cy="374469"/>
+          </a:xfrm>
+          <a:prstGeom prst="ellipse">
+            <a:avLst/>
+          </a:prstGeom>
+          <a:solidFill>
+            <a:schemeClr val="accent2"/>
+          </a:solidFill>
+          <a:ln>
+            <a:noFill/>
+          </a:ln>
+        </p:spPr>
+        <p:style>
+          <a:lnRef idx="2">
+            <a:schemeClr val="accent1">
+              <a:shade val="50000"/>
+            </a:schemeClr>
+          </a:lnRef>
+          <a:fillRef idx="1">
+            <a:schemeClr val="accent1"/>
+          </a:fillRef>
+          <a:effectRef idx="0">
+            <a:schemeClr val="accent1"/>
+          </a:effectRef>
+          <a:fontRef idx="minor">
+            <a:schemeClr val="lt1"/>
+          </a:fontRef>
+        </p:style>
+        <p:txBody>
+          <a:bodyPr rtlCol="0" anchor="ctr"/>
+          <a:lstStyle/>
+          <a:p>
+            <a:pPr algn="ctr"/>
+            <a:endParaRPr lang="en-IN"/>
+          </a:p>
+        </p:txBody>
+      </p:sp>
+      <p:cxnSp>
+        <p:nvCxnSpPr>
+          <p:cNvPr id="19" name="Straight Connector 18">
+            <a:extLst>
+              <a:ext uri="{FF2B5EF4-FFF2-40B4-BE49-F238E27FC236}">
+                <a16:creationId xmlns:a16="http://schemas.microsoft.com/office/drawing/2014/main" id="{94FE2DCA-5158-46A8-A1F5-7439436766DA}"/>
+              </a:ext>
+            </a:extLst>
+          </p:cNvPr>
+          <p:cNvCxnSpPr>
+            <a:cxnSpLocks/>
+            <a:stCxn id="28" idx="2"/>
+            <a:endCxn id="25" idx="6"/>
+          </p:cNvCxnSpPr>
+          <p:nvPr/>
+        </p:nvCxnSpPr>
+        <p:spPr>
+          <a:xfrm flipH="1" flipV="1">
+            <a:off x="8508836" y="4296860"/>
+            <a:ext cx="1168198" cy="388870"/>
+          </a:xfrm>
+          <a:prstGeom prst="line">
+            <a:avLst/>
+          </a:prstGeom>
+          <a:ln w="31750">
+            <a:solidFill>
+              <a:schemeClr val="accent6">
+                <a:lumMod val="75000"/>
+              </a:schemeClr>
+            </a:solidFill>
+          </a:ln>
+        </p:spPr>
+        <p:style>
+          <a:lnRef idx="1">
+            <a:schemeClr val="accent1"/>
+          </a:lnRef>
+          <a:fillRef idx="0">
+            <a:schemeClr val="accent1"/>
+          </a:fillRef>
+          <a:effectRef idx="0">
+            <a:schemeClr val="accent1"/>
+          </a:effectRef>
+          <a:fontRef idx="minor">
+            <a:schemeClr val="tx1"/>
+          </a:fontRef>
+        </p:style>
+      </p:cxnSp>
+      <p:sp>
+        <p:nvSpPr>
+          <p:cNvPr id="21" name="Oval 20">
+            <a:extLst>
+              <a:ext uri="{FF2B5EF4-FFF2-40B4-BE49-F238E27FC236}">
+                <a16:creationId xmlns:a16="http://schemas.microsoft.com/office/drawing/2014/main" id="{6B996376-C33B-4C0B-8E2D-3CD14454D546}"/>
+              </a:ext>
+            </a:extLst>
+          </p:cNvPr>
+          <p:cNvSpPr/>
+          <p:nvPr/>
+        </p:nvSpPr>
+        <p:spPr>
+          <a:xfrm>
+            <a:off x="9677034" y="4498421"/>
+            <a:ext cx="391886" cy="374469"/>
+          </a:xfrm>
+          <a:prstGeom prst="ellipse">
+            <a:avLst/>
+          </a:prstGeom>
+          <a:solidFill>
+            <a:schemeClr val="accent5">
+              <a:lumMod val="50000"/>
+            </a:schemeClr>
+          </a:solidFill>
+          <a:ln>
+            <a:noFill/>
+          </a:ln>
+        </p:spPr>
+        <p:style>
+          <a:lnRef idx="2">
+            <a:schemeClr val="accent1">
+              <a:shade val="50000"/>
+            </a:schemeClr>
+          </a:lnRef>
+          <a:fillRef idx="1">
+            <a:schemeClr val="accent1"/>
+          </a:fillRef>
+          <a:effectRef idx="0">
+            <a:schemeClr val="accent1"/>
+          </a:effectRef>
+          <a:fontRef idx="minor">
+            <a:schemeClr val="lt1"/>
+          </a:fontRef>
+        </p:style>
+        <p:txBody>
+          <a:bodyPr rtlCol="0" anchor="ctr"/>
+          <a:lstStyle/>
+          <a:p>
+            <a:pPr algn="ctr"/>
+            <a:endParaRPr lang="en-IN"/>
+          </a:p>
+        </p:txBody>
+      </p:sp>
+      <p:sp>
+        <p:nvSpPr>
+          <p:cNvPr id="25" name="Oval 24">
+            <a:extLst>
+              <a:ext uri="{FF2B5EF4-FFF2-40B4-BE49-F238E27FC236}">
+                <a16:creationId xmlns:a16="http://schemas.microsoft.com/office/drawing/2014/main" id="{2114A43C-A85E-4638-BBB0-449BEC9AD7A0}"/>
+              </a:ext>
+            </a:extLst>
+          </p:cNvPr>
+          <p:cNvSpPr/>
+          <p:nvPr/>
+        </p:nvSpPr>
+        <p:spPr>
+          <a:xfrm>
+            <a:off x="8116950" y="4109625"/>
+            <a:ext cx="391886" cy="374469"/>
+          </a:xfrm>
+          <a:prstGeom prst="ellipse">
+            <a:avLst/>
+          </a:prstGeom>
+          <a:solidFill>
+            <a:schemeClr val="accent6">
+              <a:lumMod val="75000"/>
+            </a:schemeClr>
+          </a:solidFill>
+          <a:ln>
+            <a:noFill/>
+          </a:ln>
+        </p:spPr>
+        <p:style>
+          <a:lnRef idx="2">
+            <a:schemeClr val="accent1">
+              <a:shade val="50000"/>
+            </a:schemeClr>
+          </a:lnRef>
+          <a:fillRef idx="1">
+            <a:schemeClr val="accent1"/>
+          </a:fillRef>
+          <a:effectRef idx="0">
+            <a:schemeClr val="accent1"/>
+          </a:effectRef>
+          <a:fontRef idx="minor">
+            <a:schemeClr val="lt1"/>
+          </a:fontRef>
+        </p:style>
+        <p:txBody>
+          <a:bodyPr rtlCol="0" anchor="ctr"/>
+          <a:lstStyle/>
+          <a:p>
+            <a:pPr algn="ctr"/>
+            <a:endParaRPr lang="en-IN"/>
+          </a:p>
+        </p:txBody>
+      </p:sp>
+      <p:sp>
+        <p:nvSpPr>
+          <p:cNvPr id="26" name="Oval 25">
+            <a:extLst>
+              <a:ext uri="{FF2B5EF4-FFF2-40B4-BE49-F238E27FC236}">
+                <a16:creationId xmlns:a16="http://schemas.microsoft.com/office/drawing/2014/main" id="{D17895CE-771E-4616-9F21-093C82BFDDD6}"/>
+              </a:ext>
+            </a:extLst>
+          </p:cNvPr>
+          <p:cNvSpPr/>
+          <p:nvPr/>
+        </p:nvSpPr>
+        <p:spPr>
+          <a:xfrm>
+            <a:off x="8116950" y="5563050"/>
+            <a:ext cx="391886" cy="374469"/>
+          </a:xfrm>
+          <a:prstGeom prst="ellipse">
+            <a:avLst/>
+          </a:prstGeom>
+          <a:solidFill>
+            <a:schemeClr val="accent6">
+              <a:lumMod val="75000"/>
+            </a:schemeClr>
+          </a:solidFill>
+          <a:ln>
+            <a:noFill/>
+          </a:ln>
+        </p:spPr>
+        <p:style>
+          <a:lnRef idx="2">
+            <a:schemeClr val="accent1">
+              <a:shade val="50000"/>
+            </a:schemeClr>
+          </a:lnRef>
+          <a:fillRef idx="1">
+            <a:schemeClr val="accent1"/>
+          </a:fillRef>
+          <a:effectRef idx="0">
+            <a:schemeClr val="accent1"/>
+          </a:effectRef>
+          <a:fontRef idx="minor">
+            <a:schemeClr val="lt1"/>
+          </a:fontRef>
+        </p:style>
+        <p:txBody>
+          <a:bodyPr rtlCol="0" anchor="ctr"/>
+          <a:lstStyle/>
+          <a:p>
+            <a:pPr algn="ctr"/>
+            <a:endParaRPr lang="en-IN"/>
+          </a:p>
+        </p:txBody>
+      </p:sp>
+      <p:sp>
+        <p:nvSpPr>
+          <p:cNvPr id="27" name="Oval 26">
+            <a:extLst>
+              <a:ext uri="{FF2B5EF4-FFF2-40B4-BE49-F238E27FC236}">
+                <a16:creationId xmlns:a16="http://schemas.microsoft.com/office/drawing/2014/main" id="{E8DC91E9-3AE5-4AD4-A04E-63AED4A7F768}"/>
+              </a:ext>
+            </a:extLst>
+          </p:cNvPr>
+          <p:cNvSpPr/>
+          <p:nvPr/>
+        </p:nvSpPr>
+        <p:spPr>
+          <a:xfrm>
+            <a:off x="8116950" y="6246446"/>
+            <a:ext cx="391886" cy="374469"/>
+          </a:xfrm>
+          <a:prstGeom prst="ellipse">
+            <a:avLst/>
+          </a:prstGeom>
+          <a:solidFill>
+            <a:schemeClr val="accent6">
+              <a:lumMod val="75000"/>
+            </a:schemeClr>
+          </a:solidFill>
+          <a:ln>
+            <a:noFill/>
+          </a:ln>
+        </p:spPr>
+        <p:style>
+          <a:lnRef idx="2">
+            <a:schemeClr val="accent1">
+              <a:shade val="50000"/>
+            </a:schemeClr>
+          </a:lnRef>
+          <a:fillRef idx="1">
+            <a:schemeClr val="accent1"/>
+          </a:fillRef>
+          <a:effectRef idx="0">
+            <a:schemeClr val="accent1"/>
+          </a:effectRef>
+          <a:fontRef idx="minor">
+            <a:schemeClr val="lt1"/>
+          </a:fontRef>
+        </p:style>
+        <p:txBody>
+          <a:bodyPr rtlCol="0" anchor="ctr"/>
+          <a:lstStyle/>
+          <a:p>
+            <a:pPr algn="ctr"/>
+            <a:endParaRPr lang="en-IN"/>
+          </a:p>
+        </p:txBody>
+      </p:sp>
+      <p:sp>
+        <p:nvSpPr>
+          <p:cNvPr id="28" name="Oval 27">
+            <a:extLst>
+              <a:ext uri="{FF2B5EF4-FFF2-40B4-BE49-F238E27FC236}">
+                <a16:creationId xmlns:a16="http://schemas.microsoft.com/office/drawing/2014/main" id="{9794A38D-26F7-4558-ADD6-AFA52E25E23E}"/>
+              </a:ext>
+            </a:extLst>
+          </p:cNvPr>
+          <p:cNvSpPr/>
+          <p:nvPr/>
+        </p:nvSpPr>
+        <p:spPr>
+          <a:xfrm>
+            <a:off x="9677034" y="4498495"/>
+            <a:ext cx="391886" cy="374469"/>
+          </a:xfrm>
+          <a:prstGeom prst="ellipse">
+            <a:avLst/>
+          </a:prstGeom>
+          <a:solidFill>
+            <a:schemeClr val="accent2"/>
+          </a:solidFill>
+          <a:ln>
+            <a:noFill/>
+          </a:ln>
+        </p:spPr>
+        <p:style>
+          <a:lnRef idx="2">
+            <a:schemeClr val="accent1">
+              <a:shade val="50000"/>
+            </a:schemeClr>
+          </a:lnRef>
+          <a:fillRef idx="1">
+            <a:schemeClr val="accent1"/>
+          </a:fillRef>
+          <a:effectRef idx="0">
+            <a:schemeClr val="accent1"/>
+          </a:effectRef>
+          <a:fontRef idx="minor">
+            <a:schemeClr val="lt1"/>
+          </a:fontRef>
+        </p:style>
+        <p:txBody>
+          <a:bodyPr rtlCol="0" anchor="ctr"/>
+          <a:lstStyle/>
+          <a:p>
+            <a:pPr algn="ctr"/>
+            <a:endParaRPr lang="en-IN"/>
+          </a:p>
+        </p:txBody>
+      </p:sp>
+      <p:sp>
+        <p:nvSpPr>
+          <p:cNvPr id="29" name="Oval 28">
+            <a:extLst>
+              <a:ext uri="{FF2B5EF4-FFF2-40B4-BE49-F238E27FC236}">
+                <a16:creationId xmlns:a16="http://schemas.microsoft.com/office/drawing/2014/main" id="{4878FB33-9147-4A50-A2D6-FFA275D3ECD4}"/>
+              </a:ext>
+            </a:extLst>
+          </p:cNvPr>
+          <p:cNvSpPr/>
+          <p:nvPr/>
+        </p:nvSpPr>
+        <p:spPr>
+          <a:xfrm>
+            <a:off x="9677034" y="5794472"/>
+            <a:ext cx="391886" cy="374469"/>
+          </a:xfrm>
+          <a:prstGeom prst="ellipse">
+            <a:avLst/>
+          </a:prstGeom>
+          <a:solidFill>
+            <a:schemeClr val="accent2"/>
+          </a:solidFill>
+          <a:ln>
+            <a:noFill/>
+          </a:ln>
+        </p:spPr>
+        <p:style>
+          <a:lnRef idx="2">
+            <a:schemeClr val="accent1">
+              <a:shade val="50000"/>
+            </a:schemeClr>
+          </a:lnRef>
+          <a:fillRef idx="1">
+            <a:schemeClr val="accent1"/>
+          </a:fillRef>
+          <a:effectRef idx="0">
+            <a:schemeClr val="accent1"/>
+          </a:effectRef>
+          <a:fontRef idx="minor">
+            <a:schemeClr val="lt1"/>
+          </a:fontRef>
+        </p:style>
+        <p:txBody>
+          <a:bodyPr rtlCol="0" anchor="ctr"/>
+          <a:lstStyle/>
+          <a:p>
+            <a:pPr algn="ctr"/>
+            <a:endParaRPr lang="en-IN"/>
+          </a:p>
+        </p:txBody>
+      </p:sp>
+      <p:cxnSp>
+        <p:nvCxnSpPr>
+          <p:cNvPr id="30" name="Straight Connector 29">
+            <a:extLst>
+              <a:ext uri="{FF2B5EF4-FFF2-40B4-BE49-F238E27FC236}">
+                <a16:creationId xmlns:a16="http://schemas.microsoft.com/office/drawing/2014/main" id="{C5A13989-A9CC-4B23-A591-F5BA9CB059EC}"/>
+              </a:ext>
+            </a:extLst>
+          </p:cNvPr>
+          <p:cNvCxnSpPr>
+            <a:cxnSpLocks/>
+            <a:stCxn id="29" idx="2"/>
+          </p:cNvCxnSpPr>
+          <p:nvPr/>
+        </p:nvCxnSpPr>
+        <p:spPr>
+          <a:xfrm flipH="1" flipV="1">
+            <a:off x="8508836" y="4303951"/>
+            <a:ext cx="1168198" cy="1677756"/>
+          </a:xfrm>
+          <a:prstGeom prst="line">
+            <a:avLst/>
+          </a:prstGeom>
+          <a:ln w="31750">
+            <a:solidFill>
+              <a:schemeClr val="accent6">
+                <a:lumMod val="75000"/>
+              </a:schemeClr>
+            </a:solidFill>
+          </a:ln>
+        </p:spPr>
+        <p:style>
+          <a:lnRef idx="1">
+            <a:schemeClr val="accent1"/>
+          </a:lnRef>
+          <a:fillRef idx="0">
+            <a:schemeClr val="accent1"/>
+          </a:fillRef>
+          <a:effectRef idx="0">
+            <a:schemeClr val="accent1"/>
+          </a:effectRef>
+          <a:fontRef idx="minor">
+            <a:schemeClr val="tx1"/>
+          </a:fontRef>
+        </p:style>
+      </p:cxnSp>
+      <p:cxnSp>
+        <p:nvCxnSpPr>
+          <p:cNvPr id="31" name="Straight Connector 30">
+            <a:extLst>
+              <a:ext uri="{FF2B5EF4-FFF2-40B4-BE49-F238E27FC236}">
+                <a16:creationId xmlns:a16="http://schemas.microsoft.com/office/drawing/2014/main" id="{EDFDC4DF-A84B-45A3-9D4D-B69117C52735}"/>
+              </a:ext>
+            </a:extLst>
+          </p:cNvPr>
+          <p:cNvCxnSpPr>
+            <a:cxnSpLocks/>
+            <a:stCxn id="28" idx="2"/>
+            <a:endCxn id="10" idx="6"/>
+          </p:cNvCxnSpPr>
+          <p:nvPr/>
+        </p:nvCxnSpPr>
+        <p:spPr>
+          <a:xfrm flipH="1">
+            <a:off x="8508836" y="4685730"/>
+            <a:ext cx="1168198" cy="347309"/>
+          </a:xfrm>
+          <a:prstGeom prst="line">
+            <a:avLst/>
+          </a:prstGeom>
+          <a:ln w="31750">
+            <a:solidFill>
+              <a:schemeClr val="accent6">
+                <a:lumMod val="75000"/>
+              </a:schemeClr>
+            </a:solidFill>
+          </a:ln>
+        </p:spPr>
+        <p:style>
+          <a:lnRef idx="1">
+            <a:schemeClr val="accent1"/>
+          </a:lnRef>
+          <a:fillRef idx="0">
+            <a:schemeClr val="accent1"/>
+          </a:fillRef>
+          <a:effectRef idx="0">
+            <a:schemeClr val="accent1"/>
+          </a:effectRef>
+          <a:fontRef idx="minor">
+            <a:schemeClr val="tx1"/>
+          </a:fontRef>
+        </p:style>
+      </p:cxnSp>
+      <p:cxnSp>
+        <p:nvCxnSpPr>
+          <p:cNvPr id="33" name="Straight Connector 32">
+            <a:extLst>
+              <a:ext uri="{FF2B5EF4-FFF2-40B4-BE49-F238E27FC236}">
+                <a16:creationId xmlns:a16="http://schemas.microsoft.com/office/drawing/2014/main" id="{184936D4-4BAE-4361-9CA6-DA5FABD0597B}"/>
+              </a:ext>
+            </a:extLst>
+          </p:cNvPr>
+          <p:cNvCxnSpPr>
+            <a:cxnSpLocks/>
+            <a:stCxn id="18" idx="2"/>
+            <a:endCxn id="26" idx="6"/>
+          </p:cNvCxnSpPr>
+          <p:nvPr/>
+        </p:nvCxnSpPr>
+        <p:spPr>
+          <a:xfrm flipH="1">
+            <a:off x="8508836" y="5313725"/>
+            <a:ext cx="1168198" cy="436560"/>
+          </a:xfrm>
+          <a:prstGeom prst="line">
+            <a:avLst/>
+          </a:prstGeom>
+          <a:ln w="31750">
+            <a:solidFill>
+              <a:schemeClr val="accent6">
+                <a:lumMod val="75000"/>
+              </a:schemeClr>
+            </a:solidFill>
+          </a:ln>
+        </p:spPr>
+        <p:style>
+          <a:lnRef idx="1">
+            <a:schemeClr val="accent1"/>
+          </a:lnRef>
+          <a:fillRef idx="0">
+            <a:schemeClr val="accent1"/>
+          </a:fillRef>
+          <a:effectRef idx="0">
+            <a:schemeClr val="accent1"/>
+          </a:effectRef>
+          <a:fontRef idx="minor">
+            <a:schemeClr val="tx1"/>
+          </a:fontRef>
+        </p:style>
+      </p:cxnSp>
+      <p:cxnSp>
+        <p:nvCxnSpPr>
+          <p:cNvPr id="36" name="Straight Connector 35">
+            <a:extLst>
+              <a:ext uri="{FF2B5EF4-FFF2-40B4-BE49-F238E27FC236}">
+                <a16:creationId xmlns:a16="http://schemas.microsoft.com/office/drawing/2014/main" id="{8265EAAD-A2A4-41BD-9A93-EE16CC85344B}"/>
+              </a:ext>
+            </a:extLst>
+          </p:cNvPr>
+          <p:cNvCxnSpPr>
+            <a:cxnSpLocks/>
+            <a:stCxn id="18" idx="2"/>
+            <a:endCxn id="27" idx="6"/>
+          </p:cNvCxnSpPr>
+          <p:nvPr/>
+        </p:nvCxnSpPr>
+        <p:spPr>
+          <a:xfrm flipH="1">
+            <a:off x="8508836" y="5313725"/>
+            <a:ext cx="1168198" cy="1119956"/>
+          </a:xfrm>
+          <a:prstGeom prst="line">
+            <a:avLst/>
+          </a:prstGeom>
+          <a:ln w="31750">
+            <a:solidFill>
+              <a:schemeClr val="accent6">
+                <a:lumMod val="75000"/>
+              </a:schemeClr>
+            </a:solidFill>
+          </a:ln>
+        </p:spPr>
+        <p:style>
+          <a:lnRef idx="1">
+            <a:schemeClr val="accent1"/>
+          </a:lnRef>
+          <a:fillRef idx="0">
+            <a:schemeClr val="accent1"/>
+          </a:fillRef>
+          <a:effectRef idx="0">
+            <a:schemeClr val="accent1"/>
+          </a:effectRef>
+          <a:fontRef idx="minor">
+            <a:schemeClr val="tx1"/>
+          </a:fontRef>
+        </p:style>
+      </p:cxnSp>
+      <p:sp>
+        <p:nvSpPr>
+          <p:cNvPr id="39" name="TextBox 38">
+            <a:extLst>
+              <a:ext uri="{FF2B5EF4-FFF2-40B4-BE49-F238E27FC236}">
+                <a16:creationId xmlns:a16="http://schemas.microsoft.com/office/drawing/2014/main" id="{795A741F-1729-4E8A-93DA-7A59EEA51790}"/>
+              </a:ext>
+            </a:extLst>
+          </p:cNvPr>
+          <p:cNvSpPr txBox="1"/>
+          <p:nvPr/>
+        </p:nvSpPr>
+        <p:spPr>
+          <a:xfrm>
+            <a:off x="6903712" y="4103615"/>
+            <a:ext cx="1263487" cy="369332"/>
+          </a:xfrm>
+          <a:prstGeom prst="rect">
+            <a:avLst/>
+          </a:prstGeom>
+          <a:noFill/>
+        </p:spPr>
+        <p:txBody>
+          <a:bodyPr wrap="none" rtlCol="0">
+            <a:spAutoFit/>
+          </a:bodyPr>
+          <a:lstStyle/>
+          <a:p>
+            <a:r>
+              <a:rPr lang="en-IN" dirty="0"/>
+              <a:t>Customer 1</a:t>
+            </a:r>
+          </a:p>
+        </p:txBody>
+      </p:sp>
+      <p:sp>
+        <p:nvSpPr>
+          <p:cNvPr id="40" name="TextBox 39">
+            <a:extLst>
+              <a:ext uri="{FF2B5EF4-FFF2-40B4-BE49-F238E27FC236}">
+                <a16:creationId xmlns:a16="http://schemas.microsoft.com/office/drawing/2014/main" id="{A58220B1-A8DA-4528-B788-C2B926D487E0}"/>
+              </a:ext>
+            </a:extLst>
+          </p:cNvPr>
+          <p:cNvSpPr txBox="1"/>
+          <p:nvPr/>
+        </p:nvSpPr>
+        <p:spPr>
+          <a:xfrm>
+            <a:off x="6901108" y="4857477"/>
+            <a:ext cx="1263487" cy="369332"/>
+          </a:xfrm>
+          <a:prstGeom prst="rect">
+            <a:avLst/>
+          </a:prstGeom>
+          <a:noFill/>
+        </p:spPr>
+        <p:txBody>
+          <a:bodyPr wrap="none" rtlCol="0">
+            <a:spAutoFit/>
+          </a:bodyPr>
+          <a:lstStyle/>
+          <a:p>
+            <a:r>
+              <a:rPr lang="en-IN" dirty="0"/>
+              <a:t>Customer 2</a:t>
+            </a:r>
+          </a:p>
+        </p:txBody>
+      </p:sp>
+      <p:sp>
+        <p:nvSpPr>
+          <p:cNvPr id="41" name="TextBox 40">
+            <a:extLst>
+              <a:ext uri="{FF2B5EF4-FFF2-40B4-BE49-F238E27FC236}">
+                <a16:creationId xmlns:a16="http://schemas.microsoft.com/office/drawing/2014/main" id="{0792DBFA-E045-4764-98F7-67CC76F56288}"/>
+              </a:ext>
+            </a:extLst>
+          </p:cNvPr>
+          <p:cNvSpPr txBox="1"/>
+          <p:nvPr/>
+        </p:nvSpPr>
+        <p:spPr>
+          <a:xfrm>
+            <a:off x="6882172" y="5569586"/>
+            <a:ext cx="1263487" cy="369332"/>
+          </a:xfrm>
+          <a:prstGeom prst="rect">
+            <a:avLst/>
+          </a:prstGeom>
+          <a:noFill/>
+        </p:spPr>
+        <p:txBody>
+          <a:bodyPr wrap="none" rtlCol="0">
+            <a:spAutoFit/>
+          </a:bodyPr>
+          <a:lstStyle/>
+          <a:p>
+            <a:r>
+              <a:rPr lang="en-IN" dirty="0"/>
+              <a:t>Customer 3</a:t>
+            </a:r>
+          </a:p>
+        </p:txBody>
+      </p:sp>
+      <p:sp>
+        <p:nvSpPr>
+          <p:cNvPr id="42" name="TextBox 41">
+            <a:extLst>
+              <a:ext uri="{FF2B5EF4-FFF2-40B4-BE49-F238E27FC236}">
+                <a16:creationId xmlns:a16="http://schemas.microsoft.com/office/drawing/2014/main" id="{6FC5A29D-8828-4E5D-A44A-4078602E77F1}"/>
+              </a:ext>
+            </a:extLst>
+          </p:cNvPr>
+          <p:cNvSpPr txBox="1"/>
+          <p:nvPr/>
+        </p:nvSpPr>
+        <p:spPr>
+          <a:xfrm>
+            <a:off x="6901107" y="6285178"/>
+            <a:ext cx="1263487" cy="369332"/>
+          </a:xfrm>
+          <a:prstGeom prst="rect">
+            <a:avLst/>
+          </a:prstGeom>
+          <a:noFill/>
+        </p:spPr>
+        <p:txBody>
+          <a:bodyPr wrap="none" rtlCol="0">
+            <a:spAutoFit/>
+          </a:bodyPr>
+          <a:lstStyle/>
+          <a:p>
+            <a:r>
+              <a:rPr lang="en-IN" dirty="0"/>
+              <a:t>Customer 4</a:t>
+            </a:r>
+          </a:p>
+        </p:txBody>
+      </p:sp>
+      <p:sp>
+        <p:nvSpPr>
+          <p:cNvPr id="43" name="TextBox 42">
+            <a:extLst>
+              <a:ext uri="{FF2B5EF4-FFF2-40B4-BE49-F238E27FC236}">
+                <a16:creationId xmlns:a16="http://schemas.microsoft.com/office/drawing/2014/main" id="{ED47069B-0D94-4213-87B9-046CDA3EFE96}"/>
+              </a:ext>
+            </a:extLst>
+          </p:cNvPr>
+          <p:cNvSpPr txBox="1"/>
+          <p:nvPr/>
+        </p:nvSpPr>
+        <p:spPr>
+          <a:xfrm>
+            <a:off x="10068920" y="4503558"/>
+            <a:ext cx="1089850" cy="369332"/>
+          </a:xfrm>
+          <a:prstGeom prst="rect">
+            <a:avLst/>
+          </a:prstGeom>
+          <a:noFill/>
+        </p:spPr>
+        <p:txBody>
+          <a:bodyPr wrap="none" rtlCol="0">
+            <a:spAutoFit/>
+          </a:bodyPr>
+          <a:lstStyle/>
+          <a:p>
+            <a:r>
+              <a:rPr lang="en-IN" dirty="0"/>
+              <a:t>Product 1</a:t>
+            </a:r>
+          </a:p>
+        </p:txBody>
+      </p:sp>
+      <p:sp>
+        <p:nvSpPr>
+          <p:cNvPr id="44" name="TextBox 43">
+            <a:extLst>
+              <a:ext uri="{FF2B5EF4-FFF2-40B4-BE49-F238E27FC236}">
+                <a16:creationId xmlns:a16="http://schemas.microsoft.com/office/drawing/2014/main" id="{C9C28678-8341-4DFA-93F1-12F14D6C0B84}"/>
+              </a:ext>
+            </a:extLst>
+          </p:cNvPr>
+          <p:cNvSpPr txBox="1"/>
+          <p:nvPr/>
+        </p:nvSpPr>
+        <p:spPr>
+          <a:xfrm>
+            <a:off x="10068920" y="5102381"/>
+            <a:ext cx="1089850" cy="369332"/>
+          </a:xfrm>
+          <a:prstGeom prst="rect">
+            <a:avLst/>
+          </a:prstGeom>
+          <a:noFill/>
+        </p:spPr>
+        <p:txBody>
+          <a:bodyPr wrap="none" rtlCol="0">
+            <a:spAutoFit/>
+          </a:bodyPr>
+          <a:lstStyle/>
+          <a:p>
+            <a:r>
+              <a:rPr lang="en-IN" dirty="0"/>
+              <a:t>Product 2</a:t>
+            </a:r>
+          </a:p>
+        </p:txBody>
+      </p:sp>
+      <p:sp>
+        <p:nvSpPr>
+          <p:cNvPr id="45" name="TextBox 44">
+            <a:extLst>
+              <a:ext uri="{FF2B5EF4-FFF2-40B4-BE49-F238E27FC236}">
+                <a16:creationId xmlns:a16="http://schemas.microsoft.com/office/drawing/2014/main" id="{CFAA6557-8C7B-4A6C-88B4-0B2B88A3238A}"/>
+              </a:ext>
+            </a:extLst>
+          </p:cNvPr>
+          <p:cNvSpPr txBox="1"/>
+          <p:nvPr/>
+        </p:nvSpPr>
+        <p:spPr>
+          <a:xfrm>
+            <a:off x="10068920" y="5774306"/>
+            <a:ext cx="1089850" cy="369332"/>
+          </a:xfrm>
+          <a:prstGeom prst="rect">
+            <a:avLst/>
+          </a:prstGeom>
+          <a:noFill/>
+        </p:spPr>
+        <p:txBody>
+          <a:bodyPr wrap="none" rtlCol="0">
+            <a:spAutoFit/>
+          </a:bodyPr>
+          <a:lstStyle/>
+          <a:p>
+            <a:r>
+              <a:rPr lang="en-IN" dirty="0"/>
+              <a:t>Product 3</a:t>
+            </a:r>
+          </a:p>
+        </p:txBody>
+      </p:sp>
+      <p:cxnSp>
+        <p:nvCxnSpPr>
+          <p:cNvPr id="46" name="Straight Connector 45">
+            <a:extLst>
+              <a:ext uri="{FF2B5EF4-FFF2-40B4-BE49-F238E27FC236}">
+                <a16:creationId xmlns:a16="http://schemas.microsoft.com/office/drawing/2014/main" id="{5EE208D0-C1C9-4A8F-B087-B3775124BA37}"/>
+              </a:ext>
+            </a:extLst>
+          </p:cNvPr>
+          <p:cNvCxnSpPr>
+            <a:cxnSpLocks/>
+            <a:stCxn id="29" idx="2"/>
+            <a:endCxn id="27" idx="6"/>
+          </p:cNvCxnSpPr>
+          <p:nvPr/>
+        </p:nvCxnSpPr>
+        <p:spPr>
+          <a:xfrm flipH="1">
+            <a:off x="8508836" y="5981707"/>
+            <a:ext cx="1168198" cy="451974"/>
+          </a:xfrm>
+          <a:prstGeom prst="line">
+            <a:avLst/>
+          </a:prstGeom>
+          <a:ln w="31750">
+            <a:solidFill>
+              <a:schemeClr val="accent6">
+                <a:lumMod val="75000"/>
+              </a:schemeClr>
+            </a:solidFill>
+          </a:ln>
+        </p:spPr>
+        <p:style>
+          <a:lnRef idx="1">
+            <a:schemeClr val="accent1"/>
+          </a:lnRef>
+          <a:fillRef idx="0">
+            <a:schemeClr val="accent1"/>
+          </a:fillRef>
+          <a:effectRef idx="0">
+            <a:schemeClr val="accent1"/>
+          </a:effectRef>
+          <a:fontRef idx="minor">
+            <a:schemeClr val="tx1"/>
+          </a:fontRef>
+        </p:style>
+      </p:cxnSp>
     </p:spTree>
     <p:extLst>
       <p:ext uri="{BB962C8B-B14F-4D97-AF65-F5344CB8AC3E}">
@@ -26620,6 +27624,1056 @@
               <a:rPr lang="en-IN" sz="1200" dirty="0"/>
               <a:t>association occurred</a:t>
             </a:r>
+          </a:p>
+        </p:txBody>
+      </p:sp>
+      <p:sp>
+        <p:nvSpPr>
+          <p:cNvPr id="3" name="Oval 2">
+            <a:extLst>
+              <a:ext uri="{FF2B5EF4-FFF2-40B4-BE49-F238E27FC236}">
+                <a16:creationId xmlns:a16="http://schemas.microsoft.com/office/drawing/2014/main" id="{F76797DA-551B-4E44-A607-05B860A8BECB}"/>
+              </a:ext>
+            </a:extLst>
+          </p:cNvPr>
+          <p:cNvSpPr/>
+          <p:nvPr/>
+        </p:nvSpPr>
+        <p:spPr>
+          <a:xfrm>
+            <a:off x="1402080" y="4511040"/>
+            <a:ext cx="391886" cy="374469"/>
+          </a:xfrm>
+          <a:prstGeom prst="ellipse">
+            <a:avLst/>
+          </a:prstGeom>
+          <a:solidFill>
+            <a:schemeClr val="accent6">
+              <a:lumMod val="75000"/>
+            </a:schemeClr>
+          </a:solidFill>
+          <a:ln>
+            <a:noFill/>
+          </a:ln>
+        </p:spPr>
+        <p:style>
+          <a:lnRef idx="2">
+            <a:schemeClr val="accent1">
+              <a:shade val="50000"/>
+            </a:schemeClr>
+          </a:lnRef>
+          <a:fillRef idx="1">
+            <a:schemeClr val="accent1"/>
+          </a:fillRef>
+          <a:effectRef idx="0">
+            <a:schemeClr val="accent1"/>
+          </a:effectRef>
+          <a:fontRef idx="minor">
+            <a:schemeClr val="lt1"/>
+          </a:fontRef>
+        </p:style>
+        <p:txBody>
+          <a:bodyPr rtlCol="0" anchor="ctr"/>
+          <a:lstStyle/>
+          <a:p>
+            <a:pPr algn="ctr"/>
+            <a:endParaRPr lang="en-IN"/>
+          </a:p>
+        </p:txBody>
+      </p:sp>
+      <p:sp>
+        <p:nvSpPr>
+          <p:cNvPr id="14" name="Oval 13">
+            <a:extLst>
+              <a:ext uri="{FF2B5EF4-FFF2-40B4-BE49-F238E27FC236}">
+                <a16:creationId xmlns:a16="http://schemas.microsoft.com/office/drawing/2014/main" id="{A6B65830-A352-4BB8-A8E6-0F81939BB44B}"/>
+              </a:ext>
+            </a:extLst>
+          </p:cNvPr>
+          <p:cNvSpPr/>
+          <p:nvPr/>
+        </p:nvSpPr>
+        <p:spPr>
+          <a:xfrm>
+            <a:off x="2312910" y="3496492"/>
+            <a:ext cx="391886" cy="374469"/>
+          </a:xfrm>
+          <a:prstGeom prst="ellipse">
+            <a:avLst/>
+          </a:prstGeom>
+          <a:solidFill>
+            <a:schemeClr val="accent6">
+              <a:lumMod val="75000"/>
+            </a:schemeClr>
+          </a:solidFill>
+          <a:ln>
+            <a:noFill/>
+          </a:ln>
+        </p:spPr>
+        <p:style>
+          <a:lnRef idx="2">
+            <a:schemeClr val="accent1">
+              <a:shade val="50000"/>
+            </a:schemeClr>
+          </a:lnRef>
+          <a:fillRef idx="1">
+            <a:schemeClr val="accent1"/>
+          </a:fillRef>
+          <a:effectRef idx="0">
+            <a:schemeClr val="accent1"/>
+          </a:effectRef>
+          <a:fontRef idx="minor">
+            <a:schemeClr val="lt1"/>
+          </a:fontRef>
+        </p:style>
+        <p:txBody>
+          <a:bodyPr rtlCol="0" anchor="ctr"/>
+          <a:lstStyle/>
+          <a:p>
+            <a:pPr algn="ctr"/>
+            <a:endParaRPr lang="en-IN"/>
+          </a:p>
+        </p:txBody>
+      </p:sp>
+      <p:cxnSp>
+        <p:nvCxnSpPr>
+          <p:cNvPr id="8" name="Straight Connector 7">
+            <a:extLst>
+              <a:ext uri="{FF2B5EF4-FFF2-40B4-BE49-F238E27FC236}">
+                <a16:creationId xmlns:a16="http://schemas.microsoft.com/office/drawing/2014/main" id="{73007D85-DD8C-42F6-8E95-21A4C2842859}"/>
+              </a:ext>
+            </a:extLst>
+          </p:cNvPr>
+          <p:cNvCxnSpPr>
+            <a:cxnSpLocks/>
+            <a:stCxn id="3" idx="7"/>
+            <a:endCxn id="14" idx="3"/>
+          </p:cNvCxnSpPr>
+          <p:nvPr/>
+        </p:nvCxnSpPr>
+        <p:spPr>
+          <a:xfrm flipV="1">
+            <a:off x="1736576" y="3816121"/>
+            <a:ext cx="633724" cy="749759"/>
+          </a:xfrm>
+          <a:prstGeom prst="line">
+            <a:avLst/>
+          </a:prstGeom>
+          <a:ln w="60325">
+            <a:solidFill>
+              <a:schemeClr val="accent6">
+                <a:lumMod val="75000"/>
+              </a:schemeClr>
+            </a:solidFill>
+          </a:ln>
+        </p:spPr>
+        <p:style>
+          <a:lnRef idx="1">
+            <a:schemeClr val="accent1"/>
+          </a:lnRef>
+          <a:fillRef idx="0">
+            <a:schemeClr val="accent1"/>
+          </a:fillRef>
+          <a:effectRef idx="0">
+            <a:schemeClr val="accent1"/>
+          </a:effectRef>
+          <a:fontRef idx="minor">
+            <a:schemeClr val="tx1"/>
+          </a:fontRef>
+        </p:style>
+      </p:cxnSp>
+      <p:sp>
+        <p:nvSpPr>
+          <p:cNvPr id="18" name="Oval 17">
+            <a:extLst>
+              <a:ext uri="{FF2B5EF4-FFF2-40B4-BE49-F238E27FC236}">
+                <a16:creationId xmlns:a16="http://schemas.microsoft.com/office/drawing/2014/main" id="{20E9E9D4-E0F3-4AFE-92D7-166471019BCA}"/>
+              </a:ext>
+            </a:extLst>
+          </p:cNvPr>
+          <p:cNvSpPr/>
+          <p:nvPr/>
+        </p:nvSpPr>
+        <p:spPr>
+          <a:xfrm>
+            <a:off x="3097336" y="4702077"/>
+            <a:ext cx="391886" cy="374469"/>
+          </a:xfrm>
+          <a:prstGeom prst="ellipse">
+            <a:avLst/>
+          </a:prstGeom>
+          <a:solidFill>
+            <a:schemeClr val="accent6">
+              <a:lumMod val="75000"/>
+            </a:schemeClr>
+          </a:solidFill>
+          <a:ln>
+            <a:noFill/>
+          </a:ln>
+        </p:spPr>
+        <p:style>
+          <a:lnRef idx="2">
+            <a:schemeClr val="accent1">
+              <a:shade val="50000"/>
+            </a:schemeClr>
+          </a:lnRef>
+          <a:fillRef idx="1">
+            <a:schemeClr val="accent1"/>
+          </a:fillRef>
+          <a:effectRef idx="0">
+            <a:schemeClr val="accent1"/>
+          </a:effectRef>
+          <a:fontRef idx="minor">
+            <a:schemeClr val="lt1"/>
+          </a:fontRef>
+        </p:style>
+        <p:txBody>
+          <a:bodyPr rtlCol="0" anchor="ctr"/>
+          <a:lstStyle/>
+          <a:p>
+            <a:pPr algn="ctr"/>
+            <a:endParaRPr lang="en-IN"/>
+          </a:p>
+        </p:txBody>
+      </p:sp>
+      <p:sp>
+        <p:nvSpPr>
+          <p:cNvPr id="19" name="Oval 18">
+            <a:extLst>
+              <a:ext uri="{FF2B5EF4-FFF2-40B4-BE49-F238E27FC236}">
+                <a16:creationId xmlns:a16="http://schemas.microsoft.com/office/drawing/2014/main" id="{97FE1D5B-653B-462B-B2F1-AD8442B80134}"/>
+              </a:ext>
+            </a:extLst>
+          </p:cNvPr>
+          <p:cNvSpPr/>
+          <p:nvPr/>
+        </p:nvSpPr>
+        <p:spPr>
+          <a:xfrm>
+            <a:off x="4190055" y="3089895"/>
+            <a:ext cx="391886" cy="374469"/>
+          </a:xfrm>
+          <a:prstGeom prst="ellipse">
+            <a:avLst/>
+          </a:prstGeom>
+          <a:solidFill>
+            <a:schemeClr val="accent6">
+              <a:lumMod val="75000"/>
+            </a:schemeClr>
+          </a:solidFill>
+          <a:ln>
+            <a:noFill/>
+          </a:ln>
+        </p:spPr>
+        <p:style>
+          <a:lnRef idx="2">
+            <a:schemeClr val="accent1">
+              <a:shade val="50000"/>
+            </a:schemeClr>
+          </a:lnRef>
+          <a:fillRef idx="1">
+            <a:schemeClr val="accent1"/>
+          </a:fillRef>
+          <a:effectRef idx="0">
+            <a:schemeClr val="accent1"/>
+          </a:effectRef>
+          <a:fontRef idx="minor">
+            <a:schemeClr val="lt1"/>
+          </a:fontRef>
+        </p:style>
+        <p:txBody>
+          <a:bodyPr rtlCol="0" anchor="ctr"/>
+          <a:lstStyle/>
+          <a:p>
+            <a:pPr algn="ctr"/>
+            <a:endParaRPr lang="en-IN"/>
+          </a:p>
+        </p:txBody>
+      </p:sp>
+      <p:cxnSp>
+        <p:nvCxnSpPr>
+          <p:cNvPr id="20" name="Straight Connector 19">
+            <a:extLst>
+              <a:ext uri="{FF2B5EF4-FFF2-40B4-BE49-F238E27FC236}">
+                <a16:creationId xmlns:a16="http://schemas.microsoft.com/office/drawing/2014/main" id="{52A6F7E2-49CC-4391-87E4-C31CC33F9A6F}"/>
+              </a:ext>
+            </a:extLst>
+          </p:cNvPr>
+          <p:cNvCxnSpPr>
+            <a:cxnSpLocks/>
+            <a:stCxn id="18" idx="7"/>
+            <a:endCxn id="19" idx="3"/>
+          </p:cNvCxnSpPr>
+          <p:nvPr/>
+        </p:nvCxnSpPr>
+        <p:spPr>
+          <a:xfrm flipV="1">
+            <a:off x="3431832" y="3409524"/>
+            <a:ext cx="815613" cy="1347393"/>
+          </a:xfrm>
+          <a:prstGeom prst="line">
+            <a:avLst/>
+          </a:prstGeom>
+          <a:ln w="60325">
+            <a:solidFill>
+              <a:schemeClr val="accent6">
+                <a:lumMod val="75000"/>
+              </a:schemeClr>
+            </a:solidFill>
+          </a:ln>
+        </p:spPr>
+        <p:style>
+          <a:lnRef idx="1">
+            <a:schemeClr val="accent1"/>
+          </a:lnRef>
+          <a:fillRef idx="0">
+            <a:schemeClr val="accent1"/>
+          </a:fillRef>
+          <a:effectRef idx="0">
+            <a:schemeClr val="accent1"/>
+          </a:effectRef>
+          <a:fontRef idx="minor">
+            <a:schemeClr val="tx1"/>
+          </a:fontRef>
+        </p:style>
+      </p:cxnSp>
+      <p:sp>
+        <p:nvSpPr>
+          <p:cNvPr id="21" name="Oval 20">
+            <a:extLst>
+              <a:ext uri="{FF2B5EF4-FFF2-40B4-BE49-F238E27FC236}">
+                <a16:creationId xmlns:a16="http://schemas.microsoft.com/office/drawing/2014/main" id="{42DDEA5A-B302-47DB-81BA-70CDC9ED27E4}"/>
+              </a:ext>
+            </a:extLst>
+          </p:cNvPr>
+          <p:cNvSpPr/>
+          <p:nvPr/>
+        </p:nvSpPr>
+        <p:spPr>
+          <a:xfrm>
+            <a:off x="5360252" y="4698274"/>
+            <a:ext cx="391886" cy="374469"/>
+          </a:xfrm>
+          <a:prstGeom prst="ellipse">
+            <a:avLst/>
+          </a:prstGeom>
+          <a:solidFill>
+            <a:schemeClr val="accent6">
+              <a:lumMod val="75000"/>
+            </a:schemeClr>
+          </a:solidFill>
+          <a:ln>
+            <a:noFill/>
+          </a:ln>
+        </p:spPr>
+        <p:style>
+          <a:lnRef idx="2">
+            <a:schemeClr val="accent1">
+              <a:shade val="50000"/>
+            </a:schemeClr>
+          </a:lnRef>
+          <a:fillRef idx="1">
+            <a:schemeClr val="accent1"/>
+          </a:fillRef>
+          <a:effectRef idx="0">
+            <a:schemeClr val="accent1"/>
+          </a:effectRef>
+          <a:fontRef idx="minor">
+            <a:schemeClr val="lt1"/>
+          </a:fontRef>
+        </p:style>
+        <p:txBody>
+          <a:bodyPr rtlCol="0" anchor="ctr"/>
+          <a:lstStyle/>
+          <a:p>
+            <a:pPr algn="ctr"/>
+            <a:endParaRPr lang="en-IN"/>
+          </a:p>
+        </p:txBody>
+      </p:sp>
+      <p:cxnSp>
+        <p:nvCxnSpPr>
+          <p:cNvPr id="22" name="Straight Connector 21">
+            <a:extLst>
+              <a:ext uri="{FF2B5EF4-FFF2-40B4-BE49-F238E27FC236}">
+                <a16:creationId xmlns:a16="http://schemas.microsoft.com/office/drawing/2014/main" id="{2AEF2513-0401-4476-ACA7-15D3DABA093E}"/>
+              </a:ext>
+            </a:extLst>
+          </p:cNvPr>
+          <p:cNvCxnSpPr>
+            <a:cxnSpLocks/>
+            <a:stCxn id="21" idx="2"/>
+            <a:endCxn id="18" idx="6"/>
+          </p:cNvCxnSpPr>
+          <p:nvPr/>
+        </p:nvCxnSpPr>
+        <p:spPr>
+          <a:xfrm flipH="1">
+            <a:off x="3489222" y="4885509"/>
+            <a:ext cx="1871030" cy="3803"/>
+          </a:xfrm>
+          <a:prstGeom prst="line">
+            <a:avLst/>
+          </a:prstGeom>
+          <a:ln w="60325">
+            <a:solidFill>
+              <a:schemeClr val="accent6">
+                <a:lumMod val="75000"/>
+              </a:schemeClr>
+            </a:solidFill>
+          </a:ln>
+        </p:spPr>
+        <p:style>
+          <a:lnRef idx="1">
+            <a:schemeClr val="accent1"/>
+          </a:lnRef>
+          <a:fillRef idx="0">
+            <a:schemeClr val="accent1"/>
+          </a:fillRef>
+          <a:effectRef idx="0">
+            <a:schemeClr val="accent1"/>
+          </a:effectRef>
+          <a:fontRef idx="minor">
+            <a:schemeClr val="tx1"/>
+          </a:fontRef>
+        </p:style>
+      </p:cxnSp>
+      <p:cxnSp>
+        <p:nvCxnSpPr>
+          <p:cNvPr id="24" name="Straight Connector 23">
+            <a:extLst>
+              <a:ext uri="{FF2B5EF4-FFF2-40B4-BE49-F238E27FC236}">
+                <a16:creationId xmlns:a16="http://schemas.microsoft.com/office/drawing/2014/main" id="{56F30BB4-0279-4478-8E67-060207192656}"/>
+              </a:ext>
+            </a:extLst>
+          </p:cNvPr>
+          <p:cNvCxnSpPr>
+            <a:cxnSpLocks/>
+            <a:stCxn id="21" idx="1"/>
+            <a:endCxn id="19" idx="5"/>
+          </p:cNvCxnSpPr>
+          <p:nvPr/>
+        </p:nvCxnSpPr>
+        <p:spPr>
+          <a:xfrm flipH="1" flipV="1">
+            <a:off x="4524551" y="3409524"/>
+            <a:ext cx="893091" cy="1343590"/>
+          </a:xfrm>
+          <a:prstGeom prst="line">
+            <a:avLst/>
+          </a:prstGeom>
+          <a:ln w="60325">
+            <a:solidFill>
+              <a:schemeClr val="accent6">
+                <a:lumMod val="75000"/>
+              </a:schemeClr>
+            </a:solidFill>
+          </a:ln>
+        </p:spPr>
+        <p:style>
+          <a:lnRef idx="1">
+            <a:schemeClr val="accent1"/>
+          </a:lnRef>
+          <a:fillRef idx="0">
+            <a:schemeClr val="accent1"/>
+          </a:fillRef>
+          <a:effectRef idx="0">
+            <a:schemeClr val="accent1"/>
+          </a:effectRef>
+          <a:fontRef idx="minor">
+            <a:schemeClr val="tx1"/>
+          </a:fontRef>
+        </p:style>
+      </p:cxnSp>
+      <p:sp>
+        <p:nvSpPr>
+          <p:cNvPr id="48" name="Oval 47">
+            <a:extLst>
+              <a:ext uri="{FF2B5EF4-FFF2-40B4-BE49-F238E27FC236}">
+                <a16:creationId xmlns:a16="http://schemas.microsoft.com/office/drawing/2014/main" id="{A2516518-E523-4D26-98D8-3CFBBB225BFF}"/>
+              </a:ext>
+            </a:extLst>
+          </p:cNvPr>
+          <p:cNvSpPr/>
+          <p:nvPr/>
+        </p:nvSpPr>
+        <p:spPr>
+          <a:xfrm>
+            <a:off x="8116950" y="5807262"/>
+            <a:ext cx="391886" cy="374469"/>
+          </a:xfrm>
+          <a:prstGeom prst="ellipse">
+            <a:avLst/>
+          </a:prstGeom>
+          <a:solidFill>
+            <a:schemeClr val="accent6">
+              <a:lumMod val="75000"/>
+            </a:schemeClr>
+          </a:solidFill>
+          <a:ln>
+            <a:noFill/>
+          </a:ln>
+        </p:spPr>
+        <p:style>
+          <a:lnRef idx="2">
+            <a:schemeClr val="accent1">
+              <a:shade val="50000"/>
+            </a:schemeClr>
+          </a:lnRef>
+          <a:fillRef idx="1">
+            <a:schemeClr val="accent1"/>
+          </a:fillRef>
+          <a:effectRef idx="0">
+            <a:schemeClr val="accent1"/>
+          </a:effectRef>
+          <a:fontRef idx="minor">
+            <a:schemeClr val="lt1"/>
+          </a:fontRef>
+        </p:style>
+        <p:txBody>
+          <a:bodyPr rtlCol="0" anchor="ctr"/>
+          <a:lstStyle/>
+          <a:p>
+            <a:pPr algn="ctr"/>
+            <a:endParaRPr lang="en-IN"/>
+          </a:p>
+        </p:txBody>
+      </p:sp>
+      <p:sp>
+        <p:nvSpPr>
+          <p:cNvPr id="49" name="Oval 48">
+            <a:extLst>
+              <a:ext uri="{FF2B5EF4-FFF2-40B4-BE49-F238E27FC236}">
+                <a16:creationId xmlns:a16="http://schemas.microsoft.com/office/drawing/2014/main" id="{8C794A3D-78CA-4074-A544-FF77575CA66B}"/>
+              </a:ext>
+            </a:extLst>
+          </p:cNvPr>
+          <p:cNvSpPr/>
+          <p:nvPr/>
+        </p:nvSpPr>
+        <p:spPr>
+          <a:xfrm>
+            <a:off x="8799020" y="4081319"/>
+            <a:ext cx="391886" cy="374469"/>
+          </a:xfrm>
+          <a:prstGeom prst="ellipse">
+            <a:avLst/>
+          </a:prstGeom>
+          <a:solidFill>
+            <a:srgbClr val="00B050"/>
+          </a:solidFill>
+          <a:ln>
+            <a:noFill/>
+          </a:ln>
+        </p:spPr>
+        <p:style>
+          <a:lnRef idx="2">
+            <a:schemeClr val="accent1">
+              <a:shade val="50000"/>
+            </a:schemeClr>
+          </a:lnRef>
+          <a:fillRef idx="1">
+            <a:schemeClr val="accent1"/>
+          </a:fillRef>
+          <a:effectRef idx="0">
+            <a:schemeClr val="accent1"/>
+          </a:effectRef>
+          <a:fontRef idx="minor">
+            <a:schemeClr val="lt1"/>
+          </a:fontRef>
+        </p:style>
+        <p:txBody>
+          <a:bodyPr rtlCol="0" anchor="ctr"/>
+          <a:lstStyle/>
+          <a:p>
+            <a:pPr algn="ctr"/>
+            <a:endParaRPr lang="en-IN"/>
+          </a:p>
+        </p:txBody>
+      </p:sp>
+      <p:cxnSp>
+        <p:nvCxnSpPr>
+          <p:cNvPr id="50" name="Straight Connector 49">
+            <a:extLst>
+              <a:ext uri="{FF2B5EF4-FFF2-40B4-BE49-F238E27FC236}">
+                <a16:creationId xmlns:a16="http://schemas.microsoft.com/office/drawing/2014/main" id="{E6080486-CAFB-400C-BEF3-76616F33F592}"/>
+              </a:ext>
+            </a:extLst>
+          </p:cNvPr>
+          <p:cNvCxnSpPr>
+            <a:cxnSpLocks/>
+            <a:stCxn id="48" idx="0"/>
+            <a:endCxn id="49" idx="3"/>
+          </p:cNvCxnSpPr>
+          <p:nvPr/>
+        </p:nvCxnSpPr>
+        <p:spPr>
+          <a:xfrm flipV="1">
+            <a:off x="8312893" y="4400948"/>
+            <a:ext cx="543517" cy="1406314"/>
+          </a:xfrm>
+          <a:prstGeom prst="line">
+            <a:avLst/>
+          </a:prstGeom>
+          <a:ln w="60325">
+            <a:solidFill>
+              <a:srgbClr val="00B050"/>
+            </a:solidFill>
+          </a:ln>
+        </p:spPr>
+        <p:style>
+          <a:lnRef idx="1">
+            <a:schemeClr val="accent1"/>
+          </a:lnRef>
+          <a:fillRef idx="0">
+            <a:schemeClr val="accent1"/>
+          </a:fillRef>
+          <a:effectRef idx="0">
+            <a:schemeClr val="accent1"/>
+          </a:effectRef>
+          <a:fontRef idx="minor">
+            <a:schemeClr val="tx1"/>
+          </a:fontRef>
+        </p:style>
+      </p:cxnSp>
+      <p:sp>
+        <p:nvSpPr>
+          <p:cNvPr id="51" name="Oval 50">
+            <a:extLst>
+              <a:ext uri="{FF2B5EF4-FFF2-40B4-BE49-F238E27FC236}">
+                <a16:creationId xmlns:a16="http://schemas.microsoft.com/office/drawing/2014/main" id="{2DFB6F1B-F4BE-4E5D-BC93-D42F81373E05}"/>
+              </a:ext>
+            </a:extLst>
+          </p:cNvPr>
+          <p:cNvSpPr/>
+          <p:nvPr/>
+        </p:nvSpPr>
+        <p:spPr>
+          <a:xfrm>
+            <a:off x="9872977" y="5593624"/>
+            <a:ext cx="391886" cy="374469"/>
+          </a:xfrm>
+          <a:prstGeom prst="ellipse">
+            <a:avLst/>
+          </a:prstGeom>
+          <a:solidFill>
+            <a:schemeClr val="accent2"/>
+          </a:solidFill>
+          <a:ln>
+            <a:noFill/>
+          </a:ln>
+        </p:spPr>
+        <p:style>
+          <a:lnRef idx="2">
+            <a:schemeClr val="accent1">
+              <a:shade val="50000"/>
+            </a:schemeClr>
+          </a:lnRef>
+          <a:fillRef idx="1">
+            <a:schemeClr val="accent1"/>
+          </a:fillRef>
+          <a:effectRef idx="0">
+            <a:schemeClr val="accent1"/>
+          </a:effectRef>
+          <a:fontRef idx="minor">
+            <a:schemeClr val="lt1"/>
+          </a:fontRef>
+        </p:style>
+        <p:txBody>
+          <a:bodyPr rtlCol="0" anchor="ctr"/>
+          <a:lstStyle/>
+          <a:p>
+            <a:pPr algn="ctr"/>
+            <a:endParaRPr lang="en-IN"/>
+          </a:p>
+        </p:txBody>
+      </p:sp>
+      <p:cxnSp>
+        <p:nvCxnSpPr>
+          <p:cNvPr id="52" name="Straight Connector 51">
+            <a:extLst>
+              <a:ext uri="{FF2B5EF4-FFF2-40B4-BE49-F238E27FC236}">
+                <a16:creationId xmlns:a16="http://schemas.microsoft.com/office/drawing/2014/main" id="{DFBD89E1-D892-434E-8DA4-E1A94BB0A28B}"/>
+              </a:ext>
+            </a:extLst>
+          </p:cNvPr>
+          <p:cNvCxnSpPr>
+            <a:cxnSpLocks/>
+            <a:stCxn id="51" idx="2"/>
+            <a:endCxn id="48" idx="6"/>
+          </p:cNvCxnSpPr>
+          <p:nvPr/>
+        </p:nvCxnSpPr>
+        <p:spPr>
+          <a:xfrm flipH="1">
+            <a:off x="8508836" y="5780859"/>
+            <a:ext cx="1364141" cy="213638"/>
+          </a:xfrm>
+          <a:prstGeom prst="line">
+            <a:avLst/>
+          </a:prstGeom>
+          <a:ln w="60325">
+            <a:solidFill>
+              <a:schemeClr val="accent6">
+                <a:lumMod val="75000"/>
+              </a:schemeClr>
+            </a:solidFill>
+          </a:ln>
+        </p:spPr>
+        <p:style>
+          <a:lnRef idx="1">
+            <a:schemeClr val="accent1"/>
+          </a:lnRef>
+          <a:fillRef idx="0">
+            <a:schemeClr val="accent1"/>
+          </a:fillRef>
+          <a:effectRef idx="0">
+            <a:schemeClr val="accent1"/>
+          </a:effectRef>
+          <a:fontRef idx="minor">
+            <a:schemeClr val="tx1"/>
+          </a:fontRef>
+        </p:style>
+      </p:cxnSp>
+      <p:cxnSp>
+        <p:nvCxnSpPr>
+          <p:cNvPr id="53" name="Straight Connector 52">
+            <a:extLst>
+              <a:ext uri="{FF2B5EF4-FFF2-40B4-BE49-F238E27FC236}">
+                <a16:creationId xmlns:a16="http://schemas.microsoft.com/office/drawing/2014/main" id="{9CC78E9C-79F7-4C5B-BBB3-225D376B07DA}"/>
+              </a:ext>
+            </a:extLst>
+          </p:cNvPr>
+          <p:cNvCxnSpPr>
+            <a:cxnSpLocks/>
+            <a:stCxn id="51" idx="1"/>
+            <a:endCxn id="49" idx="5"/>
+          </p:cNvCxnSpPr>
+          <p:nvPr/>
+        </p:nvCxnSpPr>
+        <p:spPr>
+          <a:xfrm flipH="1" flipV="1">
+            <a:off x="9133516" y="4400948"/>
+            <a:ext cx="796851" cy="1247516"/>
+          </a:xfrm>
+          <a:prstGeom prst="line">
+            <a:avLst/>
+          </a:prstGeom>
+          <a:ln w="60325">
+            <a:solidFill>
+              <a:schemeClr val="accent2"/>
+            </a:solidFill>
+          </a:ln>
+        </p:spPr>
+        <p:style>
+          <a:lnRef idx="1">
+            <a:schemeClr val="accent1"/>
+          </a:lnRef>
+          <a:fillRef idx="0">
+            <a:schemeClr val="accent1"/>
+          </a:fillRef>
+          <a:effectRef idx="0">
+            <a:schemeClr val="accent1"/>
+          </a:effectRef>
+          <a:fontRef idx="minor">
+            <a:schemeClr val="tx1"/>
+          </a:fontRef>
+        </p:style>
+      </p:cxnSp>
+      <p:sp>
+        <p:nvSpPr>
+          <p:cNvPr id="54" name="Oval 53">
+            <a:extLst>
+              <a:ext uri="{FF2B5EF4-FFF2-40B4-BE49-F238E27FC236}">
+                <a16:creationId xmlns:a16="http://schemas.microsoft.com/office/drawing/2014/main" id="{21DED991-3785-47D8-9697-024DE2DDC236}"/>
+              </a:ext>
+            </a:extLst>
+          </p:cNvPr>
+          <p:cNvSpPr/>
+          <p:nvPr/>
+        </p:nvSpPr>
+        <p:spPr>
+          <a:xfrm>
+            <a:off x="10455424" y="3870961"/>
+            <a:ext cx="391886" cy="374469"/>
+          </a:xfrm>
+          <a:prstGeom prst="ellipse">
+            <a:avLst/>
+          </a:prstGeom>
+          <a:solidFill>
+            <a:schemeClr val="accent5">
+              <a:lumMod val="50000"/>
+            </a:schemeClr>
+          </a:solidFill>
+          <a:ln>
+            <a:noFill/>
+          </a:ln>
+        </p:spPr>
+        <p:style>
+          <a:lnRef idx="2">
+            <a:schemeClr val="accent1">
+              <a:shade val="50000"/>
+            </a:schemeClr>
+          </a:lnRef>
+          <a:fillRef idx="1">
+            <a:schemeClr val="accent1"/>
+          </a:fillRef>
+          <a:effectRef idx="0">
+            <a:schemeClr val="accent1"/>
+          </a:effectRef>
+          <a:fontRef idx="minor">
+            <a:schemeClr val="lt1"/>
+          </a:fontRef>
+        </p:style>
+        <p:txBody>
+          <a:bodyPr rtlCol="0" anchor="ctr"/>
+          <a:lstStyle/>
+          <a:p>
+            <a:pPr algn="ctr"/>
+            <a:endParaRPr lang="en-IN"/>
+          </a:p>
+        </p:txBody>
+      </p:sp>
+      <p:cxnSp>
+        <p:nvCxnSpPr>
+          <p:cNvPr id="55" name="Straight Connector 54">
+            <a:extLst>
+              <a:ext uri="{FF2B5EF4-FFF2-40B4-BE49-F238E27FC236}">
+                <a16:creationId xmlns:a16="http://schemas.microsoft.com/office/drawing/2014/main" id="{4946F769-EBB3-4A47-AADA-13F50E186936}"/>
+              </a:ext>
+            </a:extLst>
+          </p:cNvPr>
+          <p:cNvCxnSpPr>
+            <a:cxnSpLocks/>
+            <a:stCxn id="54" idx="2"/>
+            <a:endCxn id="49" idx="6"/>
+          </p:cNvCxnSpPr>
+          <p:nvPr/>
+        </p:nvCxnSpPr>
+        <p:spPr>
+          <a:xfrm flipH="1">
+            <a:off x="9190906" y="4058196"/>
+            <a:ext cx="1264518" cy="210358"/>
+          </a:xfrm>
+          <a:prstGeom prst="line">
+            <a:avLst/>
+          </a:prstGeom>
+          <a:ln w="60325">
+            <a:solidFill>
+              <a:schemeClr val="accent1">
+                <a:lumMod val="75000"/>
+              </a:schemeClr>
+            </a:solidFill>
+          </a:ln>
+        </p:spPr>
+        <p:style>
+          <a:lnRef idx="1">
+            <a:schemeClr val="accent1"/>
+          </a:lnRef>
+          <a:fillRef idx="0">
+            <a:schemeClr val="accent1"/>
+          </a:fillRef>
+          <a:effectRef idx="0">
+            <a:schemeClr val="accent1"/>
+          </a:effectRef>
+          <a:fontRef idx="minor">
+            <a:schemeClr val="tx1"/>
+          </a:fontRef>
+        </p:style>
+      </p:cxnSp>
+      <p:cxnSp>
+        <p:nvCxnSpPr>
+          <p:cNvPr id="58" name="Straight Connector 57">
+            <a:extLst>
+              <a:ext uri="{FF2B5EF4-FFF2-40B4-BE49-F238E27FC236}">
+                <a16:creationId xmlns:a16="http://schemas.microsoft.com/office/drawing/2014/main" id="{B55DE1B8-9818-4567-AC61-E552D83B1D86}"/>
+              </a:ext>
+            </a:extLst>
+          </p:cNvPr>
+          <p:cNvCxnSpPr>
+            <a:cxnSpLocks/>
+            <a:stCxn id="51" idx="7"/>
+            <a:endCxn id="54" idx="4"/>
+          </p:cNvCxnSpPr>
+          <p:nvPr/>
+        </p:nvCxnSpPr>
+        <p:spPr>
+          <a:xfrm flipV="1">
+            <a:off x="10207473" y="4245430"/>
+            <a:ext cx="443894" cy="1403034"/>
+          </a:xfrm>
+          <a:prstGeom prst="line">
+            <a:avLst/>
+          </a:prstGeom>
+          <a:ln w="60325">
+            <a:solidFill>
+              <a:schemeClr val="accent6">
+                <a:lumMod val="75000"/>
+              </a:schemeClr>
+            </a:solidFill>
+          </a:ln>
+        </p:spPr>
+        <p:style>
+          <a:lnRef idx="1">
+            <a:schemeClr val="accent1"/>
+          </a:lnRef>
+          <a:fillRef idx="0">
+            <a:schemeClr val="accent1"/>
+          </a:fillRef>
+          <a:effectRef idx="0">
+            <a:schemeClr val="accent1"/>
+          </a:effectRef>
+          <a:fontRef idx="minor">
+            <a:schemeClr val="tx1"/>
+          </a:fontRef>
+        </p:style>
+      </p:cxnSp>
+      <p:cxnSp>
+        <p:nvCxnSpPr>
+          <p:cNvPr id="64" name="Straight Connector 63">
+            <a:extLst>
+              <a:ext uri="{FF2B5EF4-FFF2-40B4-BE49-F238E27FC236}">
+                <a16:creationId xmlns:a16="http://schemas.microsoft.com/office/drawing/2014/main" id="{AF9F2400-A044-469E-9E9A-DB8BC60E6945}"/>
+              </a:ext>
+            </a:extLst>
+          </p:cNvPr>
+          <p:cNvCxnSpPr>
+            <a:cxnSpLocks/>
+            <a:stCxn id="54" idx="3"/>
+            <a:endCxn id="48" idx="7"/>
+          </p:cNvCxnSpPr>
+          <p:nvPr/>
+        </p:nvCxnSpPr>
+        <p:spPr>
+          <a:xfrm flipH="1">
+            <a:off x="8451446" y="4190590"/>
+            <a:ext cx="2061368" cy="1671512"/>
+          </a:xfrm>
+          <a:prstGeom prst="line">
+            <a:avLst/>
+          </a:prstGeom>
+          <a:ln w="60325">
+            <a:solidFill>
+              <a:schemeClr val="tx2">
+                <a:lumMod val="75000"/>
+              </a:schemeClr>
+            </a:solidFill>
+          </a:ln>
+        </p:spPr>
+        <p:style>
+          <a:lnRef idx="1">
+            <a:schemeClr val="accent1"/>
+          </a:lnRef>
+          <a:fillRef idx="0">
+            <a:schemeClr val="accent1"/>
+          </a:fillRef>
+          <a:effectRef idx="0">
+            <a:schemeClr val="accent1"/>
+          </a:effectRef>
+          <a:fontRef idx="minor">
+            <a:schemeClr val="tx1"/>
+          </a:fontRef>
+        </p:style>
+      </p:cxnSp>
+      <p:cxnSp>
+        <p:nvCxnSpPr>
+          <p:cNvPr id="81" name="Straight Connector 80">
+            <a:extLst>
+              <a:ext uri="{FF2B5EF4-FFF2-40B4-BE49-F238E27FC236}">
+                <a16:creationId xmlns:a16="http://schemas.microsoft.com/office/drawing/2014/main" id="{0A549977-CF48-4EEB-B8E9-DE5A81EFA311}"/>
+              </a:ext>
+            </a:extLst>
+          </p:cNvPr>
+          <p:cNvCxnSpPr>
+            <a:cxnSpLocks/>
+            <a:stCxn id="84" idx="2"/>
+            <a:endCxn id="51" idx="5"/>
+          </p:cNvCxnSpPr>
+          <p:nvPr/>
+        </p:nvCxnSpPr>
+        <p:spPr>
+          <a:xfrm flipH="1">
+            <a:off x="10207473" y="5862102"/>
+            <a:ext cx="1152302" cy="51151"/>
+          </a:xfrm>
+          <a:prstGeom prst="line">
+            <a:avLst/>
+          </a:prstGeom>
+          <a:ln w="60325">
+            <a:solidFill>
+              <a:schemeClr val="accent6">
+                <a:lumMod val="75000"/>
+              </a:schemeClr>
+            </a:solidFill>
+            <a:prstDash val="sysDot"/>
+          </a:ln>
+        </p:spPr>
+        <p:style>
+          <a:lnRef idx="1">
+            <a:schemeClr val="accent1"/>
+          </a:lnRef>
+          <a:fillRef idx="0">
+            <a:schemeClr val="accent1"/>
+          </a:fillRef>
+          <a:effectRef idx="0">
+            <a:schemeClr val="accent1"/>
+          </a:effectRef>
+          <a:fontRef idx="minor">
+            <a:schemeClr val="tx1"/>
+          </a:fontRef>
+        </p:style>
+      </p:cxnSp>
+      <p:sp>
+        <p:nvSpPr>
+          <p:cNvPr id="84" name="Oval 83">
+            <a:extLst>
+              <a:ext uri="{FF2B5EF4-FFF2-40B4-BE49-F238E27FC236}">
+                <a16:creationId xmlns:a16="http://schemas.microsoft.com/office/drawing/2014/main" id="{E99FF715-0149-4365-A022-3FD5FA9AEBA3}"/>
+              </a:ext>
+            </a:extLst>
+          </p:cNvPr>
+          <p:cNvSpPr/>
+          <p:nvPr/>
+        </p:nvSpPr>
+        <p:spPr>
+          <a:xfrm>
+            <a:off x="11359775" y="5674867"/>
+            <a:ext cx="391886" cy="374469"/>
+          </a:xfrm>
+          <a:prstGeom prst="ellipse">
+            <a:avLst/>
+          </a:prstGeom>
+          <a:solidFill>
+            <a:schemeClr val="accent5">
+              <a:lumMod val="50000"/>
+            </a:schemeClr>
+          </a:solidFill>
+          <a:ln>
+            <a:noFill/>
+          </a:ln>
+        </p:spPr>
+        <p:style>
+          <a:lnRef idx="2">
+            <a:schemeClr val="accent1">
+              <a:shade val="50000"/>
+            </a:schemeClr>
+          </a:lnRef>
+          <a:fillRef idx="1">
+            <a:schemeClr val="accent1"/>
+          </a:fillRef>
+          <a:effectRef idx="0">
+            <a:schemeClr val="accent1"/>
+          </a:effectRef>
+          <a:fontRef idx="minor">
+            <a:schemeClr val="lt1"/>
+          </a:fontRef>
+        </p:style>
+        <p:txBody>
+          <a:bodyPr rtlCol="0" anchor="ctr"/>
+          <a:lstStyle/>
+          <a:p>
+            <a:pPr algn="ctr"/>
+            <a:endParaRPr lang="en-IN"/>
           </a:p>
         </p:txBody>
       </p:sp>
@@ -26932,21 +28986,6 @@
 </file>
 
 <file path=customXml/item1.xml><?xml version="1.0" encoding="utf-8"?>
-<?mso-contentType ?>
-<FormTemplates xmlns="http://schemas.microsoft.com/sharepoint/v3/contenttype/forms">
-  <Display>DocumentLibraryForm</Display>
-  <Edit>DocumentLibraryForm</Edit>
-  <New>DocumentLibraryForm</New>
-</FormTemplates>
-</file>
-
-<file path=customXml/item2.xml><?xml version="1.0" encoding="utf-8"?>
-<p:properties xmlns:p="http://schemas.microsoft.com/office/2006/metadata/properties" xmlns:xsi="http://www.w3.org/2001/XMLSchema-instance" xmlns:pc="http://schemas.microsoft.com/office/infopath/2007/PartnerControls">
-  <documentManagement/>
-</p:properties>
-</file>
-
-<file path=customXml/item3.xml><?xml version="1.0" encoding="utf-8"?>
 <ct:contentTypeSchema xmlns:ct="http://schemas.microsoft.com/office/2006/metadata/contentType" xmlns:ma="http://schemas.microsoft.com/office/2006/metadata/properties/metaAttributes" ct:_="" ma:_="" ma:contentTypeName="Document" ma:contentTypeID="0x010100E5E90CE7D835DF49A54E7D3F39A82871" ma:contentTypeVersion="10" ma:contentTypeDescription="Create a new document." ma:contentTypeScope="" ma:versionID="ecb1bcfb5513d0ca4ca2e29515166e3d">
   <xsd:schema xmlns:xsd="http://www.w3.org/2001/XMLSchema" xmlns:xs="http://www.w3.org/2001/XMLSchema" xmlns:p="http://schemas.microsoft.com/office/2006/metadata/properties" xmlns:ns3="bdd987ea-5e3c-4d73-ab5b-afe2844564b9" xmlns:ns4="8eab65b4-4232-441d-b263-cd52eab97547" targetNamespace="http://schemas.microsoft.com/office/2006/metadata/properties" ma:root="true" ma:fieldsID="1c60ee05aeafbf51a253cd522014a061" ns3:_="" ns4:_="">
     <xsd:import namespace="bdd987ea-5e3c-4d73-ab5b-afe2844564b9"/>
@@ -27149,10 +29188,36 @@
 </ct:contentTypeSchema>
 </file>
 
+<file path=customXml/item2.xml><?xml version="1.0" encoding="utf-8"?>
+<p:properties xmlns:p="http://schemas.microsoft.com/office/2006/metadata/properties" xmlns:xsi="http://www.w3.org/2001/XMLSchema-instance" xmlns:pc="http://schemas.microsoft.com/office/infopath/2007/PartnerControls">
+  <documentManagement/>
+</p:properties>
+</file>
+
+<file path=customXml/item3.xml><?xml version="1.0" encoding="utf-8"?>
+<?mso-contentType ?>
+<FormTemplates xmlns="http://schemas.microsoft.com/sharepoint/v3/contenttype/forms">
+  <Display>DocumentLibraryForm</Display>
+  <Edit>DocumentLibraryForm</Edit>
+  <New>DocumentLibraryForm</New>
+</FormTemplates>
+</file>
+
 <file path=customXml/itemProps1.xml><?xml version="1.0" encoding="utf-8"?>
-<ds:datastoreItem xmlns:ds="http://schemas.openxmlformats.org/officeDocument/2006/customXml" ds:itemID="{666DA301-B763-471A-885E-1C88D4229E18}">
+<ds:datastoreItem xmlns:ds="http://schemas.openxmlformats.org/officeDocument/2006/customXml" ds:itemID="{A4141BA4-1192-479A-9875-9E50B86A06A0}">
   <ds:schemaRefs>
-    <ds:schemaRef ds:uri="http://schemas.microsoft.com/sharepoint/v3/contenttype/forms"/>
+    <ds:schemaRef ds:uri="http://schemas.microsoft.com/office/2006/metadata/contentType"/>
+    <ds:schemaRef ds:uri="http://schemas.microsoft.com/office/2006/metadata/properties/metaAttributes"/>
+    <ds:schemaRef ds:uri="http://www.w3.org/2001/XMLSchema"/>
+    <ds:schemaRef ds:uri="http://schemas.microsoft.com/office/2006/metadata/properties"/>
+    <ds:schemaRef ds:uri="bdd987ea-5e3c-4d73-ab5b-afe2844564b9"/>
+    <ds:schemaRef ds:uri="8eab65b4-4232-441d-b263-cd52eab97547"/>
+    <ds:schemaRef ds:uri="http://schemas.microsoft.com/office/2006/documentManagement/types"/>
+    <ds:schemaRef ds:uri="http://schemas.microsoft.com/office/infopath/2007/PartnerControls"/>
+    <ds:schemaRef ds:uri="http://schemas.openxmlformats.org/package/2006/metadata/core-properties"/>
+    <ds:schemaRef ds:uri="http://purl.org/dc/elements/1.1/"/>
+    <ds:schemaRef ds:uri="http://purl.org/dc/terms/"/>
+    <ds:schemaRef ds:uri="http://schemas.microsoft.com/internal/obd"/>
   </ds:schemaRefs>
 </ds:datastoreItem>
 </file>
@@ -27175,20 +29240,9 @@
 </file>
 
 <file path=customXml/itemProps3.xml><?xml version="1.0" encoding="utf-8"?>
-<ds:datastoreItem xmlns:ds="http://schemas.openxmlformats.org/officeDocument/2006/customXml" ds:itemID="{A4141BA4-1192-479A-9875-9E50B86A06A0}">
+<ds:datastoreItem xmlns:ds="http://schemas.openxmlformats.org/officeDocument/2006/customXml" ds:itemID="{666DA301-B763-471A-885E-1C88D4229E18}">
   <ds:schemaRefs>
-    <ds:schemaRef ds:uri="http://schemas.microsoft.com/office/2006/metadata/contentType"/>
-    <ds:schemaRef ds:uri="http://schemas.microsoft.com/office/2006/metadata/properties/metaAttributes"/>
-    <ds:schemaRef ds:uri="http://www.w3.org/2001/XMLSchema"/>
-    <ds:schemaRef ds:uri="http://schemas.microsoft.com/office/2006/metadata/properties"/>
-    <ds:schemaRef ds:uri="bdd987ea-5e3c-4d73-ab5b-afe2844564b9"/>
-    <ds:schemaRef ds:uri="8eab65b4-4232-441d-b263-cd52eab97547"/>
-    <ds:schemaRef ds:uri="http://schemas.microsoft.com/office/2006/documentManagement/types"/>
-    <ds:schemaRef ds:uri="http://schemas.microsoft.com/office/infopath/2007/PartnerControls"/>
-    <ds:schemaRef ds:uri="http://schemas.openxmlformats.org/package/2006/metadata/core-properties"/>
-    <ds:schemaRef ds:uri="http://purl.org/dc/elements/1.1/"/>
-    <ds:schemaRef ds:uri="http://purl.org/dc/terms/"/>
-    <ds:schemaRef ds:uri="http://schemas.microsoft.com/internal/obd"/>
+    <ds:schemaRef ds:uri="http://schemas.microsoft.com/sharepoint/v3/contenttype/forms"/>
   </ds:schemaRefs>
 </ds:datastoreItem>
 </file>
</xml_diff>